<commit_message>
Add backgrounds and some info to presentation
</commit_message>
<xml_diff>
--- a/presentation.pptx
+++ b/presentation.pptx
@@ -2,16 +2,16 @@
 <file path=ppt/presentation.xml><?xml version="1.0" encoding="utf-8"?>
 <p:presentation xmlns:a="http://schemas.openxmlformats.org/drawingml/2006/main" xmlns:r="http://schemas.openxmlformats.org/officeDocument/2006/relationships" xmlns:p="http://schemas.openxmlformats.org/presentationml/2006/main" saveSubsetFonts="1">
   <p:sldMasterIdLst>
-    <p:sldMasterId id="2147483648" r:id="rId1"/>
+    <p:sldMasterId id="2147483672" r:id="rId1"/>
   </p:sldMasterIdLst>
   <p:sldIdLst>
     <p:sldId id="256" r:id="rId2"/>
     <p:sldId id="257" r:id="rId3"/>
     <p:sldId id="259" r:id="rId4"/>
     <p:sldId id="260" r:id="rId5"/>
-    <p:sldId id="261" r:id="rId6"/>
-    <p:sldId id="263" r:id="rId7"/>
-    <p:sldId id="264" r:id="rId8"/>
+    <p:sldId id="269" r:id="rId6"/>
+    <p:sldId id="270" r:id="rId7"/>
+    <p:sldId id="271" r:id="rId8"/>
     <p:sldId id="266" r:id="rId9"/>
     <p:sldId id="262" r:id="rId10"/>
     <p:sldId id="265" r:id="rId11"/>
@@ -19,13 +19,13 @@
     <p:sldId id="267" r:id="rId13"/>
     <p:sldId id="258" r:id="rId14"/>
   </p:sldIdLst>
-  <p:sldSz cx="12192000" cy="6858000"/>
+  <p:sldSz cx="12239625" cy="6840538"/>
   <p:notesSz cx="6858000" cy="9144000"/>
   <p:defaultTextStyle>
     <a:defPPr>
-      <a:defRPr lang="ru-RU"/>
+      <a:defRPr lang="en-US"/>
     </a:defPPr>
-    <a:lvl1pPr marL="0" algn="l" defTabSz="914400" rtl="0" eaLnBrk="1" latinLnBrk="0" hangingPunct="1">
+    <a:lvl1pPr marL="0" algn="l" defTabSz="457200" rtl="0" eaLnBrk="1" latinLnBrk="0" hangingPunct="1">
       <a:defRPr sz="1800" kern="1200">
         <a:solidFill>
           <a:schemeClr val="tx1"/>
@@ -35,7 +35,7 @@
         <a:cs typeface="+mn-cs"/>
       </a:defRPr>
     </a:lvl1pPr>
-    <a:lvl2pPr marL="457200" algn="l" defTabSz="914400" rtl="0" eaLnBrk="1" latinLnBrk="0" hangingPunct="1">
+    <a:lvl2pPr marL="457200" algn="l" defTabSz="457200" rtl="0" eaLnBrk="1" latinLnBrk="0" hangingPunct="1">
       <a:defRPr sz="1800" kern="1200">
         <a:solidFill>
           <a:schemeClr val="tx1"/>
@@ -45,7 +45,7 @@
         <a:cs typeface="+mn-cs"/>
       </a:defRPr>
     </a:lvl2pPr>
-    <a:lvl3pPr marL="914400" algn="l" defTabSz="914400" rtl="0" eaLnBrk="1" latinLnBrk="0" hangingPunct="1">
+    <a:lvl3pPr marL="914400" algn="l" defTabSz="457200" rtl="0" eaLnBrk="1" latinLnBrk="0" hangingPunct="1">
       <a:defRPr sz="1800" kern="1200">
         <a:solidFill>
           <a:schemeClr val="tx1"/>
@@ -55,7 +55,7 @@
         <a:cs typeface="+mn-cs"/>
       </a:defRPr>
     </a:lvl3pPr>
-    <a:lvl4pPr marL="1371600" algn="l" defTabSz="914400" rtl="0" eaLnBrk="1" latinLnBrk="0" hangingPunct="1">
+    <a:lvl4pPr marL="1371600" algn="l" defTabSz="457200" rtl="0" eaLnBrk="1" latinLnBrk="0" hangingPunct="1">
       <a:defRPr sz="1800" kern="1200">
         <a:solidFill>
           <a:schemeClr val="tx1"/>
@@ -65,7 +65,7 @@
         <a:cs typeface="+mn-cs"/>
       </a:defRPr>
     </a:lvl4pPr>
-    <a:lvl5pPr marL="1828800" algn="l" defTabSz="914400" rtl="0" eaLnBrk="1" latinLnBrk="0" hangingPunct="1">
+    <a:lvl5pPr marL="1828800" algn="l" defTabSz="457200" rtl="0" eaLnBrk="1" latinLnBrk="0" hangingPunct="1">
       <a:defRPr sz="1800" kern="1200">
         <a:solidFill>
           <a:schemeClr val="tx1"/>
@@ -75,7 +75,7 @@
         <a:cs typeface="+mn-cs"/>
       </a:defRPr>
     </a:lvl5pPr>
-    <a:lvl6pPr marL="2286000" algn="l" defTabSz="914400" rtl="0" eaLnBrk="1" latinLnBrk="0" hangingPunct="1">
+    <a:lvl6pPr marL="2286000" algn="l" defTabSz="457200" rtl="0" eaLnBrk="1" latinLnBrk="0" hangingPunct="1">
       <a:defRPr sz="1800" kern="1200">
         <a:solidFill>
           <a:schemeClr val="tx1"/>
@@ -85,7 +85,7 @@
         <a:cs typeface="+mn-cs"/>
       </a:defRPr>
     </a:lvl6pPr>
-    <a:lvl7pPr marL="2743200" algn="l" defTabSz="914400" rtl="0" eaLnBrk="1" latinLnBrk="0" hangingPunct="1">
+    <a:lvl7pPr marL="2743200" algn="l" defTabSz="457200" rtl="0" eaLnBrk="1" latinLnBrk="0" hangingPunct="1">
       <a:defRPr sz="1800" kern="1200">
         <a:solidFill>
           <a:schemeClr val="tx1"/>
@@ -95,7 +95,7 @@
         <a:cs typeface="+mn-cs"/>
       </a:defRPr>
     </a:lvl7pPr>
-    <a:lvl8pPr marL="3200400" algn="l" defTabSz="914400" rtl="0" eaLnBrk="1" latinLnBrk="0" hangingPunct="1">
+    <a:lvl8pPr marL="3200400" algn="l" defTabSz="457200" rtl="0" eaLnBrk="1" latinLnBrk="0" hangingPunct="1">
       <a:defRPr sz="1800" kern="1200">
         <a:solidFill>
           <a:schemeClr val="tx1"/>
@@ -105,7 +105,7 @@
         <a:cs typeface="+mn-cs"/>
       </a:defRPr>
     </a:lvl8pPr>
-    <a:lvl9pPr marL="3657600" algn="l" defTabSz="914400" rtl="0" eaLnBrk="1" latinLnBrk="0" hangingPunct="1">
+    <a:lvl9pPr marL="3657600" algn="l" defTabSz="457200" rtl="0" eaLnBrk="1" latinLnBrk="0" hangingPunct="1">
       <a:defRPr sz="1800" kern="1200">
         <a:solidFill>
           <a:schemeClr val="tx1"/>
@@ -129,9 +129,9 @@
           <p14:sldIdLst>
             <p14:sldId id="259"/>
             <p14:sldId id="260"/>
-            <p14:sldId id="261"/>
-            <p14:sldId id="263"/>
-            <p14:sldId id="264"/>
+            <p14:sldId id="269"/>
+            <p14:sldId id="270"/>
+            <p14:sldId id="271"/>
           </p14:sldIdLst>
         </p14:section>
         <p14:section name="Уровень-обучение" id="{21E96361-2ECB-4823-AA28-FD0D6A78B50F}">
@@ -158,6 +158,9 @@
         </p14:section>
       </p14:sectionLst>
     </p:ext>
+    <p:ext uri="{EFAFB233-063F-42B5-8137-9DF3F51BA10A}">
+      <p15:sldGuideLst xmlns:p15="http://schemas.microsoft.com/office/powerpoint/2012/main"/>
+    </p:ext>
   </p:extLst>
 </p:presentation>
 </file>
@@ -181,13 +184,7 @@
       </p:grpSpPr>
       <p:sp>
         <p:nvSpPr>
-          <p:cNvPr id="2" name="Заголовок 1">
-            <a:extLst>
-              <a:ext uri="{FF2B5EF4-FFF2-40B4-BE49-F238E27FC236}">
-                <a16:creationId xmlns:a16="http://schemas.microsoft.com/office/drawing/2014/main" id="{C3E8A66F-A70F-420D-A681-56AB233589BA}"/>
-              </a:ext>
-            </a:extLst>
-          </p:cNvPr>
+          <p:cNvPr id="2" name="Title 1"/>
           <p:cNvSpPr>
             <a:spLocks noGrp="1"/>
           </p:cNvSpPr>
@@ -197,34 +194,29 @@
         </p:nvSpPr>
         <p:spPr>
           <a:xfrm>
-            <a:off x="1524000" y="1122363"/>
-            <a:ext cx="9144000" cy="2387600"/>
+            <a:off x="1529953" y="1119505"/>
+            <a:ext cx="9179719" cy="2381521"/>
           </a:xfrm>
         </p:spPr>
         <p:txBody>
           <a:bodyPr anchor="b"/>
           <a:lstStyle>
             <a:lvl1pPr algn="ctr">
-              <a:defRPr sz="6000"/>
+              <a:defRPr sz="5985"/>
             </a:lvl1pPr>
           </a:lstStyle>
           <a:p>
             <a:r>
-              <a:rPr lang="ru-RU"/>
+              <a:rPr lang="ru-RU" smtClean="0"/>
               <a:t>Образец заголовка</a:t>
             </a:r>
-          </a:p>
-        </p:txBody>
-      </p:sp>
-      <p:sp>
-        <p:nvSpPr>
-          <p:cNvPr id="3" name="Подзаголовок 2">
-            <a:extLst>
-              <a:ext uri="{FF2B5EF4-FFF2-40B4-BE49-F238E27FC236}">
-                <a16:creationId xmlns:a16="http://schemas.microsoft.com/office/drawing/2014/main" id="{EBDAEEDC-24D7-4399-A410-98A00038EEDB}"/>
-              </a:ext>
-            </a:extLst>
-          </p:cNvPr>
+            <a:endParaRPr lang="en-US" dirty="0"/>
+          </a:p>
+        </p:txBody>
+      </p:sp>
+      <p:sp>
+        <p:nvSpPr>
+          <p:cNvPr id="3" name="Subtitle 2"/>
           <p:cNvSpPr>
             <a:spLocks noGrp="1"/>
           </p:cNvSpPr>
@@ -234,8 +226,8 @@
         </p:nvSpPr>
         <p:spPr>
           <a:xfrm>
-            <a:off x="1524000" y="3602038"/>
-            <a:ext cx="9144000" cy="1655762"/>
+            <a:off x="1529953" y="3592866"/>
+            <a:ext cx="9179719" cy="1651546"/>
           </a:xfrm>
         </p:spPr>
         <p:txBody>
@@ -243,58 +235,53 @@
           <a:lstStyle>
             <a:lvl1pPr marL="0" indent="0" algn="ctr">
               <a:buNone/>
-              <a:defRPr sz="2400"/>
+              <a:defRPr sz="2394"/>
             </a:lvl1pPr>
-            <a:lvl2pPr marL="457200" indent="0" algn="ctr">
-              <a:buNone/>
-              <a:defRPr sz="2000"/>
+            <a:lvl2pPr marL="456057" indent="0" algn="ctr">
+              <a:buNone/>
+              <a:defRPr sz="1995"/>
             </a:lvl2pPr>
-            <a:lvl3pPr marL="914400" indent="0" algn="ctr">
-              <a:buNone/>
-              <a:defRPr sz="1800"/>
+            <a:lvl3pPr marL="912114" indent="0" algn="ctr">
+              <a:buNone/>
+              <a:defRPr sz="1795"/>
             </a:lvl3pPr>
-            <a:lvl4pPr marL="1371600" indent="0" algn="ctr">
-              <a:buNone/>
-              <a:defRPr sz="1600"/>
+            <a:lvl4pPr marL="1368171" indent="0" algn="ctr">
+              <a:buNone/>
+              <a:defRPr sz="1596"/>
             </a:lvl4pPr>
-            <a:lvl5pPr marL="1828800" indent="0" algn="ctr">
-              <a:buNone/>
-              <a:defRPr sz="1600"/>
+            <a:lvl5pPr marL="1824228" indent="0" algn="ctr">
+              <a:buNone/>
+              <a:defRPr sz="1596"/>
             </a:lvl5pPr>
-            <a:lvl6pPr marL="2286000" indent="0" algn="ctr">
-              <a:buNone/>
-              <a:defRPr sz="1600"/>
+            <a:lvl6pPr marL="2280285" indent="0" algn="ctr">
+              <a:buNone/>
+              <a:defRPr sz="1596"/>
             </a:lvl6pPr>
-            <a:lvl7pPr marL="2743200" indent="0" algn="ctr">
-              <a:buNone/>
-              <a:defRPr sz="1600"/>
+            <a:lvl7pPr marL="2736342" indent="0" algn="ctr">
+              <a:buNone/>
+              <a:defRPr sz="1596"/>
             </a:lvl7pPr>
-            <a:lvl8pPr marL="3200400" indent="0" algn="ctr">
-              <a:buNone/>
-              <a:defRPr sz="1600"/>
+            <a:lvl8pPr marL="3192399" indent="0" algn="ctr">
+              <a:buNone/>
+              <a:defRPr sz="1596"/>
             </a:lvl8pPr>
-            <a:lvl9pPr marL="3657600" indent="0" algn="ctr">
-              <a:buNone/>
-              <a:defRPr sz="1600"/>
+            <a:lvl9pPr marL="3648456" indent="0" algn="ctr">
+              <a:buNone/>
+              <a:defRPr sz="1596"/>
             </a:lvl9pPr>
           </a:lstStyle>
           <a:p>
             <a:r>
-              <a:rPr lang="ru-RU"/>
+              <a:rPr lang="ru-RU" smtClean="0"/>
               <a:t>Образец подзаголовка</a:t>
             </a:r>
-          </a:p>
-        </p:txBody>
-      </p:sp>
-      <p:sp>
-        <p:nvSpPr>
-          <p:cNvPr id="4" name="Дата 3">
-            <a:extLst>
-              <a:ext uri="{FF2B5EF4-FFF2-40B4-BE49-F238E27FC236}">
-                <a16:creationId xmlns:a16="http://schemas.microsoft.com/office/drawing/2014/main" id="{4EE682C2-36C3-4648-BE64-A1887E1C3314}"/>
-              </a:ext>
-            </a:extLst>
-          </p:cNvPr>
+            <a:endParaRPr lang="en-US" dirty="0"/>
+          </a:p>
+        </p:txBody>
+      </p:sp>
+      <p:sp>
+        <p:nvSpPr>
+          <p:cNvPr id="4" name="Date Placeholder 3"/>
           <p:cNvSpPr>
             <a:spLocks noGrp="1"/>
           </p:cNvSpPr>
@@ -309,7 +296,7 @@
           <a:p>
             <a:fld id="{07504AD1-F626-4EEE-A1F0-4F98A55EE3A4}" type="datetimeFigureOut">
               <a:rPr lang="ru-RU" smtClean="0"/>
-              <a:t>17.01.2022</a:t>
+              <a:t>19.01.2022</a:t>
             </a:fld>
             <a:endParaRPr lang="ru-RU"/>
           </a:p>
@@ -317,13 +304,7 @@
       </p:sp>
       <p:sp>
         <p:nvSpPr>
-          <p:cNvPr id="5" name="Нижний колонтитул 4">
-            <a:extLst>
-              <a:ext uri="{FF2B5EF4-FFF2-40B4-BE49-F238E27FC236}">
-                <a16:creationId xmlns:a16="http://schemas.microsoft.com/office/drawing/2014/main" id="{53E3103E-7800-4EA9-B549-FED85C3A3CCF}"/>
-              </a:ext>
-            </a:extLst>
-          </p:cNvPr>
+          <p:cNvPr id="5" name="Footer Placeholder 4"/>
           <p:cNvSpPr>
             <a:spLocks noGrp="1"/>
           </p:cNvSpPr>
@@ -342,13 +323,7 @@
       </p:sp>
       <p:sp>
         <p:nvSpPr>
-          <p:cNvPr id="6" name="Номер слайда 5">
-            <a:extLst>
-              <a:ext uri="{FF2B5EF4-FFF2-40B4-BE49-F238E27FC236}">
-                <a16:creationId xmlns:a16="http://schemas.microsoft.com/office/drawing/2014/main" id="{408C4CD4-5DA4-412C-90E2-E28994770408}"/>
-              </a:ext>
-            </a:extLst>
-          </p:cNvPr>
+          <p:cNvPr id="6" name="Slide Number Placeholder 5"/>
           <p:cNvSpPr>
             <a:spLocks noGrp="1"/>
           </p:cNvSpPr>
@@ -372,7 +347,7 @@
     </p:spTree>
     <p:extLst>
       <p:ext uri="{BB962C8B-B14F-4D97-AF65-F5344CB8AC3E}">
-        <p14:creationId xmlns:p14="http://schemas.microsoft.com/office/powerpoint/2010/main" val="3405315650"/>
+        <p14:creationId xmlns:p14="http://schemas.microsoft.com/office/powerpoint/2010/main" val="925963394"/>
       </p:ext>
     </p:extLst>
   </p:cSld>
@@ -401,13 +376,7 @@
       </p:grpSpPr>
       <p:sp>
         <p:nvSpPr>
-          <p:cNvPr id="2" name="Заголовок 1">
-            <a:extLst>
-              <a:ext uri="{FF2B5EF4-FFF2-40B4-BE49-F238E27FC236}">
-                <a16:creationId xmlns:a16="http://schemas.microsoft.com/office/drawing/2014/main" id="{B04419DF-E818-49C5-B073-46D80B8C364E}"/>
-              </a:ext>
-            </a:extLst>
-          </p:cNvPr>
+          <p:cNvPr id="2" name="Title 1"/>
           <p:cNvSpPr>
             <a:spLocks noGrp="1"/>
           </p:cNvSpPr>
@@ -421,21 +390,16 @@
           <a:lstStyle/>
           <a:p>
             <a:r>
-              <a:rPr lang="ru-RU"/>
+              <a:rPr lang="ru-RU" smtClean="0"/>
               <a:t>Образец заголовка</a:t>
             </a:r>
-          </a:p>
-        </p:txBody>
-      </p:sp>
-      <p:sp>
-        <p:nvSpPr>
-          <p:cNvPr id="3" name="Вертикальный текст 2">
-            <a:extLst>
-              <a:ext uri="{FF2B5EF4-FFF2-40B4-BE49-F238E27FC236}">
-                <a16:creationId xmlns:a16="http://schemas.microsoft.com/office/drawing/2014/main" id="{47209B82-F353-4000-9268-BA94333AA43E}"/>
-              </a:ext>
-            </a:extLst>
-          </p:cNvPr>
+            <a:endParaRPr lang="en-US" dirty="0"/>
+          </a:p>
+        </p:txBody>
+      </p:sp>
+      <p:sp>
+        <p:nvSpPr>
+          <p:cNvPr id="3" name="Vertical Text Placeholder 2"/>
           <p:cNvSpPr>
             <a:spLocks noGrp="1"/>
           </p:cNvSpPr>
@@ -450,49 +414,44 @@
           <a:p>
             <a:pPr lvl="0"/>
             <a:r>
-              <a:rPr lang="ru-RU"/>
+              <a:rPr lang="ru-RU" smtClean="0"/>
               <a:t>Образец текста</a:t>
             </a:r>
           </a:p>
           <a:p>
             <a:pPr lvl="1"/>
             <a:r>
-              <a:rPr lang="ru-RU"/>
+              <a:rPr lang="ru-RU" smtClean="0"/>
               <a:t>Второй уровень</a:t>
             </a:r>
           </a:p>
           <a:p>
             <a:pPr lvl="2"/>
             <a:r>
-              <a:rPr lang="ru-RU"/>
+              <a:rPr lang="ru-RU" smtClean="0"/>
               <a:t>Третий уровень</a:t>
             </a:r>
           </a:p>
           <a:p>
             <a:pPr lvl="3"/>
             <a:r>
-              <a:rPr lang="ru-RU"/>
+              <a:rPr lang="ru-RU" smtClean="0"/>
               <a:t>Четвертый уровень</a:t>
             </a:r>
           </a:p>
           <a:p>
             <a:pPr lvl="4"/>
             <a:r>
-              <a:rPr lang="ru-RU"/>
+              <a:rPr lang="ru-RU" smtClean="0"/>
               <a:t>Пятый уровень</a:t>
             </a:r>
-          </a:p>
-        </p:txBody>
-      </p:sp>
-      <p:sp>
-        <p:nvSpPr>
-          <p:cNvPr id="4" name="Дата 3">
-            <a:extLst>
-              <a:ext uri="{FF2B5EF4-FFF2-40B4-BE49-F238E27FC236}">
-                <a16:creationId xmlns:a16="http://schemas.microsoft.com/office/drawing/2014/main" id="{844C0C2B-C19D-452B-B211-1AF43D16184F}"/>
-              </a:ext>
-            </a:extLst>
-          </p:cNvPr>
+            <a:endParaRPr lang="en-US" dirty="0"/>
+          </a:p>
+        </p:txBody>
+      </p:sp>
+      <p:sp>
+        <p:nvSpPr>
+          <p:cNvPr id="4" name="Date Placeholder 3"/>
           <p:cNvSpPr>
             <a:spLocks noGrp="1"/>
           </p:cNvSpPr>
@@ -507,7 +466,7 @@
           <a:p>
             <a:fld id="{07504AD1-F626-4EEE-A1F0-4F98A55EE3A4}" type="datetimeFigureOut">
               <a:rPr lang="ru-RU" smtClean="0"/>
-              <a:t>17.01.2022</a:t>
+              <a:t>19.01.2022</a:t>
             </a:fld>
             <a:endParaRPr lang="ru-RU"/>
           </a:p>
@@ -515,13 +474,7 @@
       </p:sp>
       <p:sp>
         <p:nvSpPr>
-          <p:cNvPr id="5" name="Нижний колонтитул 4">
-            <a:extLst>
-              <a:ext uri="{FF2B5EF4-FFF2-40B4-BE49-F238E27FC236}">
-                <a16:creationId xmlns:a16="http://schemas.microsoft.com/office/drawing/2014/main" id="{B955436E-27E5-4696-A58B-8B22DEE0C6A0}"/>
-              </a:ext>
-            </a:extLst>
-          </p:cNvPr>
+          <p:cNvPr id="5" name="Footer Placeholder 4"/>
           <p:cNvSpPr>
             <a:spLocks noGrp="1"/>
           </p:cNvSpPr>
@@ -540,13 +493,7 @@
       </p:sp>
       <p:sp>
         <p:nvSpPr>
-          <p:cNvPr id="6" name="Номер слайда 5">
-            <a:extLst>
-              <a:ext uri="{FF2B5EF4-FFF2-40B4-BE49-F238E27FC236}">
-                <a16:creationId xmlns:a16="http://schemas.microsoft.com/office/drawing/2014/main" id="{2C3577FB-49B1-4331-AE47-C8E8127FAE20}"/>
-              </a:ext>
-            </a:extLst>
-          </p:cNvPr>
+          <p:cNvPr id="6" name="Slide Number Placeholder 5"/>
           <p:cNvSpPr>
             <a:spLocks noGrp="1"/>
           </p:cNvSpPr>
@@ -570,7 +517,7 @@
     </p:spTree>
     <p:extLst>
       <p:ext uri="{BB962C8B-B14F-4D97-AF65-F5344CB8AC3E}">
-        <p14:creationId xmlns:p14="http://schemas.microsoft.com/office/powerpoint/2010/main" val="493625600"/>
+        <p14:creationId xmlns:p14="http://schemas.microsoft.com/office/powerpoint/2010/main" val="3499394070"/>
       </p:ext>
     </p:extLst>
   </p:cSld>
@@ -599,13 +546,7 @@
       </p:grpSpPr>
       <p:sp>
         <p:nvSpPr>
-          <p:cNvPr id="2" name="Вертикальный заголовок 1">
-            <a:extLst>
-              <a:ext uri="{FF2B5EF4-FFF2-40B4-BE49-F238E27FC236}">
-                <a16:creationId xmlns:a16="http://schemas.microsoft.com/office/drawing/2014/main" id="{AC7830F2-C485-4E30-A6A5-1CB4A29E6A0F}"/>
-              </a:ext>
-            </a:extLst>
-          </p:cNvPr>
+          <p:cNvPr id="2" name="Vertical Title 1"/>
           <p:cNvSpPr>
             <a:spLocks noGrp="1"/>
           </p:cNvSpPr>
@@ -615,8 +556,8 @@
         </p:nvSpPr>
         <p:spPr>
           <a:xfrm>
-            <a:off x="8724900" y="365125"/>
-            <a:ext cx="2628900" cy="5811838"/>
+            <a:off x="8758982" y="364195"/>
+            <a:ext cx="2639169" cy="5797040"/>
           </a:xfrm>
         </p:spPr>
         <p:txBody>
@@ -624,21 +565,16 @@
           <a:lstStyle/>
           <a:p>
             <a:r>
-              <a:rPr lang="ru-RU"/>
+              <a:rPr lang="ru-RU" smtClean="0"/>
               <a:t>Образец заголовка</a:t>
             </a:r>
-          </a:p>
-        </p:txBody>
-      </p:sp>
-      <p:sp>
-        <p:nvSpPr>
-          <p:cNvPr id="3" name="Вертикальный текст 2">
-            <a:extLst>
-              <a:ext uri="{FF2B5EF4-FFF2-40B4-BE49-F238E27FC236}">
-                <a16:creationId xmlns:a16="http://schemas.microsoft.com/office/drawing/2014/main" id="{C19DB4D9-F830-43BA-BF5B-6CD4431227F3}"/>
-              </a:ext>
-            </a:extLst>
-          </p:cNvPr>
+            <a:endParaRPr lang="en-US" dirty="0"/>
+          </a:p>
+        </p:txBody>
+      </p:sp>
+      <p:sp>
+        <p:nvSpPr>
+          <p:cNvPr id="3" name="Vertical Text Placeholder 2"/>
           <p:cNvSpPr>
             <a:spLocks noGrp="1"/>
           </p:cNvSpPr>
@@ -648,8 +584,8 @@
         </p:nvSpPr>
         <p:spPr>
           <a:xfrm>
-            <a:off x="838200" y="365125"/>
-            <a:ext cx="7734300" cy="5811838"/>
+            <a:off x="841474" y="364195"/>
+            <a:ext cx="7764512" cy="5797040"/>
           </a:xfrm>
         </p:spPr>
         <p:txBody>
@@ -658,49 +594,44 @@
           <a:p>
             <a:pPr lvl="0"/>
             <a:r>
-              <a:rPr lang="ru-RU"/>
+              <a:rPr lang="ru-RU" smtClean="0"/>
               <a:t>Образец текста</a:t>
             </a:r>
           </a:p>
           <a:p>
             <a:pPr lvl="1"/>
             <a:r>
-              <a:rPr lang="ru-RU"/>
+              <a:rPr lang="ru-RU" smtClean="0"/>
               <a:t>Второй уровень</a:t>
             </a:r>
           </a:p>
           <a:p>
             <a:pPr lvl="2"/>
             <a:r>
-              <a:rPr lang="ru-RU"/>
+              <a:rPr lang="ru-RU" smtClean="0"/>
               <a:t>Третий уровень</a:t>
             </a:r>
           </a:p>
           <a:p>
             <a:pPr lvl="3"/>
             <a:r>
-              <a:rPr lang="ru-RU"/>
+              <a:rPr lang="ru-RU" smtClean="0"/>
               <a:t>Четвертый уровень</a:t>
             </a:r>
           </a:p>
           <a:p>
             <a:pPr lvl="4"/>
             <a:r>
-              <a:rPr lang="ru-RU"/>
+              <a:rPr lang="ru-RU" smtClean="0"/>
               <a:t>Пятый уровень</a:t>
             </a:r>
-          </a:p>
-        </p:txBody>
-      </p:sp>
-      <p:sp>
-        <p:nvSpPr>
-          <p:cNvPr id="4" name="Дата 3">
-            <a:extLst>
-              <a:ext uri="{FF2B5EF4-FFF2-40B4-BE49-F238E27FC236}">
-                <a16:creationId xmlns:a16="http://schemas.microsoft.com/office/drawing/2014/main" id="{2D768053-97BF-458C-BB32-C153889E6B3E}"/>
-              </a:ext>
-            </a:extLst>
-          </p:cNvPr>
+            <a:endParaRPr lang="en-US" dirty="0"/>
+          </a:p>
+        </p:txBody>
+      </p:sp>
+      <p:sp>
+        <p:nvSpPr>
+          <p:cNvPr id="4" name="Date Placeholder 3"/>
           <p:cNvSpPr>
             <a:spLocks noGrp="1"/>
           </p:cNvSpPr>
@@ -715,7 +646,7 @@
           <a:p>
             <a:fld id="{07504AD1-F626-4EEE-A1F0-4F98A55EE3A4}" type="datetimeFigureOut">
               <a:rPr lang="ru-RU" smtClean="0"/>
-              <a:t>17.01.2022</a:t>
+              <a:t>19.01.2022</a:t>
             </a:fld>
             <a:endParaRPr lang="ru-RU"/>
           </a:p>
@@ -723,13 +654,7 @@
       </p:sp>
       <p:sp>
         <p:nvSpPr>
-          <p:cNvPr id="5" name="Нижний колонтитул 4">
-            <a:extLst>
-              <a:ext uri="{FF2B5EF4-FFF2-40B4-BE49-F238E27FC236}">
-                <a16:creationId xmlns:a16="http://schemas.microsoft.com/office/drawing/2014/main" id="{524281E9-F63C-4416-9E80-229447B1FB6D}"/>
-              </a:ext>
-            </a:extLst>
-          </p:cNvPr>
+          <p:cNvPr id="5" name="Footer Placeholder 4"/>
           <p:cNvSpPr>
             <a:spLocks noGrp="1"/>
           </p:cNvSpPr>
@@ -748,13 +673,7 @@
       </p:sp>
       <p:sp>
         <p:nvSpPr>
-          <p:cNvPr id="6" name="Номер слайда 5">
-            <a:extLst>
-              <a:ext uri="{FF2B5EF4-FFF2-40B4-BE49-F238E27FC236}">
-                <a16:creationId xmlns:a16="http://schemas.microsoft.com/office/drawing/2014/main" id="{B87846A1-8252-4C30-B610-319032DA8D87}"/>
-              </a:ext>
-            </a:extLst>
-          </p:cNvPr>
+          <p:cNvPr id="6" name="Slide Number Placeholder 5"/>
           <p:cNvSpPr>
             <a:spLocks noGrp="1"/>
           </p:cNvSpPr>
@@ -778,7 +697,7 @@
     </p:spTree>
     <p:extLst>
       <p:ext uri="{BB962C8B-B14F-4D97-AF65-F5344CB8AC3E}">
-        <p14:creationId xmlns:p14="http://schemas.microsoft.com/office/powerpoint/2010/main" val="2094010428"/>
+        <p14:creationId xmlns:p14="http://schemas.microsoft.com/office/powerpoint/2010/main" val="3464473940"/>
       </p:ext>
     </p:extLst>
   </p:cSld>
@@ -807,13 +726,7 @@
       </p:grpSpPr>
       <p:sp>
         <p:nvSpPr>
-          <p:cNvPr id="2" name="Заголовок 1">
-            <a:extLst>
-              <a:ext uri="{FF2B5EF4-FFF2-40B4-BE49-F238E27FC236}">
-                <a16:creationId xmlns:a16="http://schemas.microsoft.com/office/drawing/2014/main" id="{CB8D0BBB-6C4E-4F77-A0EC-97669D049488}"/>
-              </a:ext>
-            </a:extLst>
-          </p:cNvPr>
+          <p:cNvPr id="2" name="Title 1"/>
           <p:cNvSpPr>
             <a:spLocks noGrp="1"/>
           </p:cNvSpPr>
@@ -827,21 +740,16 @@
           <a:lstStyle/>
           <a:p>
             <a:r>
-              <a:rPr lang="ru-RU"/>
+              <a:rPr lang="ru-RU" smtClean="0"/>
               <a:t>Образец заголовка</a:t>
             </a:r>
-          </a:p>
-        </p:txBody>
-      </p:sp>
-      <p:sp>
-        <p:nvSpPr>
-          <p:cNvPr id="3" name="Объект 2">
-            <a:extLst>
-              <a:ext uri="{FF2B5EF4-FFF2-40B4-BE49-F238E27FC236}">
-                <a16:creationId xmlns:a16="http://schemas.microsoft.com/office/drawing/2014/main" id="{41CD20D0-7761-4011-B65B-C4ED0FF8FDE2}"/>
-              </a:ext>
-            </a:extLst>
-          </p:cNvPr>
+            <a:endParaRPr lang="en-US" dirty="0"/>
+          </a:p>
+        </p:txBody>
+      </p:sp>
+      <p:sp>
+        <p:nvSpPr>
+          <p:cNvPr id="3" name="Content Placeholder 2"/>
           <p:cNvSpPr>
             <a:spLocks noGrp="1"/>
           </p:cNvSpPr>
@@ -856,49 +764,44 @@
           <a:p>
             <a:pPr lvl="0"/>
             <a:r>
-              <a:rPr lang="ru-RU"/>
+              <a:rPr lang="ru-RU" smtClean="0"/>
               <a:t>Образец текста</a:t>
             </a:r>
           </a:p>
           <a:p>
             <a:pPr lvl="1"/>
             <a:r>
-              <a:rPr lang="ru-RU"/>
+              <a:rPr lang="ru-RU" smtClean="0"/>
               <a:t>Второй уровень</a:t>
             </a:r>
           </a:p>
           <a:p>
             <a:pPr lvl="2"/>
             <a:r>
-              <a:rPr lang="ru-RU"/>
+              <a:rPr lang="ru-RU" smtClean="0"/>
               <a:t>Третий уровень</a:t>
             </a:r>
           </a:p>
           <a:p>
             <a:pPr lvl="3"/>
             <a:r>
-              <a:rPr lang="ru-RU"/>
+              <a:rPr lang="ru-RU" smtClean="0"/>
               <a:t>Четвертый уровень</a:t>
             </a:r>
           </a:p>
           <a:p>
             <a:pPr lvl="4"/>
             <a:r>
-              <a:rPr lang="ru-RU"/>
+              <a:rPr lang="ru-RU" smtClean="0"/>
               <a:t>Пятый уровень</a:t>
             </a:r>
-          </a:p>
-        </p:txBody>
-      </p:sp>
-      <p:sp>
-        <p:nvSpPr>
-          <p:cNvPr id="4" name="Дата 3">
-            <a:extLst>
-              <a:ext uri="{FF2B5EF4-FFF2-40B4-BE49-F238E27FC236}">
-                <a16:creationId xmlns:a16="http://schemas.microsoft.com/office/drawing/2014/main" id="{2BC277D1-C78D-49EB-80C2-5ABC3B0053C4}"/>
-              </a:ext>
-            </a:extLst>
-          </p:cNvPr>
+            <a:endParaRPr lang="en-US" dirty="0"/>
+          </a:p>
+        </p:txBody>
+      </p:sp>
+      <p:sp>
+        <p:nvSpPr>
+          <p:cNvPr id="4" name="Date Placeholder 3"/>
           <p:cNvSpPr>
             <a:spLocks noGrp="1"/>
           </p:cNvSpPr>
@@ -913,7 +816,7 @@
           <a:p>
             <a:fld id="{07504AD1-F626-4EEE-A1F0-4F98A55EE3A4}" type="datetimeFigureOut">
               <a:rPr lang="ru-RU" smtClean="0"/>
-              <a:t>17.01.2022</a:t>
+              <a:t>19.01.2022</a:t>
             </a:fld>
             <a:endParaRPr lang="ru-RU"/>
           </a:p>
@@ -921,13 +824,7 @@
       </p:sp>
       <p:sp>
         <p:nvSpPr>
-          <p:cNvPr id="5" name="Нижний колонтитул 4">
-            <a:extLst>
-              <a:ext uri="{FF2B5EF4-FFF2-40B4-BE49-F238E27FC236}">
-                <a16:creationId xmlns:a16="http://schemas.microsoft.com/office/drawing/2014/main" id="{6CA98840-5522-457B-8FDE-32FE75E13E92}"/>
-              </a:ext>
-            </a:extLst>
-          </p:cNvPr>
+          <p:cNvPr id="5" name="Footer Placeholder 4"/>
           <p:cNvSpPr>
             <a:spLocks noGrp="1"/>
           </p:cNvSpPr>
@@ -946,13 +843,7 @@
       </p:sp>
       <p:sp>
         <p:nvSpPr>
-          <p:cNvPr id="6" name="Номер слайда 5">
-            <a:extLst>
-              <a:ext uri="{FF2B5EF4-FFF2-40B4-BE49-F238E27FC236}">
-                <a16:creationId xmlns:a16="http://schemas.microsoft.com/office/drawing/2014/main" id="{88B664D5-C91C-4754-86AE-F093B2DE804D}"/>
-              </a:ext>
-            </a:extLst>
-          </p:cNvPr>
+          <p:cNvPr id="6" name="Slide Number Placeholder 5"/>
           <p:cNvSpPr>
             <a:spLocks noGrp="1"/>
           </p:cNvSpPr>
@@ -976,7 +867,7 @@
     </p:spTree>
     <p:extLst>
       <p:ext uri="{BB962C8B-B14F-4D97-AF65-F5344CB8AC3E}">
-        <p14:creationId xmlns:p14="http://schemas.microsoft.com/office/powerpoint/2010/main" val="2813526867"/>
+        <p14:creationId xmlns:p14="http://schemas.microsoft.com/office/powerpoint/2010/main" val="83571294"/>
       </p:ext>
     </p:extLst>
   </p:cSld>
@@ -1005,13 +896,7 @@
       </p:grpSpPr>
       <p:sp>
         <p:nvSpPr>
-          <p:cNvPr id="2" name="Заголовок 1">
-            <a:extLst>
-              <a:ext uri="{FF2B5EF4-FFF2-40B4-BE49-F238E27FC236}">
-                <a16:creationId xmlns:a16="http://schemas.microsoft.com/office/drawing/2014/main" id="{149B79DD-87D2-4280-96C4-21EADBA2CABA}"/>
-              </a:ext>
-            </a:extLst>
-          </p:cNvPr>
+          <p:cNvPr id="2" name="Title 1"/>
           <p:cNvSpPr>
             <a:spLocks noGrp="1"/>
           </p:cNvSpPr>
@@ -1021,34 +906,29 @@
         </p:nvSpPr>
         <p:spPr>
           <a:xfrm>
-            <a:off x="831850" y="1709738"/>
-            <a:ext cx="10515600" cy="2852737"/>
+            <a:off x="835099" y="1705385"/>
+            <a:ext cx="10556677" cy="2845473"/>
           </a:xfrm>
         </p:spPr>
         <p:txBody>
           <a:bodyPr anchor="b"/>
           <a:lstStyle>
             <a:lvl1pPr>
-              <a:defRPr sz="6000"/>
+              <a:defRPr sz="5985"/>
             </a:lvl1pPr>
           </a:lstStyle>
           <a:p>
             <a:r>
-              <a:rPr lang="ru-RU"/>
+              <a:rPr lang="ru-RU" smtClean="0"/>
               <a:t>Образец заголовка</a:t>
             </a:r>
-          </a:p>
-        </p:txBody>
-      </p:sp>
-      <p:sp>
-        <p:nvSpPr>
-          <p:cNvPr id="3" name="Текст 2">
-            <a:extLst>
-              <a:ext uri="{FF2B5EF4-FFF2-40B4-BE49-F238E27FC236}">
-                <a16:creationId xmlns:a16="http://schemas.microsoft.com/office/drawing/2014/main" id="{9457EB47-B122-49E4-8EF1-86366C7B684F}"/>
-              </a:ext>
-            </a:extLst>
-          </p:cNvPr>
+            <a:endParaRPr lang="en-US" dirty="0"/>
+          </a:p>
+        </p:txBody>
+      </p:sp>
+      <p:sp>
+        <p:nvSpPr>
+          <p:cNvPr id="3" name="Text Placeholder 2"/>
           <p:cNvSpPr>
             <a:spLocks noGrp="1"/>
           </p:cNvSpPr>
@@ -1058,8 +938,8 @@
         </p:nvSpPr>
         <p:spPr>
           <a:xfrm>
-            <a:off x="831850" y="4589463"/>
-            <a:ext cx="10515600" cy="1500187"/>
+            <a:off x="835099" y="4577778"/>
+            <a:ext cx="10556677" cy="1496367"/>
           </a:xfrm>
         </p:spPr>
         <p:txBody>
@@ -1067,7 +947,7 @@
           <a:lstStyle>
             <a:lvl1pPr marL="0" indent="0">
               <a:buNone/>
-              <a:defRPr sz="2400">
+              <a:defRPr sz="2394">
                 <a:solidFill>
                   <a:schemeClr val="tx1">
                     <a:tint val="75000"/>
@@ -1075,9 +955,9 @@
                 </a:solidFill>
               </a:defRPr>
             </a:lvl1pPr>
-            <a:lvl2pPr marL="457200" indent="0">
-              <a:buNone/>
-              <a:defRPr sz="2000">
+            <a:lvl2pPr marL="456057" indent="0">
+              <a:buNone/>
+              <a:defRPr sz="1995">
                 <a:solidFill>
                   <a:schemeClr val="tx1">
                     <a:tint val="75000"/>
@@ -1085,9 +965,9 @@
                 </a:solidFill>
               </a:defRPr>
             </a:lvl2pPr>
-            <a:lvl3pPr marL="914400" indent="0">
-              <a:buNone/>
-              <a:defRPr sz="1800">
+            <a:lvl3pPr marL="912114" indent="0">
+              <a:buNone/>
+              <a:defRPr sz="1795">
                 <a:solidFill>
                   <a:schemeClr val="tx1">
                     <a:tint val="75000"/>
@@ -1095,9 +975,9 @@
                 </a:solidFill>
               </a:defRPr>
             </a:lvl3pPr>
-            <a:lvl4pPr marL="1371600" indent="0">
-              <a:buNone/>
-              <a:defRPr sz="1600">
+            <a:lvl4pPr marL="1368171" indent="0">
+              <a:buNone/>
+              <a:defRPr sz="1596">
                 <a:solidFill>
                   <a:schemeClr val="tx1">
                     <a:tint val="75000"/>
@@ -1105,9 +985,9 @@
                 </a:solidFill>
               </a:defRPr>
             </a:lvl4pPr>
-            <a:lvl5pPr marL="1828800" indent="0">
-              <a:buNone/>
-              <a:defRPr sz="1600">
+            <a:lvl5pPr marL="1824228" indent="0">
+              <a:buNone/>
+              <a:defRPr sz="1596">
                 <a:solidFill>
                   <a:schemeClr val="tx1">
                     <a:tint val="75000"/>
@@ -1115,9 +995,9 @@
                 </a:solidFill>
               </a:defRPr>
             </a:lvl5pPr>
-            <a:lvl6pPr marL="2286000" indent="0">
-              <a:buNone/>
-              <a:defRPr sz="1600">
+            <a:lvl6pPr marL="2280285" indent="0">
+              <a:buNone/>
+              <a:defRPr sz="1596">
                 <a:solidFill>
                   <a:schemeClr val="tx1">
                     <a:tint val="75000"/>
@@ -1125,9 +1005,9 @@
                 </a:solidFill>
               </a:defRPr>
             </a:lvl6pPr>
-            <a:lvl7pPr marL="2743200" indent="0">
-              <a:buNone/>
-              <a:defRPr sz="1600">
+            <a:lvl7pPr marL="2736342" indent="0">
+              <a:buNone/>
+              <a:defRPr sz="1596">
                 <a:solidFill>
                   <a:schemeClr val="tx1">
                     <a:tint val="75000"/>
@@ -1135,9 +1015,9 @@
                 </a:solidFill>
               </a:defRPr>
             </a:lvl7pPr>
-            <a:lvl8pPr marL="3200400" indent="0">
-              <a:buNone/>
-              <a:defRPr sz="1600">
+            <a:lvl8pPr marL="3192399" indent="0">
+              <a:buNone/>
+              <a:defRPr sz="1596">
                 <a:solidFill>
                   <a:schemeClr val="tx1">
                     <a:tint val="75000"/>
@@ -1145,9 +1025,9 @@
                 </a:solidFill>
               </a:defRPr>
             </a:lvl8pPr>
-            <a:lvl9pPr marL="3657600" indent="0">
-              <a:buNone/>
-              <a:defRPr sz="1600">
+            <a:lvl9pPr marL="3648456" indent="0">
+              <a:buNone/>
+              <a:defRPr sz="1596">
                 <a:solidFill>
                   <a:schemeClr val="tx1">
                     <a:tint val="75000"/>
@@ -1159,7 +1039,7 @@
           <a:p>
             <a:pPr lvl="0"/>
             <a:r>
-              <a:rPr lang="ru-RU"/>
+              <a:rPr lang="ru-RU" smtClean="0"/>
               <a:t>Образец текста</a:t>
             </a:r>
           </a:p>
@@ -1167,13 +1047,7 @@
       </p:sp>
       <p:sp>
         <p:nvSpPr>
-          <p:cNvPr id="4" name="Дата 3">
-            <a:extLst>
-              <a:ext uri="{FF2B5EF4-FFF2-40B4-BE49-F238E27FC236}">
-                <a16:creationId xmlns:a16="http://schemas.microsoft.com/office/drawing/2014/main" id="{D8A05F85-E7A3-4F87-93B9-CDCF86742D9F}"/>
-              </a:ext>
-            </a:extLst>
-          </p:cNvPr>
+          <p:cNvPr id="4" name="Date Placeholder 3"/>
           <p:cNvSpPr>
             <a:spLocks noGrp="1"/>
           </p:cNvSpPr>
@@ -1188,7 +1062,7 @@
           <a:p>
             <a:fld id="{07504AD1-F626-4EEE-A1F0-4F98A55EE3A4}" type="datetimeFigureOut">
               <a:rPr lang="ru-RU" smtClean="0"/>
-              <a:t>17.01.2022</a:t>
+              <a:t>19.01.2022</a:t>
             </a:fld>
             <a:endParaRPr lang="ru-RU"/>
           </a:p>
@@ -1196,13 +1070,7 @@
       </p:sp>
       <p:sp>
         <p:nvSpPr>
-          <p:cNvPr id="5" name="Нижний колонтитул 4">
-            <a:extLst>
-              <a:ext uri="{FF2B5EF4-FFF2-40B4-BE49-F238E27FC236}">
-                <a16:creationId xmlns:a16="http://schemas.microsoft.com/office/drawing/2014/main" id="{9DCA5328-57FC-4BEF-BC2C-780D9504E928}"/>
-              </a:ext>
-            </a:extLst>
-          </p:cNvPr>
+          <p:cNvPr id="5" name="Footer Placeholder 4"/>
           <p:cNvSpPr>
             <a:spLocks noGrp="1"/>
           </p:cNvSpPr>
@@ -1221,13 +1089,7 @@
       </p:sp>
       <p:sp>
         <p:nvSpPr>
-          <p:cNvPr id="6" name="Номер слайда 5">
-            <a:extLst>
-              <a:ext uri="{FF2B5EF4-FFF2-40B4-BE49-F238E27FC236}">
-                <a16:creationId xmlns:a16="http://schemas.microsoft.com/office/drawing/2014/main" id="{C9ADF8F0-2982-4801-AC3D-663A81921830}"/>
-              </a:ext>
-            </a:extLst>
-          </p:cNvPr>
+          <p:cNvPr id="6" name="Slide Number Placeholder 5"/>
           <p:cNvSpPr>
             <a:spLocks noGrp="1"/>
           </p:cNvSpPr>
@@ -1251,7 +1113,7 @@
     </p:spTree>
     <p:extLst>
       <p:ext uri="{BB962C8B-B14F-4D97-AF65-F5344CB8AC3E}">
-        <p14:creationId xmlns:p14="http://schemas.microsoft.com/office/powerpoint/2010/main" val="3992575180"/>
+        <p14:creationId xmlns:p14="http://schemas.microsoft.com/office/powerpoint/2010/main" val="4171360727"/>
       </p:ext>
     </p:extLst>
   </p:cSld>
@@ -1280,13 +1142,7 @@
       </p:grpSpPr>
       <p:sp>
         <p:nvSpPr>
-          <p:cNvPr id="2" name="Заголовок 1">
-            <a:extLst>
-              <a:ext uri="{FF2B5EF4-FFF2-40B4-BE49-F238E27FC236}">
-                <a16:creationId xmlns:a16="http://schemas.microsoft.com/office/drawing/2014/main" id="{A95BEEEF-EC88-487D-9817-072EFEBE1526}"/>
-              </a:ext>
-            </a:extLst>
-          </p:cNvPr>
+          <p:cNvPr id="2" name="Title 1"/>
           <p:cNvSpPr>
             <a:spLocks noGrp="1"/>
           </p:cNvSpPr>
@@ -1300,21 +1156,16 @@
           <a:lstStyle/>
           <a:p>
             <a:r>
-              <a:rPr lang="ru-RU"/>
+              <a:rPr lang="ru-RU" smtClean="0"/>
               <a:t>Образец заголовка</a:t>
             </a:r>
-          </a:p>
-        </p:txBody>
-      </p:sp>
-      <p:sp>
-        <p:nvSpPr>
-          <p:cNvPr id="3" name="Объект 2">
-            <a:extLst>
-              <a:ext uri="{FF2B5EF4-FFF2-40B4-BE49-F238E27FC236}">
-                <a16:creationId xmlns:a16="http://schemas.microsoft.com/office/drawing/2014/main" id="{FB489B55-F7A2-4407-AE64-2872B75748FE}"/>
-              </a:ext>
-            </a:extLst>
-          </p:cNvPr>
+            <a:endParaRPr lang="en-US" dirty="0"/>
+          </a:p>
+        </p:txBody>
+      </p:sp>
+      <p:sp>
+        <p:nvSpPr>
+          <p:cNvPr id="3" name="Content Placeholder 2"/>
           <p:cNvSpPr>
             <a:spLocks noGrp="1"/>
           </p:cNvSpPr>
@@ -1324,8 +1175,8 @@
         </p:nvSpPr>
         <p:spPr>
           <a:xfrm>
-            <a:off x="838200" y="1825625"/>
-            <a:ext cx="5181600" cy="4351338"/>
+            <a:off x="841474" y="1820976"/>
+            <a:ext cx="5201841" cy="4340259"/>
           </a:xfrm>
         </p:spPr>
         <p:txBody>
@@ -1334,49 +1185,44 @@
           <a:p>
             <a:pPr lvl="0"/>
             <a:r>
-              <a:rPr lang="ru-RU"/>
+              <a:rPr lang="ru-RU" smtClean="0"/>
               <a:t>Образец текста</a:t>
             </a:r>
           </a:p>
           <a:p>
             <a:pPr lvl="1"/>
             <a:r>
-              <a:rPr lang="ru-RU"/>
+              <a:rPr lang="ru-RU" smtClean="0"/>
               <a:t>Второй уровень</a:t>
             </a:r>
           </a:p>
           <a:p>
             <a:pPr lvl="2"/>
             <a:r>
-              <a:rPr lang="ru-RU"/>
+              <a:rPr lang="ru-RU" smtClean="0"/>
               <a:t>Третий уровень</a:t>
             </a:r>
           </a:p>
           <a:p>
             <a:pPr lvl="3"/>
             <a:r>
-              <a:rPr lang="ru-RU"/>
+              <a:rPr lang="ru-RU" smtClean="0"/>
               <a:t>Четвертый уровень</a:t>
             </a:r>
           </a:p>
           <a:p>
             <a:pPr lvl="4"/>
             <a:r>
-              <a:rPr lang="ru-RU"/>
+              <a:rPr lang="ru-RU" smtClean="0"/>
               <a:t>Пятый уровень</a:t>
             </a:r>
-          </a:p>
-        </p:txBody>
-      </p:sp>
-      <p:sp>
-        <p:nvSpPr>
-          <p:cNvPr id="4" name="Объект 3">
-            <a:extLst>
-              <a:ext uri="{FF2B5EF4-FFF2-40B4-BE49-F238E27FC236}">
-                <a16:creationId xmlns:a16="http://schemas.microsoft.com/office/drawing/2014/main" id="{1B0F9C55-A5A4-4294-80F9-37196EC5AD03}"/>
-              </a:ext>
-            </a:extLst>
-          </p:cNvPr>
+            <a:endParaRPr lang="en-US" dirty="0"/>
+          </a:p>
+        </p:txBody>
+      </p:sp>
+      <p:sp>
+        <p:nvSpPr>
+          <p:cNvPr id="4" name="Content Placeholder 3"/>
           <p:cNvSpPr>
             <a:spLocks noGrp="1"/>
           </p:cNvSpPr>
@@ -1386,8 +1232,8 @@
         </p:nvSpPr>
         <p:spPr>
           <a:xfrm>
-            <a:off x="6172200" y="1825625"/>
-            <a:ext cx="5181600" cy="4351338"/>
+            <a:off x="6196310" y="1820976"/>
+            <a:ext cx="5201841" cy="4340259"/>
           </a:xfrm>
         </p:spPr>
         <p:txBody>
@@ -1396,49 +1242,44 @@
           <a:p>
             <a:pPr lvl="0"/>
             <a:r>
-              <a:rPr lang="ru-RU"/>
+              <a:rPr lang="ru-RU" smtClean="0"/>
               <a:t>Образец текста</a:t>
             </a:r>
           </a:p>
           <a:p>
             <a:pPr lvl="1"/>
             <a:r>
-              <a:rPr lang="ru-RU"/>
+              <a:rPr lang="ru-RU" smtClean="0"/>
               <a:t>Второй уровень</a:t>
             </a:r>
           </a:p>
           <a:p>
             <a:pPr lvl="2"/>
             <a:r>
-              <a:rPr lang="ru-RU"/>
+              <a:rPr lang="ru-RU" smtClean="0"/>
               <a:t>Третий уровень</a:t>
             </a:r>
           </a:p>
           <a:p>
             <a:pPr lvl="3"/>
             <a:r>
-              <a:rPr lang="ru-RU"/>
+              <a:rPr lang="ru-RU" smtClean="0"/>
               <a:t>Четвертый уровень</a:t>
             </a:r>
           </a:p>
           <a:p>
             <a:pPr lvl="4"/>
             <a:r>
-              <a:rPr lang="ru-RU"/>
+              <a:rPr lang="ru-RU" smtClean="0"/>
               <a:t>Пятый уровень</a:t>
             </a:r>
-          </a:p>
-        </p:txBody>
-      </p:sp>
-      <p:sp>
-        <p:nvSpPr>
-          <p:cNvPr id="5" name="Дата 4">
-            <a:extLst>
-              <a:ext uri="{FF2B5EF4-FFF2-40B4-BE49-F238E27FC236}">
-                <a16:creationId xmlns:a16="http://schemas.microsoft.com/office/drawing/2014/main" id="{1A6A0EAE-91CA-4A0C-97EE-0A05F007823D}"/>
-              </a:ext>
-            </a:extLst>
-          </p:cNvPr>
+            <a:endParaRPr lang="en-US" dirty="0"/>
+          </a:p>
+        </p:txBody>
+      </p:sp>
+      <p:sp>
+        <p:nvSpPr>
+          <p:cNvPr id="5" name="Date Placeholder 4"/>
           <p:cNvSpPr>
             <a:spLocks noGrp="1"/>
           </p:cNvSpPr>
@@ -1453,7 +1294,7 @@
           <a:p>
             <a:fld id="{07504AD1-F626-4EEE-A1F0-4F98A55EE3A4}" type="datetimeFigureOut">
               <a:rPr lang="ru-RU" smtClean="0"/>
-              <a:t>17.01.2022</a:t>
+              <a:t>19.01.2022</a:t>
             </a:fld>
             <a:endParaRPr lang="ru-RU"/>
           </a:p>
@@ -1461,13 +1302,7 @@
       </p:sp>
       <p:sp>
         <p:nvSpPr>
-          <p:cNvPr id="6" name="Нижний колонтитул 5">
-            <a:extLst>
-              <a:ext uri="{FF2B5EF4-FFF2-40B4-BE49-F238E27FC236}">
-                <a16:creationId xmlns:a16="http://schemas.microsoft.com/office/drawing/2014/main" id="{4E85005B-78B9-4717-AA53-12BB49AD5BF8}"/>
-              </a:ext>
-            </a:extLst>
-          </p:cNvPr>
+          <p:cNvPr id="6" name="Footer Placeholder 5"/>
           <p:cNvSpPr>
             <a:spLocks noGrp="1"/>
           </p:cNvSpPr>
@@ -1486,13 +1321,7 @@
       </p:sp>
       <p:sp>
         <p:nvSpPr>
-          <p:cNvPr id="7" name="Номер слайда 6">
-            <a:extLst>
-              <a:ext uri="{FF2B5EF4-FFF2-40B4-BE49-F238E27FC236}">
-                <a16:creationId xmlns:a16="http://schemas.microsoft.com/office/drawing/2014/main" id="{04E960D4-3D3E-40E3-B1AB-7F037B1829E8}"/>
-              </a:ext>
-            </a:extLst>
-          </p:cNvPr>
+          <p:cNvPr id="7" name="Slide Number Placeholder 6"/>
           <p:cNvSpPr>
             <a:spLocks noGrp="1"/>
           </p:cNvSpPr>
@@ -1516,7 +1345,7 @@
     </p:spTree>
     <p:extLst>
       <p:ext uri="{BB962C8B-B14F-4D97-AF65-F5344CB8AC3E}">
-        <p14:creationId xmlns:p14="http://schemas.microsoft.com/office/powerpoint/2010/main" val="358126237"/>
+        <p14:creationId xmlns:p14="http://schemas.microsoft.com/office/powerpoint/2010/main" val="1838729053"/>
       </p:ext>
     </p:extLst>
   </p:cSld>
@@ -1545,13 +1374,7 @@
       </p:grpSpPr>
       <p:sp>
         <p:nvSpPr>
-          <p:cNvPr id="2" name="Заголовок 1">
-            <a:extLst>
-              <a:ext uri="{FF2B5EF4-FFF2-40B4-BE49-F238E27FC236}">
-                <a16:creationId xmlns:a16="http://schemas.microsoft.com/office/drawing/2014/main" id="{8D8FDB71-C4CD-4B0E-A4EA-C7B1403AF289}"/>
-              </a:ext>
-            </a:extLst>
-          </p:cNvPr>
+          <p:cNvPr id="2" name="Title 1"/>
           <p:cNvSpPr>
             <a:spLocks noGrp="1"/>
           </p:cNvSpPr>
@@ -1561,8 +1384,8 @@
         </p:nvSpPr>
         <p:spPr>
           <a:xfrm>
-            <a:off x="839788" y="365125"/>
-            <a:ext cx="10515600" cy="1325563"/>
+            <a:off x="843068" y="364196"/>
+            <a:ext cx="10556677" cy="1322188"/>
           </a:xfrm>
         </p:spPr>
         <p:txBody>
@@ -1570,21 +1393,16 @@
           <a:lstStyle/>
           <a:p>
             <a:r>
-              <a:rPr lang="ru-RU"/>
+              <a:rPr lang="ru-RU" smtClean="0"/>
               <a:t>Образец заголовка</a:t>
             </a:r>
-          </a:p>
-        </p:txBody>
-      </p:sp>
-      <p:sp>
-        <p:nvSpPr>
-          <p:cNvPr id="3" name="Текст 2">
-            <a:extLst>
-              <a:ext uri="{FF2B5EF4-FFF2-40B4-BE49-F238E27FC236}">
-                <a16:creationId xmlns:a16="http://schemas.microsoft.com/office/drawing/2014/main" id="{26B6E010-00D0-48B9-9197-60B4E1B15E2F}"/>
-              </a:ext>
-            </a:extLst>
-          </p:cNvPr>
+            <a:endParaRPr lang="en-US" dirty="0"/>
+          </a:p>
+        </p:txBody>
+      </p:sp>
+      <p:sp>
+        <p:nvSpPr>
+          <p:cNvPr id="3" name="Text Placeholder 2"/>
           <p:cNvSpPr>
             <a:spLocks noGrp="1"/>
           </p:cNvSpPr>
@@ -1594,8 +1412,8 @@
         </p:nvSpPr>
         <p:spPr>
           <a:xfrm>
-            <a:off x="839788" y="1681163"/>
-            <a:ext cx="5157787" cy="823912"/>
+            <a:off x="843069" y="1676882"/>
+            <a:ext cx="5177935" cy="821814"/>
           </a:xfrm>
         </p:spPr>
         <p:txBody>
@@ -1603,45 +1421,45 @@
           <a:lstStyle>
             <a:lvl1pPr marL="0" indent="0">
               <a:buNone/>
-              <a:defRPr sz="2400" b="1"/>
+              <a:defRPr sz="2394" b="1"/>
             </a:lvl1pPr>
-            <a:lvl2pPr marL="457200" indent="0">
-              <a:buNone/>
-              <a:defRPr sz="2000" b="1"/>
+            <a:lvl2pPr marL="456057" indent="0">
+              <a:buNone/>
+              <a:defRPr sz="1995" b="1"/>
             </a:lvl2pPr>
-            <a:lvl3pPr marL="914400" indent="0">
-              <a:buNone/>
-              <a:defRPr sz="1800" b="1"/>
+            <a:lvl3pPr marL="912114" indent="0">
+              <a:buNone/>
+              <a:defRPr sz="1795" b="1"/>
             </a:lvl3pPr>
-            <a:lvl4pPr marL="1371600" indent="0">
-              <a:buNone/>
-              <a:defRPr sz="1600" b="1"/>
+            <a:lvl4pPr marL="1368171" indent="0">
+              <a:buNone/>
+              <a:defRPr sz="1596" b="1"/>
             </a:lvl4pPr>
-            <a:lvl5pPr marL="1828800" indent="0">
-              <a:buNone/>
-              <a:defRPr sz="1600" b="1"/>
+            <a:lvl5pPr marL="1824228" indent="0">
+              <a:buNone/>
+              <a:defRPr sz="1596" b="1"/>
             </a:lvl5pPr>
-            <a:lvl6pPr marL="2286000" indent="0">
-              <a:buNone/>
-              <a:defRPr sz="1600" b="1"/>
+            <a:lvl6pPr marL="2280285" indent="0">
+              <a:buNone/>
+              <a:defRPr sz="1596" b="1"/>
             </a:lvl6pPr>
-            <a:lvl7pPr marL="2743200" indent="0">
-              <a:buNone/>
-              <a:defRPr sz="1600" b="1"/>
+            <a:lvl7pPr marL="2736342" indent="0">
+              <a:buNone/>
+              <a:defRPr sz="1596" b="1"/>
             </a:lvl7pPr>
-            <a:lvl8pPr marL="3200400" indent="0">
-              <a:buNone/>
-              <a:defRPr sz="1600" b="1"/>
+            <a:lvl8pPr marL="3192399" indent="0">
+              <a:buNone/>
+              <a:defRPr sz="1596" b="1"/>
             </a:lvl8pPr>
-            <a:lvl9pPr marL="3657600" indent="0">
-              <a:buNone/>
-              <a:defRPr sz="1600" b="1"/>
+            <a:lvl9pPr marL="3648456" indent="0">
+              <a:buNone/>
+              <a:defRPr sz="1596" b="1"/>
             </a:lvl9pPr>
           </a:lstStyle>
           <a:p>
             <a:pPr lvl="0"/>
             <a:r>
-              <a:rPr lang="ru-RU"/>
+              <a:rPr lang="ru-RU" smtClean="0"/>
               <a:t>Образец текста</a:t>
             </a:r>
           </a:p>
@@ -1649,13 +1467,7 @@
       </p:sp>
       <p:sp>
         <p:nvSpPr>
-          <p:cNvPr id="4" name="Объект 3">
-            <a:extLst>
-              <a:ext uri="{FF2B5EF4-FFF2-40B4-BE49-F238E27FC236}">
-                <a16:creationId xmlns:a16="http://schemas.microsoft.com/office/drawing/2014/main" id="{69ED64FD-DE34-4C10-AA29-27CBFB85F8E7}"/>
-              </a:ext>
-            </a:extLst>
-          </p:cNvPr>
+          <p:cNvPr id="4" name="Content Placeholder 3"/>
           <p:cNvSpPr>
             <a:spLocks noGrp="1"/>
           </p:cNvSpPr>
@@ -1665,8 +1477,8 @@
         </p:nvSpPr>
         <p:spPr>
           <a:xfrm>
-            <a:off x="839788" y="2505075"/>
-            <a:ext cx="5157787" cy="3684588"/>
+            <a:off x="843069" y="2498697"/>
+            <a:ext cx="5177935" cy="3675206"/>
           </a:xfrm>
         </p:spPr>
         <p:txBody>
@@ -1675,49 +1487,44 @@
           <a:p>
             <a:pPr lvl="0"/>
             <a:r>
-              <a:rPr lang="ru-RU"/>
+              <a:rPr lang="ru-RU" smtClean="0"/>
               <a:t>Образец текста</a:t>
             </a:r>
           </a:p>
           <a:p>
             <a:pPr lvl="1"/>
             <a:r>
-              <a:rPr lang="ru-RU"/>
+              <a:rPr lang="ru-RU" smtClean="0"/>
               <a:t>Второй уровень</a:t>
             </a:r>
           </a:p>
           <a:p>
             <a:pPr lvl="2"/>
             <a:r>
-              <a:rPr lang="ru-RU"/>
+              <a:rPr lang="ru-RU" smtClean="0"/>
               <a:t>Третий уровень</a:t>
             </a:r>
           </a:p>
           <a:p>
             <a:pPr lvl="3"/>
             <a:r>
-              <a:rPr lang="ru-RU"/>
+              <a:rPr lang="ru-RU" smtClean="0"/>
               <a:t>Четвертый уровень</a:t>
             </a:r>
           </a:p>
           <a:p>
             <a:pPr lvl="4"/>
             <a:r>
-              <a:rPr lang="ru-RU"/>
+              <a:rPr lang="ru-RU" smtClean="0"/>
               <a:t>Пятый уровень</a:t>
             </a:r>
-          </a:p>
-        </p:txBody>
-      </p:sp>
-      <p:sp>
-        <p:nvSpPr>
-          <p:cNvPr id="5" name="Текст 4">
-            <a:extLst>
-              <a:ext uri="{FF2B5EF4-FFF2-40B4-BE49-F238E27FC236}">
-                <a16:creationId xmlns:a16="http://schemas.microsoft.com/office/drawing/2014/main" id="{28D17947-2FE4-4CDF-A8EE-E9F766B51492}"/>
-              </a:ext>
-            </a:extLst>
-          </p:cNvPr>
+            <a:endParaRPr lang="en-US" dirty="0"/>
+          </a:p>
+        </p:txBody>
+      </p:sp>
+      <p:sp>
+        <p:nvSpPr>
+          <p:cNvPr id="5" name="Text Placeholder 4"/>
           <p:cNvSpPr>
             <a:spLocks noGrp="1"/>
           </p:cNvSpPr>
@@ -1727,8 +1534,8 @@
         </p:nvSpPr>
         <p:spPr>
           <a:xfrm>
-            <a:off x="6172200" y="1681163"/>
-            <a:ext cx="5183188" cy="823912"/>
+            <a:off x="6196310" y="1676882"/>
+            <a:ext cx="5203435" cy="821814"/>
           </a:xfrm>
         </p:spPr>
         <p:txBody>
@@ -1736,45 +1543,45 @@
           <a:lstStyle>
             <a:lvl1pPr marL="0" indent="0">
               <a:buNone/>
-              <a:defRPr sz="2400" b="1"/>
+              <a:defRPr sz="2394" b="1"/>
             </a:lvl1pPr>
-            <a:lvl2pPr marL="457200" indent="0">
-              <a:buNone/>
-              <a:defRPr sz="2000" b="1"/>
+            <a:lvl2pPr marL="456057" indent="0">
+              <a:buNone/>
+              <a:defRPr sz="1995" b="1"/>
             </a:lvl2pPr>
-            <a:lvl3pPr marL="914400" indent="0">
-              <a:buNone/>
-              <a:defRPr sz="1800" b="1"/>
+            <a:lvl3pPr marL="912114" indent="0">
+              <a:buNone/>
+              <a:defRPr sz="1795" b="1"/>
             </a:lvl3pPr>
-            <a:lvl4pPr marL="1371600" indent="0">
-              <a:buNone/>
-              <a:defRPr sz="1600" b="1"/>
+            <a:lvl4pPr marL="1368171" indent="0">
+              <a:buNone/>
+              <a:defRPr sz="1596" b="1"/>
             </a:lvl4pPr>
-            <a:lvl5pPr marL="1828800" indent="0">
-              <a:buNone/>
-              <a:defRPr sz="1600" b="1"/>
+            <a:lvl5pPr marL="1824228" indent="0">
+              <a:buNone/>
+              <a:defRPr sz="1596" b="1"/>
             </a:lvl5pPr>
-            <a:lvl6pPr marL="2286000" indent="0">
-              <a:buNone/>
-              <a:defRPr sz="1600" b="1"/>
+            <a:lvl6pPr marL="2280285" indent="0">
+              <a:buNone/>
+              <a:defRPr sz="1596" b="1"/>
             </a:lvl6pPr>
-            <a:lvl7pPr marL="2743200" indent="0">
-              <a:buNone/>
-              <a:defRPr sz="1600" b="1"/>
+            <a:lvl7pPr marL="2736342" indent="0">
+              <a:buNone/>
+              <a:defRPr sz="1596" b="1"/>
             </a:lvl7pPr>
-            <a:lvl8pPr marL="3200400" indent="0">
-              <a:buNone/>
-              <a:defRPr sz="1600" b="1"/>
+            <a:lvl8pPr marL="3192399" indent="0">
+              <a:buNone/>
+              <a:defRPr sz="1596" b="1"/>
             </a:lvl8pPr>
-            <a:lvl9pPr marL="3657600" indent="0">
-              <a:buNone/>
-              <a:defRPr sz="1600" b="1"/>
+            <a:lvl9pPr marL="3648456" indent="0">
+              <a:buNone/>
+              <a:defRPr sz="1596" b="1"/>
             </a:lvl9pPr>
           </a:lstStyle>
           <a:p>
             <a:pPr lvl="0"/>
             <a:r>
-              <a:rPr lang="ru-RU"/>
+              <a:rPr lang="ru-RU" smtClean="0"/>
               <a:t>Образец текста</a:t>
             </a:r>
           </a:p>
@@ -1782,13 +1589,7 @@
       </p:sp>
       <p:sp>
         <p:nvSpPr>
-          <p:cNvPr id="6" name="Объект 5">
-            <a:extLst>
-              <a:ext uri="{FF2B5EF4-FFF2-40B4-BE49-F238E27FC236}">
-                <a16:creationId xmlns:a16="http://schemas.microsoft.com/office/drawing/2014/main" id="{49977366-A737-486A-AFA7-0FFE5D2683B5}"/>
-              </a:ext>
-            </a:extLst>
-          </p:cNvPr>
+          <p:cNvPr id="6" name="Content Placeholder 5"/>
           <p:cNvSpPr>
             <a:spLocks noGrp="1"/>
           </p:cNvSpPr>
@@ -1798,8 +1599,8 @@
         </p:nvSpPr>
         <p:spPr>
           <a:xfrm>
-            <a:off x="6172200" y="2505075"/>
-            <a:ext cx="5183188" cy="3684588"/>
+            <a:off x="6196310" y="2498697"/>
+            <a:ext cx="5203435" cy="3675206"/>
           </a:xfrm>
         </p:spPr>
         <p:txBody>
@@ -1808,49 +1609,44 @@
           <a:p>
             <a:pPr lvl="0"/>
             <a:r>
-              <a:rPr lang="ru-RU"/>
+              <a:rPr lang="ru-RU" smtClean="0"/>
               <a:t>Образец текста</a:t>
             </a:r>
           </a:p>
           <a:p>
             <a:pPr lvl="1"/>
             <a:r>
-              <a:rPr lang="ru-RU"/>
+              <a:rPr lang="ru-RU" smtClean="0"/>
               <a:t>Второй уровень</a:t>
             </a:r>
           </a:p>
           <a:p>
             <a:pPr lvl="2"/>
             <a:r>
-              <a:rPr lang="ru-RU"/>
+              <a:rPr lang="ru-RU" smtClean="0"/>
               <a:t>Третий уровень</a:t>
             </a:r>
           </a:p>
           <a:p>
             <a:pPr lvl="3"/>
             <a:r>
-              <a:rPr lang="ru-RU"/>
+              <a:rPr lang="ru-RU" smtClean="0"/>
               <a:t>Четвертый уровень</a:t>
             </a:r>
           </a:p>
           <a:p>
             <a:pPr lvl="4"/>
             <a:r>
-              <a:rPr lang="ru-RU"/>
+              <a:rPr lang="ru-RU" smtClean="0"/>
               <a:t>Пятый уровень</a:t>
             </a:r>
-          </a:p>
-        </p:txBody>
-      </p:sp>
-      <p:sp>
-        <p:nvSpPr>
-          <p:cNvPr id="7" name="Дата 6">
-            <a:extLst>
-              <a:ext uri="{FF2B5EF4-FFF2-40B4-BE49-F238E27FC236}">
-                <a16:creationId xmlns:a16="http://schemas.microsoft.com/office/drawing/2014/main" id="{2C79C36D-5FA6-4095-97D5-0004325FC982}"/>
-              </a:ext>
-            </a:extLst>
-          </p:cNvPr>
+            <a:endParaRPr lang="en-US" dirty="0"/>
+          </a:p>
+        </p:txBody>
+      </p:sp>
+      <p:sp>
+        <p:nvSpPr>
+          <p:cNvPr id="7" name="Date Placeholder 6"/>
           <p:cNvSpPr>
             <a:spLocks noGrp="1"/>
           </p:cNvSpPr>
@@ -1865,7 +1661,7 @@
           <a:p>
             <a:fld id="{07504AD1-F626-4EEE-A1F0-4F98A55EE3A4}" type="datetimeFigureOut">
               <a:rPr lang="ru-RU" smtClean="0"/>
-              <a:t>17.01.2022</a:t>
+              <a:t>19.01.2022</a:t>
             </a:fld>
             <a:endParaRPr lang="ru-RU"/>
           </a:p>
@@ -1873,13 +1669,7 @@
       </p:sp>
       <p:sp>
         <p:nvSpPr>
-          <p:cNvPr id="8" name="Нижний колонтитул 7">
-            <a:extLst>
-              <a:ext uri="{FF2B5EF4-FFF2-40B4-BE49-F238E27FC236}">
-                <a16:creationId xmlns:a16="http://schemas.microsoft.com/office/drawing/2014/main" id="{ABE3C0B5-291F-449F-80BF-BBBF532857A5}"/>
-              </a:ext>
-            </a:extLst>
-          </p:cNvPr>
+          <p:cNvPr id="8" name="Footer Placeholder 7"/>
           <p:cNvSpPr>
             <a:spLocks noGrp="1"/>
           </p:cNvSpPr>
@@ -1898,13 +1688,7 @@
       </p:sp>
       <p:sp>
         <p:nvSpPr>
-          <p:cNvPr id="9" name="Номер слайда 8">
-            <a:extLst>
-              <a:ext uri="{FF2B5EF4-FFF2-40B4-BE49-F238E27FC236}">
-                <a16:creationId xmlns:a16="http://schemas.microsoft.com/office/drawing/2014/main" id="{C3A2AA35-1278-41D9-BAC2-F3F83DE9C94F}"/>
-              </a:ext>
-            </a:extLst>
-          </p:cNvPr>
+          <p:cNvPr id="9" name="Slide Number Placeholder 8"/>
           <p:cNvSpPr>
             <a:spLocks noGrp="1"/>
           </p:cNvSpPr>
@@ -1928,7 +1712,7 @@
     </p:spTree>
     <p:extLst>
       <p:ext uri="{BB962C8B-B14F-4D97-AF65-F5344CB8AC3E}">
-        <p14:creationId xmlns:p14="http://schemas.microsoft.com/office/powerpoint/2010/main" val="1919077105"/>
+        <p14:creationId xmlns:p14="http://schemas.microsoft.com/office/powerpoint/2010/main" val="1230440083"/>
       </p:ext>
     </p:extLst>
   </p:cSld>
@@ -1957,13 +1741,7 @@
       </p:grpSpPr>
       <p:sp>
         <p:nvSpPr>
-          <p:cNvPr id="2" name="Заголовок 1">
-            <a:extLst>
-              <a:ext uri="{FF2B5EF4-FFF2-40B4-BE49-F238E27FC236}">
-                <a16:creationId xmlns:a16="http://schemas.microsoft.com/office/drawing/2014/main" id="{B5114F3A-40BF-4FCF-AAB8-8CA0EFA02723}"/>
-              </a:ext>
-            </a:extLst>
-          </p:cNvPr>
+          <p:cNvPr id="2" name="Title 1"/>
           <p:cNvSpPr>
             <a:spLocks noGrp="1"/>
           </p:cNvSpPr>
@@ -1977,21 +1755,16 @@
           <a:lstStyle/>
           <a:p>
             <a:r>
-              <a:rPr lang="ru-RU"/>
+              <a:rPr lang="ru-RU" smtClean="0"/>
               <a:t>Образец заголовка</a:t>
             </a:r>
-          </a:p>
-        </p:txBody>
-      </p:sp>
-      <p:sp>
-        <p:nvSpPr>
-          <p:cNvPr id="3" name="Дата 2">
-            <a:extLst>
-              <a:ext uri="{FF2B5EF4-FFF2-40B4-BE49-F238E27FC236}">
-                <a16:creationId xmlns:a16="http://schemas.microsoft.com/office/drawing/2014/main" id="{CDE6ED5E-519A-425F-8B8A-415613CD4BBA}"/>
-              </a:ext>
-            </a:extLst>
-          </p:cNvPr>
+            <a:endParaRPr lang="en-US" dirty="0"/>
+          </a:p>
+        </p:txBody>
+      </p:sp>
+      <p:sp>
+        <p:nvSpPr>
+          <p:cNvPr id="3" name="Date Placeholder 2"/>
           <p:cNvSpPr>
             <a:spLocks noGrp="1"/>
           </p:cNvSpPr>
@@ -2006,7 +1779,7 @@
           <a:p>
             <a:fld id="{07504AD1-F626-4EEE-A1F0-4F98A55EE3A4}" type="datetimeFigureOut">
               <a:rPr lang="ru-RU" smtClean="0"/>
-              <a:t>17.01.2022</a:t>
+              <a:t>19.01.2022</a:t>
             </a:fld>
             <a:endParaRPr lang="ru-RU"/>
           </a:p>
@@ -2014,13 +1787,7 @@
       </p:sp>
       <p:sp>
         <p:nvSpPr>
-          <p:cNvPr id="4" name="Нижний колонтитул 3">
-            <a:extLst>
-              <a:ext uri="{FF2B5EF4-FFF2-40B4-BE49-F238E27FC236}">
-                <a16:creationId xmlns:a16="http://schemas.microsoft.com/office/drawing/2014/main" id="{70EFA7B3-EFBE-403B-9558-33F63AC37DA5}"/>
-              </a:ext>
-            </a:extLst>
-          </p:cNvPr>
+          <p:cNvPr id="4" name="Footer Placeholder 3"/>
           <p:cNvSpPr>
             <a:spLocks noGrp="1"/>
           </p:cNvSpPr>
@@ -2039,13 +1806,7 @@
       </p:sp>
       <p:sp>
         <p:nvSpPr>
-          <p:cNvPr id="5" name="Номер слайда 4">
-            <a:extLst>
-              <a:ext uri="{FF2B5EF4-FFF2-40B4-BE49-F238E27FC236}">
-                <a16:creationId xmlns:a16="http://schemas.microsoft.com/office/drawing/2014/main" id="{50B0B78F-D121-4266-8464-D6539B9F820B}"/>
-              </a:ext>
-            </a:extLst>
-          </p:cNvPr>
+          <p:cNvPr id="5" name="Slide Number Placeholder 4"/>
           <p:cNvSpPr>
             <a:spLocks noGrp="1"/>
           </p:cNvSpPr>
@@ -2069,7 +1830,7 @@
     </p:spTree>
     <p:extLst>
       <p:ext uri="{BB962C8B-B14F-4D97-AF65-F5344CB8AC3E}">
-        <p14:creationId xmlns:p14="http://schemas.microsoft.com/office/powerpoint/2010/main" val="109760821"/>
+        <p14:creationId xmlns:p14="http://schemas.microsoft.com/office/powerpoint/2010/main" val="2742492703"/>
       </p:ext>
     </p:extLst>
   </p:cSld>
@@ -2098,13 +1859,7 @@
       </p:grpSpPr>
       <p:sp>
         <p:nvSpPr>
-          <p:cNvPr id="2" name="Дата 1">
-            <a:extLst>
-              <a:ext uri="{FF2B5EF4-FFF2-40B4-BE49-F238E27FC236}">
-                <a16:creationId xmlns:a16="http://schemas.microsoft.com/office/drawing/2014/main" id="{2BB3A3A3-5D2D-4E5D-8927-8BB827FFEFFD}"/>
-              </a:ext>
-            </a:extLst>
-          </p:cNvPr>
+          <p:cNvPr id="2" name="Date Placeholder 1"/>
           <p:cNvSpPr>
             <a:spLocks noGrp="1"/>
           </p:cNvSpPr>
@@ -2119,7 +1874,7 @@
           <a:p>
             <a:fld id="{07504AD1-F626-4EEE-A1F0-4F98A55EE3A4}" type="datetimeFigureOut">
               <a:rPr lang="ru-RU" smtClean="0"/>
-              <a:t>17.01.2022</a:t>
+              <a:t>19.01.2022</a:t>
             </a:fld>
             <a:endParaRPr lang="ru-RU"/>
           </a:p>
@@ -2127,13 +1882,7 @@
       </p:sp>
       <p:sp>
         <p:nvSpPr>
-          <p:cNvPr id="3" name="Нижний колонтитул 2">
-            <a:extLst>
-              <a:ext uri="{FF2B5EF4-FFF2-40B4-BE49-F238E27FC236}">
-                <a16:creationId xmlns:a16="http://schemas.microsoft.com/office/drawing/2014/main" id="{F3B7D4C5-FBB1-4B5F-918A-BA3D6F252EF6}"/>
-              </a:ext>
-            </a:extLst>
-          </p:cNvPr>
+          <p:cNvPr id="3" name="Footer Placeholder 2"/>
           <p:cNvSpPr>
             <a:spLocks noGrp="1"/>
           </p:cNvSpPr>
@@ -2152,13 +1901,7 @@
       </p:sp>
       <p:sp>
         <p:nvSpPr>
-          <p:cNvPr id="4" name="Номер слайда 3">
-            <a:extLst>
-              <a:ext uri="{FF2B5EF4-FFF2-40B4-BE49-F238E27FC236}">
-                <a16:creationId xmlns:a16="http://schemas.microsoft.com/office/drawing/2014/main" id="{40DEE051-CB89-44CF-A448-1780BAB57ECF}"/>
-              </a:ext>
-            </a:extLst>
-          </p:cNvPr>
+          <p:cNvPr id="4" name="Slide Number Placeholder 3"/>
           <p:cNvSpPr>
             <a:spLocks noGrp="1"/>
           </p:cNvSpPr>
@@ -2182,7 +1925,7 @@
     </p:spTree>
     <p:extLst>
       <p:ext uri="{BB962C8B-B14F-4D97-AF65-F5344CB8AC3E}">
-        <p14:creationId xmlns:p14="http://schemas.microsoft.com/office/powerpoint/2010/main" val="246892265"/>
+        <p14:creationId xmlns:p14="http://schemas.microsoft.com/office/powerpoint/2010/main" val="2810867558"/>
       </p:ext>
     </p:extLst>
   </p:cSld>
@@ -2211,13 +1954,7 @@
       </p:grpSpPr>
       <p:sp>
         <p:nvSpPr>
-          <p:cNvPr id="2" name="Заголовок 1">
-            <a:extLst>
-              <a:ext uri="{FF2B5EF4-FFF2-40B4-BE49-F238E27FC236}">
-                <a16:creationId xmlns:a16="http://schemas.microsoft.com/office/drawing/2014/main" id="{2AD45B50-F85E-47C8-B03F-EC9594AEDF86}"/>
-              </a:ext>
-            </a:extLst>
-          </p:cNvPr>
+          <p:cNvPr id="2" name="Title 1"/>
           <p:cNvSpPr>
             <a:spLocks noGrp="1"/>
           </p:cNvSpPr>
@@ -2227,34 +1964,29 @@
         </p:nvSpPr>
         <p:spPr>
           <a:xfrm>
-            <a:off x="839788" y="457200"/>
-            <a:ext cx="3932237" cy="1600200"/>
+            <a:off x="843069" y="456036"/>
+            <a:ext cx="3947597" cy="1596126"/>
           </a:xfrm>
         </p:spPr>
         <p:txBody>
           <a:bodyPr anchor="b"/>
           <a:lstStyle>
             <a:lvl1pPr>
-              <a:defRPr sz="3200"/>
+              <a:defRPr sz="3192"/>
             </a:lvl1pPr>
           </a:lstStyle>
           <a:p>
             <a:r>
-              <a:rPr lang="ru-RU"/>
+              <a:rPr lang="ru-RU" smtClean="0"/>
               <a:t>Образец заголовка</a:t>
             </a:r>
-          </a:p>
-        </p:txBody>
-      </p:sp>
-      <p:sp>
-        <p:nvSpPr>
-          <p:cNvPr id="3" name="Объект 2">
-            <a:extLst>
-              <a:ext uri="{FF2B5EF4-FFF2-40B4-BE49-F238E27FC236}">
-                <a16:creationId xmlns:a16="http://schemas.microsoft.com/office/drawing/2014/main" id="{19B86AAA-63EA-45D6-A0A6-30D28B5C3B90}"/>
-              </a:ext>
-            </a:extLst>
-          </p:cNvPr>
+            <a:endParaRPr lang="en-US" dirty="0"/>
+          </a:p>
+        </p:txBody>
+      </p:sp>
+      <p:sp>
+        <p:nvSpPr>
+          <p:cNvPr id="3" name="Content Placeholder 2"/>
           <p:cNvSpPr>
             <a:spLocks noGrp="1"/>
           </p:cNvSpPr>
@@ -2264,87 +1996,82 @@
         </p:nvSpPr>
         <p:spPr>
           <a:xfrm>
-            <a:off x="5183188" y="987425"/>
-            <a:ext cx="6172200" cy="4873625"/>
+            <a:off x="5203435" y="984911"/>
+            <a:ext cx="6196310" cy="4861216"/>
           </a:xfrm>
         </p:spPr>
         <p:txBody>
           <a:bodyPr/>
           <a:lstStyle>
             <a:lvl1pPr>
-              <a:defRPr sz="3200"/>
+              <a:defRPr sz="3192"/>
             </a:lvl1pPr>
             <a:lvl2pPr>
-              <a:defRPr sz="2800"/>
+              <a:defRPr sz="2793"/>
             </a:lvl2pPr>
             <a:lvl3pPr>
-              <a:defRPr sz="2400"/>
+              <a:defRPr sz="2394"/>
             </a:lvl3pPr>
             <a:lvl4pPr>
-              <a:defRPr sz="2000"/>
+              <a:defRPr sz="1995"/>
             </a:lvl4pPr>
             <a:lvl5pPr>
-              <a:defRPr sz="2000"/>
+              <a:defRPr sz="1995"/>
             </a:lvl5pPr>
             <a:lvl6pPr>
-              <a:defRPr sz="2000"/>
+              <a:defRPr sz="1995"/>
             </a:lvl6pPr>
             <a:lvl7pPr>
-              <a:defRPr sz="2000"/>
+              <a:defRPr sz="1995"/>
             </a:lvl7pPr>
             <a:lvl8pPr>
-              <a:defRPr sz="2000"/>
+              <a:defRPr sz="1995"/>
             </a:lvl8pPr>
             <a:lvl9pPr>
-              <a:defRPr sz="2000"/>
+              <a:defRPr sz="1995"/>
             </a:lvl9pPr>
           </a:lstStyle>
           <a:p>
             <a:pPr lvl="0"/>
             <a:r>
-              <a:rPr lang="ru-RU"/>
+              <a:rPr lang="ru-RU" smtClean="0"/>
               <a:t>Образец текста</a:t>
             </a:r>
           </a:p>
           <a:p>
             <a:pPr lvl="1"/>
             <a:r>
-              <a:rPr lang="ru-RU"/>
+              <a:rPr lang="ru-RU" smtClean="0"/>
               <a:t>Второй уровень</a:t>
             </a:r>
           </a:p>
           <a:p>
             <a:pPr lvl="2"/>
             <a:r>
-              <a:rPr lang="ru-RU"/>
+              <a:rPr lang="ru-RU" smtClean="0"/>
               <a:t>Третий уровень</a:t>
             </a:r>
           </a:p>
           <a:p>
             <a:pPr lvl="3"/>
             <a:r>
-              <a:rPr lang="ru-RU"/>
+              <a:rPr lang="ru-RU" smtClean="0"/>
               <a:t>Четвертый уровень</a:t>
             </a:r>
           </a:p>
           <a:p>
             <a:pPr lvl="4"/>
             <a:r>
-              <a:rPr lang="ru-RU"/>
+              <a:rPr lang="ru-RU" smtClean="0"/>
               <a:t>Пятый уровень</a:t>
             </a:r>
-          </a:p>
-        </p:txBody>
-      </p:sp>
-      <p:sp>
-        <p:nvSpPr>
-          <p:cNvPr id="4" name="Текст 3">
-            <a:extLst>
-              <a:ext uri="{FF2B5EF4-FFF2-40B4-BE49-F238E27FC236}">
-                <a16:creationId xmlns:a16="http://schemas.microsoft.com/office/drawing/2014/main" id="{22D94DF1-6888-47A0-9B46-4AE782259DB0}"/>
-              </a:ext>
-            </a:extLst>
-          </p:cNvPr>
+            <a:endParaRPr lang="en-US" dirty="0"/>
+          </a:p>
+        </p:txBody>
+      </p:sp>
+      <p:sp>
+        <p:nvSpPr>
+          <p:cNvPr id="4" name="Text Placeholder 3"/>
           <p:cNvSpPr>
             <a:spLocks noGrp="1"/>
           </p:cNvSpPr>
@@ -2354,8 +2081,8 @@
         </p:nvSpPr>
         <p:spPr>
           <a:xfrm>
-            <a:off x="839788" y="2057400"/>
-            <a:ext cx="3932237" cy="3811588"/>
+            <a:off x="843069" y="2052161"/>
+            <a:ext cx="3947597" cy="3801883"/>
           </a:xfrm>
         </p:spPr>
         <p:txBody>
@@ -2363,45 +2090,45 @@
           <a:lstStyle>
             <a:lvl1pPr marL="0" indent="0">
               <a:buNone/>
-              <a:defRPr sz="1600"/>
+              <a:defRPr sz="1596"/>
             </a:lvl1pPr>
-            <a:lvl2pPr marL="457200" indent="0">
-              <a:buNone/>
-              <a:defRPr sz="1400"/>
+            <a:lvl2pPr marL="456057" indent="0">
+              <a:buNone/>
+              <a:defRPr sz="1397"/>
             </a:lvl2pPr>
-            <a:lvl3pPr marL="914400" indent="0">
-              <a:buNone/>
-              <a:defRPr sz="1200"/>
+            <a:lvl3pPr marL="912114" indent="0">
+              <a:buNone/>
+              <a:defRPr sz="1197"/>
             </a:lvl3pPr>
-            <a:lvl4pPr marL="1371600" indent="0">
-              <a:buNone/>
-              <a:defRPr sz="1000"/>
+            <a:lvl4pPr marL="1368171" indent="0">
+              <a:buNone/>
+              <a:defRPr sz="998"/>
             </a:lvl4pPr>
-            <a:lvl5pPr marL="1828800" indent="0">
-              <a:buNone/>
-              <a:defRPr sz="1000"/>
+            <a:lvl5pPr marL="1824228" indent="0">
+              <a:buNone/>
+              <a:defRPr sz="998"/>
             </a:lvl5pPr>
-            <a:lvl6pPr marL="2286000" indent="0">
-              <a:buNone/>
-              <a:defRPr sz="1000"/>
+            <a:lvl6pPr marL="2280285" indent="0">
+              <a:buNone/>
+              <a:defRPr sz="998"/>
             </a:lvl6pPr>
-            <a:lvl7pPr marL="2743200" indent="0">
-              <a:buNone/>
-              <a:defRPr sz="1000"/>
+            <a:lvl7pPr marL="2736342" indent="0">
+              <a:buNone/>
+              <a:defRPr sz="998"/>
             </a:lvl7pPr>
-            <a:lvl8pPr marL="3200400" indent="0">
-              <a:buNone/>
-              <a:defRPr sz="1000"/>
+            <a:lvl8pPr marL="3192399" indent="0">
+              <a:buNone/>
+              <a:defRPr sz="998"/>
             </a:lvl8pPr>
-            <a:lvl9pPr marL="3657600" indent="0">
-              <a:buNone/>
-              <a:defRPr sz="1000"/>
+            <a:lvl9pPr marL="3648456" indent="0">
+              <a:buNone/>
+              <a:defRPr sz="998"/>
             </a:lvl9pPr>
           </a:lstStyle>
           <a:p>
             <a:pPr lvl="0"/>
             <a:r>
-              <a:rPr lang="ru-RU"/>
+              <a:rPr lang="ru-RU" smtClean="0"/>
               <a:t>Образец текста</a:t>
             </a:r>
           </a:p>
@@ -2409,13 +2136,7 @@
       </p:sp>
       <p:sp>
         <p:nvSpPr>
-          <p:cNvPr id="5" name="Дата 4">
-            <a:extLst>
-              <a:ext uri="{FF2B5EF4-FFF2-40B4-BE49-F238E27FC236}">
-                <a16:creationId xmlns:a16="http://schemas.microsoft.com/office/drawing/2014/main" id="{6786D9B6-8F42-4839-874D-DCB166065E03}"/>
-              </a:ext>
-            </a:extLst>
-          </p:cNvPr>
+          <p:cNvPr id="5" name="Date Placeholder 4"/>
           <p:cNvSpPr>
             <a:spLocks noGrp="1"/>
           </p:cNvSpPr>
@@ -2430,7 +2151,7 @@
           <a:p>
             <a:fld id="{07504AD1-F626-4EEE-A1F0-4F98A55EE3A4}" type="datetimeFigureOut">
               <a:rPr lang="ru-RU" smtClean="0"/>
-              <a:t>17.01.2022</a:t>
+              <a:t>19.01.2022</a:t>
             </a:fld>
             <a:endParaRPr lang="ru-RU"/>
           </a:p>
@@ -2438,13 +2159,7 @@
       </p:sp>
       <p:sp>
         <p:nvSpPr>
-          <p:cNvPr id="6" name="Нижний колонтитул 5">
-            <a:extLst>
-              <a:ext uri="{FF2B5EF4-FFF2-40B4-BE49-F238E27FC236}">
-                <a16:creationId xmlns:a16="http://schemas.microsoft.com/office/drawing/2014/main" id="{B8532F82-4186-4209-98F3-31565A5D5C9F}"/>
-              </a:ext>
-            </a:extLst>
-          </p:cNvPr>
+          <p:cNvPr id="6" name="Footer Placeholder 5"/>
           <p:cNvSpPr>
             <a:spLocks noGrp="1"/>
           </p:cNvSpPr>
@@ -2463,13 +2178,7 @@
       </p:sp>
       <p:sp>
         <p:nvSpPr>
-          <p:cNvPr id="7" name="Номер слайда 6">
-            <a:extLst>
-              <a:ext uri="{FF2B5EF4-FFF2-40B4-BE49-F238E27FC236}">
-                <a16:creationId xmlns:a16="http://schemas.microsoft.com/office/drawing/2014/main" id="{8BB89A03-599A-4AAB-9878-4D7E513AA940}"/>
-              </a:ext>
-            </a:extLst>
-          </p:cNvPr>
+          <p:cNvPr id="7" name="Slide Number Placeholder 6"/>
           <p:cNvSpPr>
             <a:spLocks noGrp="1"/>
           </p:cNvSpPr>
@@ -2493,7 +2202,7 @@
     </p:spTree>
     <p:extLst>
       <p:ext uri="{BB962C8B-B14F-4D97-AF65-F5344CB8AC3E}">
-        <p14:creationId xmlns:p14="http://schemas.microsoft.com/office/powerpoint/2010/main" val="1150085495"/>
+        <p14:creationId xmlns:p14="http://schemas.microsoft.com/office/powerpoint/2010/main" val="1913818877"/>
       </p:ext>
     </p:extLst>
   </p:cSld>
@@ -2522,13 +2231,7 @@
       </p:grpSpPr>
       <p:sp>
         <p:nvSpPr>
-          <p:cNvPr id="2" name="Заголовок 1">
-            <a:extLst>
-              <a:ext uri="{FF2B5EF4-FFF2-40B4-BE49-F238E27FC236}">
-                <a16:creationId xmlns:a16="http://schemas.microsoft.com/office/drawing/2014/main" id="{19E8A92C-8583-4E93-BB1B-80AEEC04BDEE}"/>
-              </a:ext>
-            </a:extLst>
-          </p:cNvPr>
+          <p:cNvPr id="2" name="Title 1"/>
           <p:cNvSpPr>
             <a:spLocks noGrp="1"/>
           </p:cNvSpPr>
@@ -2538,36 +2241,31 @@
         </p:nvSpPr>
         <p:spPr>
           <a:xfrm>
-            <a:off x="839788" y="457200"/>
-            <a:ext cx="3932237" cy="1600200"/>
+            <a:off x="843069" y="456036"/>
+            <a:ext cx="3947597" cy="1596126"/>
           </a:xfrm>
         </p:spPr>
         <p:txBody>
           <a:bodyPr anchor="b"/>
           <a:lstStyle>
             <a:lvl1pPr>
-              <a:defRPr sz="3200"/>
+              <a:defRPr sz="3192"/>
             </a:lvl1pPr>
           </a:lstStyle>
           <a:p>
             <a:r>
-              <a:rPr lang="ru-RU"/>
+              <a:rPr lang="ru-RU" smtClean="0"/>
               <a:t>Образец заголовка</a:t>
             </a:r>
-          </a:p>
-        </p:txBody>
-      </p:sp>
-      <p:sp>
-        <p:nvSpPr>
-          <p:cNvPr id="3" name="Рисунок 2">
-            <a:extLst>
-              <a:ext uri="{FF2B5EF4-FFF2-40B4-BE49-F238E27FC236}">
-                <a16:creationId xmlns:a16="http://schemas.microsoft.com/office/drawing/2014/main" id="{96DB03C3-BA0D-4DCB-85E5-4DA7FA190AE0}"/>
-              </a:ext>
-            </a:extLst>
-          </p:cNvPr>
-          <p:cNvSpPr>
-            <a:spLocks noGrp="1"/>
+            <a:endParaRPr lang="en-US" dirty="0"/>
+          </a:p>
+        </p:txBody>
+      </p:sp>
+      <p:sp>
+        <p:nvSpPr>
+          <p:cNvPr id="3" name="Picture Placeholder 2"/>
+          <p:cNvSpPr>
+            <a:spLocks noGrp="1" noChangeAspect="1"/>
           </p:cNvSpPr>
           <p:nvPr>
             <p:ph type="pic" idx="1"/>
@@ -2575,8 +2273,73 @@
         </p:nvSpPr>
         <p:spPr>
           <a:xfrm>
-            <a:off x="5183188" y="987425"/>
-            <a:ext cx="6172200" cy="4873625"/>
+            <a:off x="5203435" y="984911"/>
+            <a:ext cx="6196310" cy="4861216"/>
+          </a:xfrm>
+        </p:spPr>
+        <p:txBody>
+          <a:bodyPr anchor="t"/>
+          <a:lstStyle>
+            <a:lvl1pPr marL="0" indent="0">
+              <a:buNone/>
+              <a:defRPr sz="3192"/>
+            </a:lvl1pPr>
+            <a:lvl2pPr marL="456057" indent="0">
+              <a:buNone/>
+              <a:defRPr sz="2793"/>
+            </a:lvl2pPr>
+            <a:lvl3pPr marL="912114" indent="0">
+              <a:buNone/>
+              <a:defRPr sz="2394"/>
+            </a:lvl3pPr>
+            <a:lvl4pPr marL="1368171" indent="0">
+              <a:buNone/>
+              <a:defRPr sz="1995"/>
+            </a:lvl4pPr>
+            <a:lvl5pPr marL="1824228" indent="0">
+              <a:buNone/>
+              <a:defRPr sz="1995"/>
+            </a:lvl5pPr>
+            <a:lvl6pPr marL="2280285" indent="0">
+              <a:buNone/>
+              <a:defRPr sz="1995"/>
+            </a:lvl6pPr>
+            <a:lvl7pPr marL="2736342" indent="0">
+              <a:buNone/>
+              <a:defRPr sz="1995"/>
+            </a:lvl7pPr>
+            <a:lvl8pPr marL="3192399" indent="0">
+              <a:buNone/>
+              <a:defRPr sz="1995"/>
+            </a:lvl8pPr>
+            <a:lvl9pPr marL="3648456" indent="0">
+              <a:buNone/>
+              <a:defRPr sz="1995"/>
+            </a:lvl9pPr>
+          </a:lstStyle>
+          <a:p>
+            <a:r>
+              <a:rPr lang="ru-RU" smtClean="0"/>
+              <a:t>Вставка рисунка</a:t>
+            </a:r>
+            <a:endParaRPr lang="en-US" dirty="0"/>
+          </a:p>
+        </p:txBody>
+      </p:sp>
+      <p:sp>
+        <p:nvSpPr>
+          <p:cNvPr id="4" name="Text Placeholder 3"/>
+          <p:cNvSpPr>
+            <a:spLocks noGrp="1"/>
+          </p:cNvSpPr>
+          <p:nvPr>
+            <p:ph type="body" sz="half" idx="2"/>
+          </p:nvPr>
+        </p:nvSpPr>
+        <p:spPr>
+          <a:xfrm>
+            <a:off x="843069" y="2052161"/>
+            <a:ext cx="3947597" cy="3801883"/>
           </a:xfrm>
         </p:spPr>
         <p:txBody>
@@ -2584,141 +2347,68 @@
           <a:lstStyle>
             <a:lvl1pPr marL="0" indent="0">
               <a:buNone/>
-              <a:defRPr sz="3200"/>
+              <a:defRPr sz="1596"/>
             </a:lvl1pPr>
-            <a:lvl2pPr marL="457200" indent="0">
-              <a:buNone/>
-              <a:defRPr sz="2800"/>
+            <a:lvl2pPr marL="456057" indent="0">
+              <a:buNone/>
+              <a:defRPr sz="1397"/>
             </a:lvl2pPr>
-            <a:lvl3pPr marL="914400" indent="0">
-              <a:buNone/>
-              <a:defRPr sz="2400"/>
+            <a:lvl3pPr marL="912114" indent="0">
+              <a:buNone/>
+              <a:defRPr sz="1197"/>
             </a:lvl3pPr>
-            <a:lvl4pPr marL="1371600" indent="0">
-              <a:buNone/>
-              <a:defRPr sz="2000"/>
+            <a:lvl4pPr marL="1368171" indent="0">
+              <a:buNone/>
+              <a:defRPr sz="998"/>
             </a:lvl4pPr>
-            <a:lvl5pPr marL="1828800" indent="0">
-              <a:buNone/>
-              <a:defRPr sz="2000"/>
+            <a:lvl5pPr marL="1824228" indent="0">
+              <a:buNone/>
+              <a:defRPr sz="998"/>
             </a:lvl5pPr>
-            <a:lvl6pPr marL="2286000" indent="0">
-              <a:buNone/>
-              <a:defRPr sz="2000"/>
+            <a:lvl6pPr marL="2280285" indent="0">
+              <a:buNone/>
+              <a:defRPr sz="998"/>
             </a:lvl6pPr>
-            <a:lvl7pPr marL="2743200" indent="0">
-              <a:buNone/>
-              <a:defRPr sz="2000"/>
+            <a:lvl7pPr marL="2736342" indent="0">
+              <a:buNone/>
+              <a:defRPr sz="998"/>
             </a:lvl7pPr>
-            <a:lvl8pPr marL="3200400" indent="0">
-              <a:buNone/>
-              <a:defRPr sz="2000"/>
+            <a:lvl8pPr marL="3192399" indent="0">
+              <a:buNone/>
+              <a:defRPr sz="998"/>
             </a:lvl8pPr>
-            <a:lvl9pPr marL="3657600" indent="0">
-              <a:buNone/>
-              <a:defRPr sz="2000"/>
+            <a:lvl9pPr marL="3648456" indent="0">
+              <a:buNone/>
+              <a:defRPr sz="998"/>
             </a:lvl9pPr>
           </a:lstStyle>
           <a:p>
-            <a:endParaRPr lang="ru-RU"/>
-          </a:p>
-        </p:txBody>
-      </p:sp>
-      <p:sp>
-        <p:nvSpPr>
-          <p:cNvPr id="4" name="Текст 3">
-            <a:extLst>
-              <a:ext uri="{FF2B5EF4-FFF2-40B4-BE49-F238E27FC236}">
-                <a16:creationId xmlns:a16="http://schemas.microsoft.com/office/drawing/2014/main" id="{5D40E439-E558-4471-89A1-16826D6DAD5A}"/>
-              </a:ext>
-            </a:extLst>
-          </p:cNvPr>
-          <p:cNvSpPr>
-            <a:spLocks noGrp="1"/>
-          </p:cNvSpPr>
-          <p:nvPr>
-            <p:ph type="body" sz="half" idx="2"/>
-          </p:nvPr>
-        </p:nvSpPr>
-        <p:spPr>
-          <a:xfrm>
-            <a:off x="839788" y="2057400"/>
-            <a:ext cx="3932237" cy="3811588"/>
-          </a:xfrm>
-        </p:spPr>
+            <a:pPr lvl="0"/>
+            <a:r>
+              <a:rPr lang="ru-RU" smtClean="0"/>
+              <a:t>Образец текста</a:t>
+            </a:r>
+          </a:p>
+        </p:txBody>
+      </p:sp>
+      <p:sp>
+        <p:nvSpPr>
+          <p:cNvPr id="5" name="Date Placeholder 4"/>
+          <p:cNvSpPr>
+            <a:spLocks noGrp="1"/>
+          </p:cNvSpPr>
+          <p:nvPr>
+            <p:ph type="dt" sz="half" idx="10"/>
+          </p:nvPr>
+        </p:nvSpPr>
+        <p:spPr/>
         <p:txBody>
           <a:bodyPr/>
-          <a:lstStyle>
-            <a:lvl1pPr marL="0" indent="0">
-              <a:buNone/>
-              <a:defRPr sz="1600"/>
-            </a:lvl1pPr>
-            <a:lvl2pPr marL="457200" indent="0">
-              <a:buNone/>
-              <a:defRPr sz="1400"/>
-            </a:lvl2pPr>
-            <a:lvl3pPr marL="914400" indent="0">
-              <a:buNone/>
-              <a:defRPr sz="1200"/>
-            </a:lvl3pPr>
-            <a:lvl4pPr marL="1371600" indent="0">
-              <a:buNone/>
-              <a:defRPr sz="1000"/>
-            </a:lvl4pPr>
-            <a:lvl5pPr marL="1828800" indent="0">
-              <a:buNone/>
-              <a:defRPr sz="1000"/>
-            </a:lvl5pPr>
-            <a:lvl6pPr marL="2286000" indent="0">
-              <a:buNone/>
-              <a:defRPr sz="1000"/>
-            </a:lvl6pPr>
-            <a:lvl7pPr marL="2743200" indent="0">
-              <a:buNone/>
-              <a:defRPr sz="1000"/>
-            </a:lvl7pPr>
-            <a:lvl8pPr marL="3200400" indent="0">
-              <a:buNone/>
-              <a:defRPr sz="1000"/>
-            </a:lvl8pPr>
-            <a:lvl9pPr marL="3657600" indent="0">
-              <a:buNone/>
-              <a:defRPr sz="1000"/>
-            </a:lvl9pPr>
-          </a:lstStyle>
-          <a:p>
-            <a:pPr lvl="0"/>
-            <a:r>
-              <a:rPr lang="ru-RU"/>
-              <a:t>Образец текста</a:t>
-            </a:r>
-          </a:p>
-        </p:txBody>
-      </p:sp>
-      <p:sp>
-        <p:nvSpPr>
-          <p:cNvPr id="5" name="Дата 4">
-            <a:extLst>
-              <a:ext uri="{FF2B5EF4-FFF2-40B4-BE49-F238E27FC236}">
-                <a16:creationId xmlns:a16="http://schemas.microsoft.com/office/drawing/2014/main" id="{A0E7C210-C22D-4557-8B6E-3E73F3B5E423}"/>
-              </a:ext>
-            </a:extLst>
-          </p:cNvPr>
-          <p:cNvSpPr>
-            <a:spLocks noGrp="1"/>
-          </p:cNvSpPr>
-          <p:nvPr>
-            <p:ph type="dt" sz="half" idx="10"/>
-          </p:nvPr>
-        </p:nvSpPr>
-        <p:spPr/>
-        <p:txBody>
-          <a:bodyPr/>
           <a:lstStyle/>
           <a:p>
             <a:fld id="{07504AD1-F626-4EEE-A1F0-4F98A55EE3A4}" type="datetimeFigureOut">
               <a:rPr lang="ru-RU" smtClean="0"/>
-              <a:t>17.01.2022</a:t>
+              <a:t>19.01.2022</a:t>
             </a:fld>
             <a:endParaRPr lang="ru-RU"/>
           </a:p>
@@ -2726,13 +2416,7 @@
       </p:sp>
       <p:sp>
         <p:nvSpPr>
-          <p:cNvPr id="6" name="Нижний колонтитул 5">
-            <a:extLst>
-              <a:ext uri="{FF2B5EF4-FFF2-40B4-BE49-F238E27FC236}">
-                <a16:creationId xmlns:a16="http://schemas.microsoft.com/office/drawing/2014/main" id="{06010A6E-8499-45D0-9778-853B73D3152A}"/>
-              </a:ext>
-            </a:extLst>
-          </p:cNvPr>
+          <p:cNvPr id="6" name="Footer Placeholder 5"/>
           <p:cNvSpPr>
             <a:spLocks noGrp="1"/>
           </p:cNvSpPr>
@@ -2751,13 +2435,7 @@
       </p:sp>
       <p:sp>
         <p:nvSpPr>
-          <p:cNvPr id="7" name="Номер слайда 6">
-            <a:extLst>
-              <a:ext uri="{FF2B5EF4-FFF2-40B4-BE49-F238E27FC236}">
-                <a16:creationId xmlns:a16="http://schemas.microsoft.com/office/drawing/2014/main" id="{0F1F70C6-BF7F-4306-885A-5969F3037644}"/>
-              </a:ext>
-            </a:extLst>
-          </p:cNvPr>
+          <p:cNvPr id="7" name="Slide Number Placeholder 6"/>
           <p:cNvSpPr>
             <a:spLocks noGrp="1"/>
           </p:cNvSpPr>
@@ -2781,7 +2459,7 @@
     </p:spTree>
     <p:extLst>
       <p:ext uri="{BB962C8B-B14F-4D97-AF65-F5344CB8AC3E}">
-        <p14:creationId xmlns:p14="http://schemas.microsoft.com/office/powerpoint/2010/main" val="1082478575"/>
+        <p14:creationId xmlns:p14="http://schemas.microsoft.com/office/powerpoint/2010/main" val="1206885498"/>
       </p:ext>
     </p:extLst>
   </p:cSld>
@@ -2815,13 +2493,7 @@
       </p:grpSpPr>
       <p:sp>
         <p:nvSpPr>
-          <p:cNvPr id="2" name="Заголовок 1">
-            <a:extLst>
-              <a:ext uri="{FF2B5EF4-FFF2-40B4-BE49-F238E27FC236}">
-                <a16:creationId xmlns:a16="http://schemas.microsoft.com/office/drawing/2014/main" id="{6D34ED75-B041-4D3D-843A-484CFEC9D0BE}"/>
-              </a:ext>
-            </a:extLst>
-          </p:cNvPr>
+          <p:cNvPr id="2" name="Title Placeholder 1"/>
           <p:cNvSpPr>
             <a:spLocks noGrp="1"/>
           </p:cNvSpPr>
@@ -2831,8 +2503,8 @@
         </p:nvSpPr>
         <p:spPr>
           <a:xfrm>
-            <a:off x="838200" y="365125"/>
-            <a:ext cx="10515600" cy="1325563"/>
+            <a:off x="841474" y="364196"/>
+            <a:ext cx="10556677" cy="1322188"/>
           </a:xfrm>
           <a:prstGeom prst="rect">
             <a:avLst/>
@@ -2845,21 +2517,16 @@
           <a:lstStyle/>
           <a:p>
             <a:r>
-              <a:rPr lang="ru-RU"/>
+              <a:rPr lang="ru-RU" smtClean="0"/>
               <a:t>Образец заголовка</a:t>
             </a:r>
-          </a:p>
-        </p:txBody>
-      </p:sp>
-      <p:sp>
-        <p:nvSpPr>
-          <p:cNvPr id="3" name="Текст 2">
-            <a:extLst>
-              <a:ext uri="{FF2B5EF4-FFF2-40B4-BE49-F238E27FC236}">
-                <a16:creationId xmlns:a16="http://schemas.microsoft.com/office/drawing/2014/main" id="{85451BC7-75CC-4943-B8BF-D1D6CA53E0CC}"/>
-              </a:ext>
-            </a:extLst>
-          </p:cNvPr>
+            <a:endParaRPr lang="en-US" dirty="0"/>
+          </a:p>
+        </p:txBody>
+      </p:sp>
+      <p:sp>
+        <p:nvSpPr>
+          <p:cNvPr id="3" name="Text Placeholder 2"/>
           <p:cNvSpPr>
             <a:spLocks noGrp="1"/>
           </p:cNvSpPr>
@@ -2869,8 +2536,8 @@
         </p:nvSpPr>
         <p:spPr>
           <a:xfrm>
-            <a:off x="838200" y="1825625"/>
-            <a:ext cx="10515600" cy="4351338"/>
+            <a:off x="841474" y="1820976"/>
+            <a:ext cx="10556677" cy="4340259"/>
           </a:xfrm>
           <a:prstGeom prst="rect">
             <a:avLst/>
@@ -2884,49 +2551,44 @@
           <a:p>
             <a:pPr lvl="0"/>
             <a:r>
-              <a:rPr lang="ru-RU"/>
+              <a:rPr lang="ru-RU" smtClean="0"/>
               <a:t>Образец текста</a:t>
             </a:r>
           </a:p>
           <a:p>
             <a:pPr lvl="1"/>
             <a:r>
-              <a:rPr lang="ru-RU"/>
+              <a:rPr lang="ru-RU" smtClean="0"/>
               <a:t>Второй уровень</a:t>
             </a:r>
           </a:p>
           <a:p>
             <a:pPr lvl="2"/>
             <a:r>
-              <a:rPr lang="ru-RU"/>
+              <a:rPr lang="ru-RU" smtClean="0"/>
               <a:t>Третий уровень</a:t>
             </a:r>
           </a:p>
           <a:p>
             <a:pPr lvl="3"/>
             <a:r>
-              <a:rPr lang="ru-RU"/>
+              <a:rPr lang="ru-RU" smtClean="0"/>
               <a:t>Четвертый уровень</a:t>
             </a:r>
           </a:p>
           <a:p>
             <a:pPr lvl="4"/>
             <a:r>
-              <a:rPr lang="ru-RU"/>
+              <a:rPr lang="ru-RU" smtClean="0"/>
               <a:t>Пятый уровень</a:t>
             </a:r>
-          </a:p>
-        </p:txBody>
-      </p:sp>
-      <p:sp>
-        <p:nvSpPr>
-          <p:cNvPr id="4" name="Дата 3">
-            <a:extLst>
-              <a:ext uri="{FF2B5EF4-FFF2-40B4-BE49-F238E27FC236}">
-                <a16:creationId xmlns:a16="http://schemas.microsoft.com/office/drawing/2014/main" id="{9C91DBD3-8693-4884-AB04-E204199A6648}"/>
-              </a:ext>
-            </a:extLst>
-          </p:cNvPr>
+            <a:endParaRPr lang="en-US" dirty="0"/>
+          </a:p>
+        </p:txBody>
+      </p:sp>
+      <p:sp>
+        <p:nvSpPr>
+          <p:cNvPr id="4" name="Date Placeholder 3"/>
           <p:cNvSpPr>
             <a:spLocks noGrp="1"/>
           </p:cNvSpPr>
@@ -2936,8 +2598,8 @@
         </p:nvSpPr>
         <p:spPr>
           <a:xfrm>
-            <a:off x="838200" y="6356350"/>
-            <a:ext cx="2743200" cy="365125"/>
+            <a:off x="841474" y="6340166"/>
+            <a:ext cx="2753916" cy="364195"/>
           </a:xfrm>
           <a:prstGeom prst="rect">
             <a:avLst/>
@@ -2947,7 +2609,7 @@
           <a:bodyPr vert="horz" lIns="91440" tIns="45720" rIns="91440" bIns="45720" rtlCol="0" anchor="ctr"/>
           <a:lstStyle>
             <a:lvl1pPr algn="l">
-              <a:defRPr sz="1200">
+              <a:defRPr sz="1197">
                 <a:solidFill>
                   <a:schemeClr val="tx1">
                     <a:tint val="75000"/>
@@ -2959,7 +2621,7 @@
           <a:p>
             <a:fld id="{07504AD1-F626-4EEE-A1F0-4F98A55EE3A4}" type="datetimeFigureOut">
               <a:rPr lang="ru-RU" smtClean="0"/>
-              <a:t>17.01.2022</a:t>
+              <a:t>19.01.2022</a:t>
             </a:fld>
             <a:endParaRPr lang="ru-RU"/>
           </a:p>
@@ -2967,13 +2629,7 @@
       </p:sp>
       <p:sp>
         <p:nvSpPr>
-          <p:cNvPr id="5" name="Нижний колонтитул 4">
-            <a:extLst>
-              <a:ext uri="{FF2B5EF4-FFF2-40B4-BE49-F238E27FC236}">
-                <a16:creationId xmlns:a16="http://schemas.microsoft.com/office/drawing/2014/main" id="{FD98D435-A3A1-4604-9284-654A0E533801}"/>
-              </a:ext>
-            </a:extLst>
-          </p:cNvPr>
+          <p:cNvPr id="5" name="Footer Placeholder 4"/>
           <p:cNvSpPr>
             <a:spLocks noGrp="1"/>
           </p:cNvSpPr>
@@ -2983,8 +2639,8 @@
         </p:nvSpPr>
         <p:spPr>
           <a:xfrm>
-            <a:off x="4038600" y="6356350"/>
-            <a:ext cx="4114800" cy="365125"/>
+            <a:off x="4054376" y="6340166"/>
+            <a:ext cx="4130873" cy="364195"/>
           </a:xfrm>
           <a:prstGeom prst="rect">
             <a:avLst/>
@@ -2994,7 +2650,7 @@
           <a:bodyPr vert="horz" lIns="91440" tIns="45720" rIns="91440" bIns="45720" rtlCol="0" anchor="ctr"/>
           <a:lstStyle>
             <a:lvl1pPr algn="ctr">
-              <a:defRPr sz="1200">
+              <a:defRPr sz="1197">
                 <a:solidFill>
                   <a:schemeClr val="tx1">
                     <a:tint val="75000"/>
@@ -3010,13 +2666,7 @@
       </p:sp>
       <p:sp>
         <p:nvSpPr>
-          <p:cNvPr id="6" name="Номер слайда 5">
-            <a:extLst>
-              <a:ext uri="{FF2B5EF4-FFF2-40B4-BE49-F238E27FC236}">
-                <a16:creationId xmlns:a16="http://schemas.microsoft.com/office/drawing/2014/main" id="{5811299A-5F12-4261-B3A3-BD1DE79E94BE}"/>
-              </a:ext>
-            </a:extLst>
-          </p:cNvPr>
+          <p:cNvPr id="6" name="Slide Number Placeholder 5"/>
           <p:cNvSpPr>
             <a:spLocks noGrp="1"/>
           </p:cNvSpPr>
@@ -3026,8 +2676,8 @@
         </p:nvSpPr>
         <p:spPr>
           <a:xfrm>
-            <a:off x="8610600" y="6356350"/>
-            <a:ext cx="2743200" cy="365125"/>
+            <a:off x="8644235" y="6340166"/>
+            <a:ext cx="2753916" cy="364195"/>
           </a:xfrm>
           <a:prstGeom prst="rect">
             <a:avLst/>
@@ -3037,7 +2687,7 @@
           <a:bodyPr vert="horz" lIns="91440" tIns="45720" rIns="91440" bIns="45720" rtlCol="0" anchor="ctr"/>
           <a:lstStyle>
             <a:lvl1pPr algn="r">
-              <a:defRPr sz="1200">
+              <a:defRPr sz="1197">
                 <a:solidFill>
                   <a:schemeClr val="tx1">
                     <a:tint val="75000"/>
@@ -3058,27 +2708,27 @@
     </p:spTree>
     <p:extLst>
       <p:ext uri="{BB962C8B-B14F-4D97-AF65-F5344CB8AC3E}">
-        <p14:creationId xmlns:p14="http://schemas.microsoft.com/office/powerpoint/2010/main" val="4085606944"/>
+        <p14:creationId xmlns:p14="http://schemas.microsoft.com/office/powerpoint/2010/main" val="1770243397"/>
       </p:ext>
     </p:extLst>
   </p:cSld>
   <p:clrMap bg1="lt1" tx1="dk1" bg2="lt2" tx2="dk2" accent1="accent1" accent2="accent2" accent3="accent3" accent4="accent4" accent5="accent5" accent6="accent6" hlink="hlink" folHlink="folHlink"/>
   <p:sldLayoutIdLst>
-    <p:sldLayoutId id="2147483649" r:id="rId1"/>
-    <p:sldLayoutId id="2147483650" r:id="rId2"/>
-    <p:sldLayoutId id="2147483651" r:id="rId3"/>
-    <p:sldLayoutId id="2147483652" r:id="rId4"/>
-    <p:sldLayoutId id="2147483653" r:id="rId5"/>
-    <p:sldLayoutId id="2147483654" r:id="rId6"/>
-    <p:sldLayoutId id="2147483655" r:id="rId7"/>
-    <p:sldLayoutId id="2147483656" r:id="rId8"/>
-    <p:sldLayoutId id="2147483657" r:id="rId9"/>
-    <p:sldLayoutId id="2147483658" r:id="rId10"/>
-    <p:sldLayoutId id="2147483659" r:id="rId11"/>
+    <p:sldLayoutId id="2147483673" r:id="rId1"/>
+    <p:sldLayoutId id="2147483674" r:id="rId2"/>
+    <p:sldLayoutId id="2147483675" r:id="rId3"/>
+    <p:sldLayoutId id="2147483676" r:id="rId4"/>
+    <p:sldLayoutId id="2147483677" r:id="rId5"/>
+    <p:sldLayoutId id="2147483678" r:id="rId6"/>
+    <p:sldLayoutId id="2147483679" r:id="rId7"/>
+    <p:sldLayoutId id="2147483680" r:id="rId8"/>
+    <p:sldLayoutId id="2147483681" r:id="rId9"/>
+    <p:sldLayoutId id="2147483682" r:id="rId10"/>
+    <p:sldLayoutId id="2147483683" r:id="rId11"/>
   </p:sldLayoutIdLst>
   <p:txStyles>
     <p:titleStyle>
-      <a:lvl1pPr algn="l" defTabSz="914400" rtl="0" eaLnBrk="1" latinLnBrk="0" hangingPunct="1">
+      <a:lvl1pPr algn="l" defTabSz="912114" rtl="0" eaLnBrk="1" latinLnBrk="0" hangingPunct="1">
         <a:lnSpc>
           <a:spcPct val="90000"/>
         </a:lnSpc>
@@ -3086,7 +2736,7 @@
           <a:spcPct val="0"/>
         </a:spcBef>
         <a:buNone/>
-        <a:defRPr sz="4400" kern="1200">
+        <a:defRPr sz="4389" kern="1200">
           <a:solidFill>
             <a:schemeClr val="tx1"/>
           </a:solidFill>
@@ -3097,16 +2747,16 @@
       </a:lvl1pPr>
     </p:titleStyle>
     <p:bodyStyle>
-      <a:lvl1pPr marL="228600" indent="-228600" algn="l" defTabSz="914400" rtl="0" eaLnBrk="1" latinLnBrk="0" hangingPunct="1">
+      <a:lvl1pPr marL="228029" indent="-228029" algn="l" defTabSz="912114" rtl="0" eaLnBrk="1" latinLnBrk="0" hangingPunct="1">
         <a:lnSpc>
           <a:spcPct val="90000"/>
         </a:lnSpc>
         <a:spcBef>
-          <a:spcPts val="1000"/>
+          <a:spcPts val="998"/>
         </a:spcBef>
         <a:buFont typeface="Arial" panose="020B0604020202020204" pitchFamily="34" charset="0"/>
         <a:buChar char="•"/>
-        <a:defRPr sz="2800" kern="1200">
+        <a:defRPr sz="2793" kern="1200">
           <a:solidFill>
             <a:schemeClr val="tx1"/>
           </a:solidFill>
@@ -3115,16 +2765,16 @@
           <a:cs typeface="+mn-cs"/>
         </a:defRPr>
       </a:lvl1pPr>
-      <a:lvl2pPr marL="685800" indent="-228600" algn="l" defTabSz="914400" rtl="0" eaLnBrk="1" latinLnBrk="0" hangingPunct="1">
+      <a:lvl2pPr marL="684086" indent="-228029" algn="l" defTabSz="912114" rtl="0" eaLnBrk="1" latinLnBrk="0" hangingPunct="1">
         <a:lnSpc>
           <a:spcPct val="90000"/>
         </a:lnSpc>
         <a:spcBef>
-          <a:spcPts val="500"/>
+          <a:spcPts val="499"/>
         </a:spcBef>
         <a:buFont typeface="Arial" panose="020B0604020202020204" pitchFamily="34" charset="0"/>
         <a:buChar char="•"/>
-        <a:defRPr sz="2400" kern="1200">
+        <a:defRPr sz="2394" kern="1200">
           <a:solidFill>
             <a:schemeClr val="tx1"/>
           </a:solidFill>
@@ -3133,16 +2783,16 @@
           <a:cs typeface="+mn-cs"/>
         </a:defRPr>
       </a:lvl2pPr>
-      <a:lvl3pPr marL="1143000" indent="-228600" algn="l" defTabSz="914400" rtl="0" eaLnBrk="1" latinLnBrk="0" hangingPunct="1">
+      <a:lvl3pPr marL="1140143" indent="-228029" algn="l" defTabSz="912114" rtl="0" eaLnBrk="1" latinLnBrk="0" hangingPunct="1">
         <a:lnSpc>
           <a:spcPct val="90000"/>
         </a:lnSpc>
         <a:spcBef>
-          <a:spcPts val="500"/>
+          <a:spcPts val="499"/>
         </a:spcBef>
         <a:buFont typeface="Arial" panose="020B0604020202020204" pitchFamily="34" charset="0"/>
         <a:buChar char="•"/>
-        <a:defRPr sz="2000" kern="1200">
+        <a:defRPr sz="1995" kern="1200">
           <a:solidFill>
             <a:schemeClr val="tx1"/>
           </a:solidFill>
@@ -3151,16 +2801,16 @@
           <a:cs typeface="+mn-cs"/>
         </a:defRPr>
       </a:lvl3pPr>
-      <a:lvl4pPr marL="1600200" indent="-228600" algn="l" defTabSz="914400" rtl="0" eaLnBrk="1" latinLnBrk="0" hangingPunct="1">
+      <a:lvl4pPr marL="1596200" indent="-228029" algn="l" defTabSz="912114" rtl="0" eaLnBrk="1" latinLnBrk="0" hangingPunct="1">
         <a:lnSpc>
           <a:spcPct val="90000"/>
         </a:lnSpc>
         <a:spcBef>
-          <a:spcPts val="500"/>
+          <a:spcPts val="499"/>
         </a:spcBef>
         <a:buFont typeface="Arial" panose="020B0604020202020204" pitchFamily="34" charset="0"/>
         <a:buChar char="•"/>
-        <a:defRPr sz="1800" kern="1200">
+        <a:defRPr sz="1795" kern="1200">
           <a:solidFill>
             <a:schemeClr val="tx1"/>
           </a:solidFill>
@@ -3169,16 +2819,16 @@
           <a:cs typeface="+mn-cs"/>
         </a:defRPr>
       </a:lvl4pPr>
-      <a:lvl5pPr marL="2057400" indent="-228600" algn="l" defTabSz="914400" rtl="0" eaLnBrk="1" latinLnBrk="0" hangingPunct="1">
+      <a:lvl5pPr marL="2052257" indent="-228029" algn="l" defTabSz="912114" rtl="0" eaLnBrk="1" latinLnBrk="0" hangingPunct="1">
         <a:lnSpc>
           <a:spcPct val="90000"/>
         </a:lnSpc>
         <a:spcBef>
-          <a:spcPts val="500"/>
+          <a:spcPts val="499"/>
         </a:spcBef>
         <a:buFont typeface="Arial" panose="020B0604020202020204" pitchFamily="34" charset="0"/>
         <a:buChar char="•"/>
-        <a:defRPr sz="1800" kern="1200">
+        <a:defRPr sz="1795" kern="1200">
           <a:solidFill>
             <a:schemeClr val="tx1"/>
           </a:solidFill>
@@ -3187,16 +2837,16 @@
           <a:cs typeface="+mn-cs"/>
         </a:defRPr>
       </a:lvl5pPr>
-      <a:lvl6pPr marL="2514600" indent="-228600" algn="l" defTabSz="914400" rtl="0" eaLnBrk="1" latinLnBrk="0" hangingPunct="1">
+      <a:lvl6pPr marL="2508314" indent="-228029" algn="l" defTabSz="912114" rtl="0" eaLnBrk="1" latinLnBrk="0" hangingPunct="1">
         <a:lnSpc>
           <a:spcPct val="90000"/>
         </a:lnSpc>
         <a:spcBef>
-          <a:spcPts val="500"/>
+          <a:spcPts val="499"/>
         </a:spcBef>
         <a:buFont typeface="Arial" panose="020B0604020202020204" pitchFamily="34" charset="0"/>
         <a:buChar char="•"/>
-        <a:defRPr sz="1800" kern="1200">
+        <a:defRPr sz="1795" kern="1200">
           <a:solidFill>
             <a:schemeClr val="tx1"/>
           </a:solidFill>
@@ -3205,16 +2855,16 @@
           <a:cs typeface="+mn-cs"/>
         </a:defRPr>
       </a:lvl6pPr>
-      <a:lvl7pPr marL="2971800" indent="-228600" algn="l" defTabSz="914400" rtl="0" eaLnBrk="1" latinLnBrk="0" hangingPunct="1">
+      <a:lvl7pPr marL="2964371" indent="-228029" algn="l" defTabSz="912114" rtl="0" eaLnBrk="1" latinLnBrk="0" hangingPunct="1">
         <a:lnSpc>
           <a:spcPct val="90000"/>
         </a:lnSpc>
         <a:spcBef>
-          <a:spcPts val="500"/>
+          <a:spcPts val="499"/>
         </a:spcBef>
         <a:buFont typeface="Arial" panose="020B0604020202020204" pitchFamily="34" charset="0"/>
         <a:buChar char="•"/>
-        <a:defRPr sz="1800" kern="1200">
+        <a:defRPr sz="1795" kern="1200">
           <a:solidFill>
             <a:schemeClr val="tx1"/>
           </a:solidFill>
@@ -3223,16 +2873,16 @@
           <a:cs typeface="+mn-cs"/>
         </a:defRPr>
       </a:lvl7pPr>
-      <a:lvl8pPr marL="3429000" indent="-228600" algn="l" defTabSz="914400" rtl="0" eaLnBrk="1" latinLnBrk="0" hangingPunct="1">
+      <a:lvl8pPr marL="3420428" indent="-228029" algn="l" defTabSz="912114" rtl="0" eaLnBrk="1" latinLnBrk="0" hangingPunct="1">
         <a:lnSpc>
           <a:spcPct val="90000"/>
         </a:lnSpc>
         <a:spcBef>
-          <a:spcPts val="500"/>
+          <a:spcPts val="499"/>
         </a:spcBef>
         <a:buFont typeface="Arial" panose="020B0604020202020204" pitchFamily="34" charset="0"/>
         <a:buChar char="•"/>
-        <a:defRPr sz="1800" kern="1200">
+        <a:defRPr sz="1795" kern="1200">
           <a:solidFill>
             <a:schemeClr val="tx1"/>
           </a:solidFill>
@@ -3241,16 +2891,16 @@
           <a:cs typeface="+mn-cs"/>
         </a:defRPr>
       </a:lvl8pPr>
-      <a:lvl9pPr marL="3886200" indent="-228600" algn="l" defTabSz="914400" rtl="0" eaLnBrk="1" latinLnBrk="0" hangingPunct="1">
+      <a:lvl9pPr marL="3876485" indent="-228029" algn="l" defTabSz="912114" rtl="0" eaLnBrk="1" latinLnBrk="0" hangingPunct="1">
         <a:lnSpc>
           <a:spcPct val="90000"/>
         </a:lnSpc>
         <a:spcBef>
-          <a:spcPts val="500"/>
+          <a:spcPts val="499"/>
         </a:spcBef>
         <a:buFont typeface="Arial" panose="020B0604020202020204" pitchFamily="34" charset="0"/>
         <a:buChar char="•"/>
-        <a:defRPr sz="1800" kern="1200">
+        <a:defRPr sz="1795" kern="1200">
           <a:solidFill>
             <a:schemeClr val="tx1"/>
           </a:solidFill>
@@ -3262,10 +2912,10 @@
     </p:bodyStyle>
     <p:otherStyle>
       <a:defPPr>
-        <a:defRPr lang="ru-RU"/>
+        <a:defRPr lang="en-US"/>
       </a:defPPr>
-      <a:lvl1pPr marL="0" algn="l" defTabSz="914400" rtl="0" eaLnBrk="1" latinLnBrk="0" hangingPunct="1">
-        <a:defRPr sz="1800" kern="1200">
+      <a:lvl1pPr marL="0" algn="l" defTabSz="912114" rtl="0" eaLnBrk="1" latinLnBrk="0" hangingPunct="1">
+        <a:defRPr sz="1795" kern="1200">
           <a:solidFill>
             <a:schemeClr val="tx1"/>
           </a:solidFill>
@@ -3274,8 +2924,8 @@
           <a:cs typeface="+mn-cs"/>
         </a:defRPr>
       </a:lvl1pPr>
-      <a:lvl2pPr marL="457200" algn="l" defTabSz="914400" rtl="0" eaLnBrk="1" latinLnBrk="0" hangingPunct="1">
-        <a:defRPr sz="1800" kern="1200">
+      <a:lvl2pPr marL="456057" algn="l" defTabSz="912114" rtl="0" eaLnBrk="1" latinLnBrk="0" hangingPunct="1">
+        <a:defRPr sz="1795" kern="1200">
           <a:solidFill>
             <a:schemeClr val="tx1"/>
           </a:solidFill>
@@ -3284,8 +2934,8 @@
           <a:cs typeface="+mn-cs"/>
         </a:defRPr>
       </a:lvl2pPr>
-      <a:lvl3pPr marL="914400" algn="l" defTabSz="914400" rtl="0" eaLnBrk="1" latinLnBrk="0" hangingPunct="1">
-        <a:defRPr sz="1800" kern="1200">
+      <a:lvl3pPr marL="912114" algn="l" defTabSz="912114" rtl="0" eaLnBrk="1" latinLnBrk="0" hangingPunct="1">
+        <a:defRPr sz="1795" kern="1200">
           <a:solidFill>
             <a:schemeClr val="tx1"/>
           </a:solidFill>
@@ -3294,8 +2944,8 @@
           <a:cs typeface="+mn-cs"/>
         </a:defRPr>
       </a:lvl3pPr>
-      <a:lvl4pPr marL="1371600" algn="l" defTabSz="914400" rtl="0" eaLnBrk="1" latinLnBrk="0" hangingPunct="1">
-        <a:defRPr sz="1800" kern="1200">
+      <a:lvl4pPr marL="1368171" algn="l" defTabSz="912114" rtl="0" eaLnBrk="1" latinLnBrk="0" hangingPunct="1">
+        <a:defRPr sz="1795" kern="1200">
           <a:solidFill>
             <a:schemeClr val="tx1"/>
           </a:solidFill>
@@ -3304,8 +2954,8 @@
           <a:cs typeface="+mn-cs"/>
         </a:defRPr>
       </a:lvl4pPr>
-      <a:lvl5pPr marL="1828800" algn="l" defTabSz="914400" rtl="0" eaLnBrk="1" latinLnBrk="0" hangingPunct="1">
-        <a:defRPr sz="1800" kern="1200">
+      <a:lvl5pPr marL="1824228" algn="l" defTabSz="912114" rtl="0" eaLnBrk="1" latinLnBrk="0" hangingPunct="1">
+        <a:defRPr sz="1795" kern="1200">
           <a:solidFill>
             <a:schemeClr val="tx1"/>
           </a:solidFill>
@@ -3314,8 +2964,8 @@
           <a:cs typeface="+mn-cs"/>
         </a:defRPr>
       </a:lvl5pPr>
-      <a:lvl6pPr marL="2286000" algn="l" defTabSz="914400" rtl="0" eaLnBrk="1" latinLnBrk="0" hangingPunct="1">
-        <a:defRPr sz="1800" kern="1200">
+      <a:lvl6pPr marL="2280285" algn="l" defTabSz="912114" rtl="0" eaLnBrk="1" latinLnBrk="0" hangingPunct="1">
+        <a:defRPr sz="1795" kern="1200">
           <a:solidFill>
             <a:schemeClr val="tx1"/>
           </a:solidFill>
@@ -3324,8 +2974,8 @@
           <a:cs typeface="+mn-cs"/>
         </a:defRPr>
       </a:lvl6pPr>
-      <a:lvl7pPr marL="2743200" algn="l" defTabSz="914400" rtl="0" eaLnBrk="1" latinLnBrk="0" hangingPunct="1">
-        <a:defRPr sz="1800" kern="1200">
+      <a:lvl7pPr marL="2736342" algn="l" defTabSz="912114" rtl="0" eaLnBrk="1" latinLnBrk="0" hangingPunct="1">
+        <a:defRPr sz="1795" kern="1200">
           <a:solidFill>
             <a:schemeClr val="tx1"/>
           </a:solidFill>
@@ -3334,8 +2984,8 @@
           <a:cs typeface="+mn-cs"/>
         </a:defRPr>
       </a:lvl7pPr>
-      <a:lvl8pPr marL="3200400" algn="l" defTabSz="914400" rtl="0" eaLnBrk="1" latinLnBrk="0" hangingPunct="1">
-        <a:defRPr sz="1800" kern="1200">
+      <a:lvl8pPr marL="3192399" algn="l" defTabSz="912114" rtl="0" eaLnBrk="1" latinLnBrk="0" hangingPunct="1">
+        <a:defRPr sz="1795" kern="1200">
           <a:solidFill>
             <a:schemeClr val="tx1"/>
           </a:solidFill>
@@ -3344,8 +2994,8 @@
           <a:cs typeface="+mn-cs"/>
         </a:defRPr>
       </a:lvl8pPr>
-      <a:lvl9pPr marL="3657600" algn="l" defTabSz="914400" rtl="0" eaLnBrk="1" latinLnBrk="0" hangingPunct="1">
-        <a:defRPr sz="1800" kern="1200">
+      <a:lvl9pPr marL="3648456" algn="l" defTabSz="912114" rtl="0" eaLnBrk="1" latinLnBrk="0" hangingPunct="1">
+        <a:defRPr sz="1795" kern="1200">
           <a:solidFill>
             <a:schemeClr val="tx1"/>
           </a:solidFill>
@@ -3362,6 +3012,21 @@
 <file path=ppt/slides/slide1.xml><?xml version="1.0" encoding="utf-8"?>
 <p:sld xmlns:a="http://schemas.openxmlformats.org/drawingml/2006/main" xmlns:r="http://schemas.openxmlformats.org/officeDocument/2006/relationships" xmlns:p="http://schemas.openxmlformats.org/presentationml/2006/main">
   <p:cSld>
+    <p:bg>
+      <p:bgPr>
+        <a:blipFill dpi="0" rotWithShape="1">
+          <a:blip r:embed="rId2">
+            <a:alphaModFix amt="20000"/>
+            <a:lum/>
+          </a:blip>
+          <a:srcRect/>
+          <a:stretch>
+            <a:fillRect/>
+          </a:stretch>
+        </a:blipFill>
+        <a:effectLst/>
+      </p:bgPr>
+    </p:bg>
     <p:spTree>
       <p:nvGrpSpPr>
         <p:cNvPr id="1" name=""/>
@@ -3394,8 +3059,8 @@
         </p:nvSpPr>
         <p:spPr>
           <a:xfrm>
-            <a:off x="2268453" y="2646947"/>
-            <a:ext cx="7655094" cy="1564106"/>
+            <a:off x="2277315" y="2635161"/>
+            <a:ext cx="7684997" cy="1570216"/>
           </a:xfrm>
         </p:spPr>
         <p:txBody>
@@ -3411,6 +3076,10 @@
             <a:r>
               <a:rPr lang="en-US" dirty="0" err="1"/>
               <a:t>pygame</a:t>
+            </a:r>
+            <a:r>
+              <a:rPr lang="en-US" dirty="0"/>
+              <a:t/>
             </a:r>
             <a:br>
               <a:rPr lang="en-US" dirty="0"/>
@@ -3440,8 +3109,8 @@
         </p:nvSpPr>
         <p:spPr>
           <a:xfrm>
-            <a:off x="6280483" y="6292516"/>
-            <a:ext cx="5795211" cy="457200"/>
+            <a:off x="6305017" y="6294971"/>
+            <a:ext cx="5817849" cy="458986"/>
           </a:xfrm>
         </p:spPr>
         <p:txBody>
@@ -3465,6 +3134,13 @@
   <p:clrMapOvr>
     <a:masterClrMapping/>
   </p:clrMapOvr>
+  <p:timing>
+    <p:tnLst>
+      <p:par>
+        <p:cTn id="1" dur="indefinite" restart="never" nodeType="tmRoot"/>
+      </p:par>
+    </p:tnLst>
+  </p:timing>
 </p:sld>
 </file>
 
@@ -3503,8 +3179,8 @@
         </p:nvSpPr>
         <p:spPr>
           <a:xfrm>
-            <a:off x="3227470" y="0"/>
-            <a:ext cx="5844341" cy="1325563"/>
+            <a:off x="3240078" y="-22125"/>
+            <a:ext cx="5867170" cy="1330741"/>
           </a:xfrm>
         </p:spPr>
         <p:txBody>
@@ -3568,8 +3244,8 @@
         </p:nvSpPr>
         <p:spPr>
           <a:xfrm>
-            <a:off x="2660984" y="0"/>
-            <a:ext cx="6870032" cy="1325563"/>
+            <a:off x="2671378" y="-22125"/>
+            <a:ext cx="6896868" cy="1330741"/>
           </a:xfrm>
         </p:spPr>
         <p:txBody>
@@ -3633,8 +3309,8 @@
         </p:nvSpPr>
         <p:spPr>
           <a:xfrm>
-            <a:off x="4284746" y="0"/>
-            <a:ext cx="3622508" cy="1325563"/>
+            <a:off x="4301483" y="-22125"/>
+            <a:ext cx="3636658" cy="1330741"/>
           </a:xfrm>
         </p:spPr>
         <p:txBody>
@@ -3664,8 +3340,8 @@
         </p:nvGrpSpPr>
         <p:grpSpPr>
           <a:xfrm>
-            <a:off x="1643915" y="1776649"/>
-            <a:ext cx="8466443" cy="1746204"/>
+            <a:off x="1650338" y="1761465"/>
+            <a:ext cx="8499515" cy="1753025"/>
             <a:chOff x="1643915" y="1776649"/>
             <a:chExt cx="8466443" cy="1746204"/>
           </a:xfrm>
@@ -3718,7 +3394,7 @@
             <a:lstStyle/>
             <a:p>
               <a:pPr algn="ctr"/>
-              <a:endParaRPr lang="ru-RU" dirty="0"/>
+              <a:endParaRPr lang="ru-RU" sz="1807" dirty="0"/>
             </a:p>
           </p:txBody>
         </p:sp>
@@ -3756,7 +3432,7 @@
             <a:lstStyle/>
             <a:p>
               <a:r>
-                <a:rPr lang="ru-RU" sz="4000" dirty="0"/>
+                <a:rPr lang="ru-RU" sz="4016" dirty="0"/>
                 <a:t>Сходства</a:t>
               </a:r>
             </a:p>
@@ -3796,7 +3472,7 @@
             <a:lstStyle/>
             <a:p>
               <a:r>
-                <a:rPr lang="ru-RU" sz="4000" dirty="0"/>
+                <a:rPr lang="ru-RU" sz="4016" dirty="0"/>
                 <a:t>Различия</a:t>
               </a:r>
             </a:p>
@@ -3832,8 +3508,8 @@
         </p:blipFill>
         <p:spPr bwMode="auto">
           <a:xfrm>
-            <a:off x="4180050" y="-12032"/>
-            <a:ext cx="3357928" cy="1642351"/>
+            <a:off x="4196379" y="-34204"/>
+            <a:ext cx="3371045" cy="1648766"/>
           </a:xfrm>
           <a:prstGeom prst="rect">
             <a:avLst/>
@@ -4080,8 +3756,8 @@
         </p:nvSpPr>
         <p:spPr>
           <a:xfrm>
-            <a:off x="2376237" y="2766218"/>
-            <a:ext cx="7439526" cy="1325563"/>
+            <a:off x="2385520" y="2754900"/>
+            <a:ext cx="7468587" cy="1330741"/>
           </a:xfrm>
         </p:spPr>
         <p:txBody>
@@ -4111,6 +3787,21 @@
 <file path=ppt/slides/slide2.xml><?xml version="1.0" encoding="utf-8"?>
 <p:sld xmlns:a="http://schemas.openxmlformats.org/drawingml/2006/main" xmlns:r="http://schemas.openxmlformats.org/officeDocument/2006/relationships" xmlns:p="http://schemas.openxmlformats.org/presentationml/2006/main">
   <p:cSld>
+    <p:bg>
+      <p:bgPr>
+        <a:blipFill dpi="0" rotWithShape="1">
+          <a:blip r:embed="rId2">
+            <a:alphaModFix amt="10000"/>
+            <a:lum/>
+          </a:blip>
+          <a:srcRect/>
+          <a:stretch>
+            <a:fillRect/>
+          </a:stretch>
+        </a:blipFill>
+        <a:effectLst/>
+      </p:bgPr>
+    </p:bg>
     <p:spTree>
       <p:nvGrpSpPr>
         <p:cNvPr id="1" name=""/>
@@ -4143,8 +3834,8 @@
         </p:nvSpPr>
         <p:spPr>
           <a:xfrm>
-            <a:off x="3713246" y="190624"/>
-            <a:ext cx="4765508" cy="619877"/>
+            <a:off x="3727752" y="169244"/>
+            <a:ext cx="4784123" cy="622298"/>
           </a:xfrm>
         </p:spPr>
         <p:txBody>
@@ -4154,7 +3845,7 @@
           <a:lstStyle/>
           <a:p>
             <a:r>
-              <a:rPr lang="ru-RU" sz="6000" dirty="0"/>
+              <a:rPr lang="ru-RU" sz="6023" dirty="0"/>
               <a:t>Вводная часть</a:t>
             </a:r>
           </a:p>
@@ -4178,8 +3869,8 @@
         </p:nvSpPr>
         <p:spPr>
           <a:xfrm>
-            <a:off x="2589200" y="3777477"/>
-            <a:ext cx="7013600" cy="2468024"/>
+            <a:off x="2599315" y="3770108"/>
+            <a:ext cx="7040997" cy="2477665"/>
           </a:xfrm>
         </p:spPr>
         <p:txBody>
@@ -4233,8 +3924,8 @@
         </p:nvSpPr>
         <p:spPr>
           <a:xfrm>
-            <a:off x="5468136" y="964120"/>
-            <a:ext cx="1255728" cy="707886"/>
+            <a:off x="5489497" y="945762"/>
+            <a:ext cx="1260633" cy="710651"/>
           </a:xfrm>
           <a:prstGeom prst="rect">
             <a:avLst/>
@@ -4248,7 +3939,7 @@
           <a:lstStyle/>
           <a:p>
             <a:r>
-              <a:rPr lang="ru-RU" sz="4000" dirty="0"/>
+              <a:rPr lang="ru-RU" sz="4016" dirty="0"/>
               <a:t>Цель</a:t>
             </a:r>
           </a:p>
@@ -4268,8 +3959,8 @@
         </p:nvSpPr>
         <p:spPr>
           <a:xfrm>
-            <a:off x="2053771" y="1794698"/>
-            <a:ext cx="8084457" cy="954107"/>
+            <a:off x="2061795" y="1779584"/>
+            <a:ext cx="8116037" cy="957834"/>
           </a:xfrm>
           <a:prstGeom prst="rect">
             <a:avLst/>
@@ -4283,13 +3974,13 @@
           <a:lstStyle/>
           <a:p>
             <a:r>
-              <a:rPr lang="ru-RU" sz="2800" dirty="0"/>
+              <a:rPr lang="ru-RU" sz="2811" dirty="0"/>
               <a:t>Реализовать игру, основанную на двоичной логике </a:t>
             </a:r>
           </a:p>
           <a:p>
             <a:r>
-              <a:rPr lang="ru-RU" sz="2800" dirty="0"/>
+              <a:rPr lang="ru-RU" sz="2811" dirty="0"/>
               <a:t>и построении блок-схем на простейших операция</a:t>
             </a:r>
           </a:p>
@@ -4309,8 +4000,8 @@
         </p:nvSpPr>
         <p:spPr>
           <a:xfrm>
-            <a:off x="5171167" y="2871497"/>
-            <a:ext cx="1849663" cy="707886"/>
+            <a:off x="5191367" y="2860589"/>
+            <a:ext cx="1856888" cy="710651"/>
           </a:xfrm>
           <a:prstGeom prst="rect">
             <a:avLst/>
@@ -4324,7 +4015,7 @@
           <a:lstStyle/>
           <a:p>
             <a:r>
-              <a:rPr lang="ru-RU" sz="4000" dirty="0"/>
+              <a:rPr lang="ru-RU" sz="4016" dirty="0"/>
               <a:t>Задачи</a:t>
             </a:r>
           </a:p>
@@ -4340,12 +4031,34 @@
   <p:clrMapOvr>
     <a:masterClrMapping/>
   </p:clrMapOvr>
+  <p:timing>
+    <p:tnLst>
+      <p:par>
+        <p:cTn id="1" dur="indefinite" restart="never" nodeType="tmRoot"/>
+      </p:par>
+    </p:tnLst>
+  </p:timing>
 </p:sld>
 </file>
 
 <file path=ppt/slides/slide3.xml><?xml version="1.0" encoding="utf-8"?>
 <p:sld xmlns:a="http://schemas.openxmlformats.org/drawingml/2006/main" xmlns:r="http://schemas.openxmlformats.org/officeDocument/2006/relationships" xmlns:p="http://schemas.openxmlformats.org/presentationml/2006/main">
   <p:cSld>
+    <p:bg>
+      <p:bgPr>
+        <a:blipFill dpi="0" rotWithShape="1">
+          <a:blip r:embed="rId2">
+            <a:alphaModFix amt="10000"/>
+            <a:lum/>
+          </a:blip>
+          <a:srcRect/>
+          <a:stretch>
+            <a:fillRect/>
+          </a:stretch>
+        </a:blipFill>
+        <a:effectLst/>
+      </p:bgPr>
+    </p:bg>
     <p:spTree>
       <p:nvGrpSpPr>
         <p:cNvPr id="1" name=""/>
@@ -4378,8 +4091,8 @@
         </p:nvSpPr>
         <p:spPr>
           <a:xfrm>
-            <a:off x="2394284" y="0"/>
-            <a:ext cx="7403432" cy="1325563"/>
+            <a:off x="2403636" y="-22125"/>
+            <a:ext cx="7432352" cy="1330741"/>
           </a:xfrm>
         </p:spPr>
         <p:txBody>
@@ -4403,12 +4116,33 @@
   <p:clrMapOvr>
     <a:masterClrMapping/>
   </p:clrMapOvr>
+  <p:timing>
+    <p:tnLst>
+      <p:par>
+        <p:cTn id="1" dur="indefinite" restart="never" nodeType="tmRoot"/>
+      </p:par>
+    </p:tnLst>
+  </p:timing>
 </p:sld>
 </file>
 
 <file path=ppt/slides/slide4.xml><?xml version="1.0" encoding="utf-8"?>
 <p:sld xmlns:a="http://schemas.openxmlformats.org/drawingml/2006/main" xmlns:r="http://schemas.openxmlformats.org/officeDocument/2006/relationships" xmlns:p="http://schemas.openxmlformats.org/presentationml/2006/main">
   <p:cSld>
+    <p:bg>
+      <p:bgPr>
+        <a:blipFill dpi="0" rotWithShape="1">
+          <a:blip r:embed="rId2">
+            <a:lum/>
+          </a:blip>
+          <a:srcRect/>
+          <a:stretch>
+            <a:fillRect t="-20000" b="-20000"/>
+          </a:stretch>
+        </a:blipFill>
+        <a:effectLst/>
+      </p:bgPr>
+    </p:bg>
     <p:spTree>
       <p:nvGrpSpPr>
         <p:cNvPr id="1" name=""/>
@@ -4425,7 +4159,62 @@
       </p:grpSpPr>
       <p:sp>
         <p:nvSpPr>
-          <p:cNvPr id="2" name="Заголовок 1">
+          <p:cNvPr id="4" name="Прямоугольник 3"/>
+          <p:cNvSpPr/>
+          <p:nvPr/>
+        </p:nvSpPr>
+        <p:spPr>
+          <a:xfrm>
+            <a:off x="539813" y="540268"/>
+            <a:ext cx="11160000" cy="5760000"/>
+          </a:xfrm>
+          <a:prstGeom prst="rect">
+            <a:avLst/>
+          </a:prstGeom>
+          <a:solidFill>
+            <a:schemeClr val="tx1"/>
+          </a:solidFill>
+          <a:ln w="63500">
+            <a:solidFill>
+              <a:schemeClr val="accent6">
+                <a:lumMod val="75000"/>
+              </a:schemeClr>
+            </a:solidFill>
+          </a:ln>
+        </p:spPr>
+        <p:style>
+          <a:lnRef idx="2">
+            <a:schemeClr val="accent1">
+              <a:shade val="50000"/>
+            </a:schemeClr>
+          </a:lnRef>
+          <a:fillRef idx="1">
+            <a:schemeClr val="accent1"/>
+          </a:fillRef>
+          <a:effectRef idx="0">
+            <a:schemeClr val="accent1"/>
+          </a:effectRef>
+          <a:fontRef idx="minor">
+            <a:schemeClr val="lt1"/>
+          </a:fontRef>
+        </p:style>
+        <p:txBody>
+          <a:bodyPr rot="0" spcFirstLastPara="0" vertOverflow="overflow" horzOverflow="overflow" vert="horz" wrap="square" lIns="91797" tIns="45899" rIns="91797" bIns="45899" numCol="1" spcCol="0" rtlCol="0" fromWordArt="0" anchor="ctr" anchorCtr="0" forceAA="0" compatLnSpc="1">
+            <a:prstTxWarp prst="textNoShape">
+              <a:avLst/>
+            </a:prstTxWarp>
+            <a:noAutofit/>
+          </a:bodyPr>
+          <a:lstStyle/>
+          <a:p>
+            <a:pPr algn="ctr"/>
+            <a:endParaRPr lang="ru-RU" sz="1807" dirty="0"/>
+          </a:p>
+        </p:txBody>
+      </p:sp>
+      <p:sp>
+        <p:nvSpPr>
+          <p:cNvPr id="5" name="Заголовок 1">
             <a:extLst>
               <a:ext uri="{FF2B5EF4-FFF2-40B4-BE49-F238E27FC236}">
                 <a16:creationId xmlns:a16="http://schemas.microsoft.com/office/drawing/2014/main" id="{6D8728E5-634E-46B1-9637-28E8C9DBD738}"/>
@@ -4441,8 +4230,8 @@
         </p:nvSpPr>
         <p:spPr>
           <a:xfrm>
-            <a:off x="4146884" y="0"/>
-            <a:ext cx="3898232" cy="1325563"/>
+            <a:off x="3959813" y="540268"/>
+            <a:ext cx="4320000" cy="1080000"/>
           </a:xfrm>
         </p:spPr>
         <p:txBody>
@@ -4451,10 +4240,663 @@
           </a:bodyPr>
           <a:lstStyle/>
           <a:p>
-            <a:r>
-              <a:rPr lang="ru-RU" dirty="0"/>
-              <a:t>Базовые блоки</a:t>
-            </a:r>
+            <a:pPr algn="ctr"/>
+            <a:r>
+              <a:rPr lang="ru-RU" sz="4400" dirty="0" smtClean="0">
+                <a:solidFill>
+                  <a:srgbClr val="77F531"/>
+                </a:solidFill>
+                <a:latin typeface="RodchenkoCTT" pitchFamily="2" charset="0"/>
+                <a:cs typeface="Courier New" panose="02070309020205020404" pitchFamily="49" charset="0"/>
+              </a:rPr>
+              <a:t>БАЗОВЫЕ БЛОКИ</a:t>
+            </a:r>
+            <a:endParaRPr lang="ru-RU" sz="4400" dirty="0">
+              <a:solidFill>
+                <a:srgbClr val="77F531"/>
+              </a:solidFill>
+              <a:latin typeface="RodchenkoCTT" pitchFamily="2" charset="0"/>
+              <a:cs typeface="Courier New" panose="02070309020205020404" pitchFamily="49" charset="0"/>
+            </a:endParaRPr>
+          </a:p>
+        </p:txBody>
+      </p:sp>
+      <p:pic>
+        <p:nvPicPr>
+          <p:cNvPr id="6" name="Рисунок 5"/>
+          <p:cNvPicPr>
+            <a:picLocks noChangeAspect="1"/>
+          </p:cNvPicPr>
+          <p:nvPr/>
+        </p:nvPicPr>
+        <p:blipFill>
+          <a:blip r:embed="rId3" cstate="hqprint">
+            <a:duotone>
+              <a:prstClr val="black"/>
+              <a:schemeClr val="accent6">
+                <a:tint val="45000"/>
+                <a:satMod val="400000"/>
+              </a:schemeClr>
+            </a:duotone>
+            <a:extLst>
+              <a:ext uri="{BEBA8EAE-BF5A-486C-A8C5-ECC9F3942E4B}">
+                <a14:imgProps xmlns:a14="http://schemas.microsoft.com/office/drawing/2010/main">
+                  <a14:imgLayer r:embed="rId4">
+                    <a14:imgEffect>
+                      <a14:colorTemperature colorTemp="7200"/>
+                    </a14:imgEffect>
+                  </a14:imgLayer>
+                </a14:imgProps>
+              </a:ext>
+              <a:ext uri="{28A0092B-C50C-407E-A947-70E740481C1C}">
+                <a14:useLocalDpi xmlns:a14="http://schemas.microsoft.com/office/drawing/2010/main" val="0"/>
+              </a:ext>
+            </a:extLst>
+          </a:blip>
+          <a:stretch>
+            <a:fillRect/>
+          </a:stretch>
+        </p:blipFill>
+        <p:spPr>
+          <a:xfrm>
+            <a:off x="1799813" y="1800000"/>
+            <a:ext cx="1080000" cy="1080000"/>
+          </a:xfrm>
+          <a:prstGeom prst="rect">
+            <a:avLst/>
+          </a:prstGeom>
+        </p:spPr>
+      </p:pic>
+      <p:pic>
+        <p:nvPicPr>
+          <p:cNvPr id="7" name="Рисунок 6"/>
+          <p:cNvPicPr>
+            <a:picLocks noChangeAspect="1"/>
+          </p:cNvPicPr>
+          <p:nvPr/>
+        </p:nvPicPr>
+        <p:blipFill>
+          <a:blip r:embed="rId5" cstate="hqprint">
+            <a:duotone>
+              <a:prstClr val="black"/>
+              <a:schemeClr val="accent6">
+                <a:tint val="45000"/>
+                <a:satMod val="400000"/>
+              </a:schemeClr>
+            </a:duotone>
+            <a:extLst>
+              <a:ext uri="{28A0092B-C50C-407E-A947-70E740481C1C}">
+                <a14:useLocalDpi xmlns:a14="http://schemas.microsoft.com/office/drawing/2010/main" val="0"/>
+              </a:ext>
+            </a:extLst>
+          </a:blip>
+          <a:stretch>
+            <a:fillRect/>
+          </a:stretch>
+        </p:blipFill>
+        <p:spPr>
+          <a:xfrm>
+            <a:off x="4319813" y="1800000"/>
+            <a:ext cx="1080000" cy="1080000"/>
+          </a:xfrm>
+          <a:prstGeom prst="rect">
+            <a:avLst/>
+          </a:prstGeom>
+        </p:spPr>
+      </p:pic>
+      <p:pic>
+        <p:nvPicPr>
+          <p:cNvPr id="8" name="Рисунок 7"/>
+          <p:cNvPicPr>
+            <a:picLocks noChangeAspect="1"/>
+          </p:cNvPicPr>
+          <p:nvPr/>
+        </p:nvPicPr>
+        <p:blipFill>
+          <a:blip r:embed="rId6" cstate="print">
+            <a:duotone>
+              <a:prstClr val="black"/>
+              <a:schemeClr val="accent6">
+                <a:tint val="45000"/>
+                <a:satMod val="400000"/>
+              </a:schemeClr>
+            </a:duotone>
+            <a:extLst>
+              <a:ext uri="{28A0092B-C50C-407E-A947-70E740481C1C}">
+                <a14:useLocalDpi xmlns:a14="http://schemas.microsoft.com/office/drawing/2010/main" val="0"/>
+              </a:ext>
+            </a:extLst>
+          </a:blip>
+          <a:stretch>
+            <a:fillRect/>
+          </a:stretch>
+        </p:blipFill>
+        <p:spPr>
+          <a:xfrm>
+            <a:off x="9359813" y="1800000"/>
+            <a:ext cx="1080000" cy="1080000"/>
+          </a:xfrm>
+          <a:prstGeom prst="rect">
+            <a:avLst/>
+          </a:prstGeom>
+        </p:spPr>
+      </p:pic>
+      <p:pic>
+        <p:nvPicPr>
+          <p:cNvPr id="9" name="Рисунок 8"/>
+          <p:cNvPicPr>
+            <a:picLocks noChangeAspect="1"/>
+          </p:cNvPicPr>
+          <p:nvPr/>
+        </p:nvPicPr>
+        <p:blipFill>
+          <a:blip r:embed="rId7" cstate="hqprint">
+            <a:duotone>
+              <a:prstClr val="black"/>
+              <a:schemeClr val="accent6">
+                <a:tint val="45000"/>
+                <a:satMod val="400000"/>
+              </a:schemeClr>
+            </a:duotone>
+            <a:extLst>
+              <a:ext uri="{28A0092B-C50C-407E-A947-70E740481C1C}">
+                <a14:useLocalDpi xmlns:a14="http://schemas.microsoft.com/office/drawing/2010/main" val="0"/>
+              </a:ext>
+            </a:extLst>
+          </a:blip>
+          <a:stretch>
+            <a:fillRect/>
+          </a:stretch>
+        </p:blipFill>
+        <p:spPr>
+          <a:xfrm>
+            <a:off x="6839813" y="1800000"/>
+            <a:ext cx="1080000" cy="1080000"/>
+          </a:xfrm>
+          <a:prstGeom prst="rect">
+            <a:avLst/>
+          </a:prstGeom>
+        </p:spPr>
+      </p:pic>
+      <p:pic>
+        <p:nvPicPr>
+          <p:cNvPr id="10" name="Рисунок 9"/>
+          <p:cNvPicPr>
+            <a:picLocks noChangeAspect="1"/>
+          </p:cNvPicPr>
+          <p:nvPr/>
+        </p:nvPicPr>
+        <p:blipFill>
+          <a:blip r:embed="rId8" cstate="print">
+            <a:duotone>
+              <a:prstClr val="black"/>
+              <a:schemeClr val="accent6">
+                <a:tint val="45000"/>
+                <a:satMod val="400000"/>
+              </a:schemeClr>
+            </a:duotone>
+            <a:extLst>
+              <a:ext uri="{28A0092B-C50C-407E-A947-70E740481C1C}">
+                <a14:useLocalDpi xmlns:a14="http://schemas.microsoft.com/office/drawing/2010/main" val="0"/>
+              </a:ext>
+            </a:extLst>
+          </a:blip>
+          <a:stretch>
+            <a:fillRect/>
+          </a:stretch>
+        </p:blipFill>
+        <p:spPr>
+          <a:xfrm>
+            <a:off x="8099813" y="3960000"/>
+            <a:ext cx="1080000" cy="1080000"/>
+          </a:xfrm>
+          <a:prstGeom prst="rect">
+            <a:avLst/>
+          </a:prstGeom>
+        </p:spPr>
+      </p:pic>
+      <p:pic>
+        <p:nvPicPr>
+          <p:cNvPr id="11" name="Рисунок 10"/>
+          <p:cNvPicPr>
+            <a:picLocks noChangeAspect="1"/>
+          </p:cNvPicPr>
+          <p:nvPr/>
+        </p:nvPicPr>
+        <p:blipFill>
+          <a:blip r:embed="rId9" cstate="hqprint">
+            <a:duotone>
+              <a:prstClr val="black"/>
+              <a:schemeClr val="accent6">
+                <a:tint val="45000"/>
+                <a:satMod val="400000"/>
+              </a:schemeClr>
+            </a:duotone>
+            <a:extLst>
+              <a:ext uri="{28A0092B-C50C-407E-A947-70E740481C1C}">
+                <a14:useLocalDpi xmlns:a14="http://schemas.microsoft.com/office/drawing/2010/main" val="0"/>
+              </a:ext>
+            </a:extLst>
+          </a:blip>
+          <a:stretch>
+            <a:fillRect/>
+          </a:stretch>
+        </p:blipFill>
+        <p:spPr>
+          <a:xfrm>
+            <a:off x="5579813" y="3960000"/>
+            <a:ext cx="1080000" cy="1080000"/>
+          </a:xfrm>
+          <a:prstGeom prst="rect">
+            <a:avLst/>
+          </a:prstGeom>
+        </p:spPr>
+      </p:pic>
+      <p:pic>
+        <p:nvPicPr>
+          <p:cNvPr id="12" name="Рисунок 11"/>
+          <p:cNvPicPr>
+            <a:picLocks noChangeAspect="1"/>
+          </p:cNvPicPr>
+          <p:nvPr/>
+        </p:nvPicPr>
+        <p:blipFill>
+          <a:blip r:embed="rId10" cstate="hqprint">
+            <a:duotone>
+              <a:prstClr val="black"/>
+              <a:schemeClr val="accent6">
+                <a:tint val="45000"/>
+                <a:satMod val="400000"/>
+              </a:schemeClr>
+            </a:duotone>
+            <a:extLst>
+              <a:ext uri="{28A0092B-C50C-407E-A947-70E740481C1C}">
+                <a14:useLocalDpi xmlns:a14="http://schemas.microsoft.com/office/drawing/2010/main" val="0"/>
+              </a:ext>
+            </a:extLst>
+          </a:blip>
+          <a:stretch>
+            <a:fillRect/>
+          </a:stretch>
+        </p:blipFill>
+        <p:spPr>
+          <a:xfrm>
+            <a:off x="3059813" y="3960000"/>
+            <a:ext cx="1080000" cy="1080000"/>
+          </a:xfrm>
+          <a:prstGeom prst="rect">
+            <a:avLst/>
+          </a:prstGeom>
+        </p:spPr>
+      </p:pic>
+      <p:sp>
+        <p:nvSpPr>
+          <p:cNvPr id="13" name="TextBox 12"/>
+          <p:cNvSpPr txBox="1"/>
+          <p:nvPr/>
+        </p:nvSpPr>
+        <p:spPr>
+          <a:xfrm>
+            <a:off x="1439813" y="2880000"/>
+            <a:ext cx="1800000" cy="360000"/>
+          </a:xfrm>
+          <a:prstGeom prst="rect">
+            <a:avLst/>
+          </a:prstGeom>
+        </p:spPr>
+        <p:txBody>
+          <a:bodyPr vert="horz" lIns="91440" tIns="45720" rIns="91440" bIns="45720" rtlCol="0" anchor="ctr">
+            <a:normAutofit fontScale="85000" lnSpcReduction="20000"/>
+          </a:bodyPr>
+          <a:lstStyle>
+            <a:lvl1pPr algn="ctr" defTabSz="912114">
+              <a:lnSpc>
+                <a:spcPct val="90000"/>
+              </a:lnSpc>
+              <a:spcBef>
+                <a:spcPct val="0"/>
+              </a:spcBef>
+              <a:buNone/>
+              <a:defRPr sz="4400">
+                <a:solidFill>
+                  <a:srgbClr val="77F531"/>
+                </a:solidFill>
+                <a:latin typeface="RodchenkoCTT" pitchFamily="2" charset="0"/>
+                <a:ea typeface="+mj-ea"/>
+                <a:cs typeface="Courier New" panose="02070309020205020404" pitchFamily="49" charset="0"/>
+              </a:defRPr>
+            </a:lvl1pPr>
+          </a:lstStyle>
+          <a:p>
+            <a:r>
+              <a:rPr lang="ru-RU" sz="2800" dirty="0" smtClean="0"/>
+              <a:t>инвертор</a:t>
+            </a:r>
+            <a:endParaRPr lang="ru-RU" sz="2800" dirty="0"/>
+          </a:p>
+        </p:txBody>
+      </p:sp>
+      <p:sp>
+        <p:nvSpPr>
+          <p:cNvPr id="14" name="TextBox 13"/>
+          <p:cNvSpPr txBox="1"/>
+          <p:nvPr/>
+        </p:nvSpPr>
+        <p:spPr>
+          <a:xfrm>
+            <a:off x="2699813" y="5040000"/>
+            <a:ext cx="1800000" cy="360000"/>
+          </a:xfrm>
+          <a:prstGeom prst="rect">
+            <a:avLst/>
+          </a:prstGeom>
+        </p:spPr>
+        <p:txBody>
+          <a:bodyPr vert="horz" lIns="91440" tIns="45720" rIns="91440" bIns="45720" rtlCol="0" anchor="ctr">
+            <a:normAutofit fontScale="85000" lnSpcReduction="20000"/>
+          </a:bodyPr>
+          <a:lstStyle>
+            <a:lvl1pPr algn="ctr" defTabSz="912114">
+              <a:lnSpc>
+                <a:spcPct val="90000"/>
+              </a:lnSpc>
+              <a:spcBef>
+                <a:spcPct val="0"/>
+              </a:spcBef>
+              <a:buNone/>
+              <a:defRPr sz="4400">
+                <a:solidFill>
+                  <a:srgbClr val="77F531"/>
+                </a:solidFill>
+                <a:latin typeface="RodchenkoCTT" pitchFamily="2" charset="0"/>
+                <a:ea typeface="+mj-ea"/>
+                <a:cs typeface="Courier New" panose="02070309020205020404" pitchFamily="49" charset="0"/>
+              </a:defRPr>
+            </a:lvl1pPr>
+          </a:lstStyle>
+          <a:p>
+            <a:r>
+              <a:rPr lang="ru-RU" sz="2800" dirty="0" err="1" smtClean="0"/>
+              <a:t>конъюнктор</a:t>
+            </a:r>
+            <a:endParaRPr lang="ru-RU" sz="2800" dirty="0"/>
+          </a:p>
+        </p:txBody>
+      </p:sp>
+      <p:sp>
+        <p:nvSpPr>
+          <p:cNvPr id="15" name="Прямоугольник 14"/>
+          <p:cNvSpPr/>
+          <p:nvPr/>
+        </p:nvSpPr>
+        <p:spPr>
+          <a:xfrm>
+            <a:off x="5219813" y="5039732"/>
+            <a:ext cx="1800000" cy="360000"/>
+          </a:xfrm>
+          <a:prstGeom prst="rect">
+            <a:avLst/>
+          </a:prstGeom>
+        </p:spPr>
+        <p:txBody>
+          <a:bodyPr vert="horz" lIns="91440" tIns="45720" rIns="91440" bIns="45720" rtlCol="0" anchor="ctr">
+            <a:noAutofit/>
+          </a:bodyPr>
+          <a:lstStyle/>
+          <a:p>
+            <a:pPr algn="ctr" defTabSz="912114">
+              <a:lnSpc>
+                <a:spcPct val="90000"/>
+              </a:lnSpc>
+              <a:spcBef>
+                <a:spcPct val="0"/>
+              </a:spcBef>
+            </a:pPr>
+            <a:r>
+              <a:rPr lang="ru-RU" sz="2400" dirty="0" err="1">
+                <a:solidFill>
+                  <a:srgbClr val="77F531"/>
+                </a:solidFill>
+                <a:latin typeface="RodchenkoCTT" pitchFamily="2" charset="0"/>
+                <a:ea typeface="+mj-ea"/>
+                <a:cs typeface="Courier New" panose="02070309020205020404" pitchFamily="49" charset="0"/>
+              </a:rPr>
+              <a:t>дизъюнктор</a:t>
+            </a:r>
+            <a:endParaRPr lang="ru-RU" sz="2400" dirty="0">
+              <a:solidFill>
+                <a:srgbClr val="77F531"/>
+              </a:solidFill>
+              <a:latin typeface="RodchenkoCTT" pitchFamily="2" charset="0"/>
+              <a:ea typeface="+mj-ea"/>
+              <a:cs typeface="Courier New" panose="02070309020205020404" pitchFamily="49" charset="0"/>
+            </a:endParaRPr>
+          </a:p>
+        </p:txBody>
+      </p:sp>
+      <p:sp>
+        <p:nvSpPr>
+          <p:cNvPr id="18" name="Прямоугольник 17"/>
+          <p:cNvSpPr/>
+          <p:nvPr/>
+        </p:nvSpPr>
+        <p:spPr>
+          <a:xfrm>
+            <a:off x="3960000" y="2879464"/>
+            <a:ext cx="1800000" cy="757130"/>
+          </a:xfrm>
+          <a:prstGeom prst="rect">
+            <a:avLst/>
+          </a:prstGeom>
+        </p:spPr>
+        <p:txBody>
+          <a:bodyPr vert="horz" lIns="91440" tIns="45720" rIns="91440" bIns="45720" rtlCol="0" anchor="ctr">
+            <a:spAutoFit/>
+          </a:bodyPr>
+          <a:lstStyle/>
+          <a:p>
+            <a:pPr algn="ctr" defTabSz="912114">
+              <a:lnSpc>
+                <a:spcPct val="90000"/>
+              </a:lnSpc>
+              <a:spcBef>
+                <a:spcPct val="0"/>
+              </a:spcBef>
+            </a:pPr>
+            <a:r>
+              <a:rPr lang="ru-RU" sz="2400" dirty="0" smtClean="0">
+                <a:solidFill>
+                  <a:srgbClr val="77F531"/>
+                </a:solidFill>
+                <a:latin typeface="RodchenkoCTT" pitchFamily="2" charset="0"/>
+                <a:ea typeface="+mj-ea"/>
+                <a:cs typeface="Courier New" panose="02070309020205020404" pitchFamily="49" charset="0"/>
+              </a:rPr>
+              <a:t>инверсный </a:t>
+            </a:r>
+            <a:r>
+              <a:rPr lang="ru-RU" sz="2400" dirty="0" err="1" smtClean="0">
+                <a:solidFill>
+                  <a:srgbClr val="77F531"/>
+                </a:solidFill>
+                <a:latin typeface="RodchenkoCTT" pitchFamily="2" charset="0"/>
+                <a:ea typeface="+mj-ea"/>
+                <a:cs typeface="Courier New" panose="02070309020205020404" pitchFamily="49" charset="0"/>
+              </a:rPr>
+              <a:t>конъюнктор</a:t>
+            </a:r>
+            <a:endParaRPr lang="ru-RU" sz="2400" dirty="0">
+              <a:solidFill>
+                <a:srgbClr val="77F531"/>
+              </a:solidFill>
+              <a:latin typeface="RodchenkoCTT" pitchFamily="2" charset="0"/>
+              <a:ea typeface="+mj-ea"/>
+              <a:cs typeface="Courier New" panose="02070309020205020404" pitchFamily="49" charset="0"/>
+            </a:endParaRPr>
+          </a:p>
+        </p:txBody>
+      </p:sp>
+      <p:sp>
+        <p:nvSpPr>
+          <p:cNvPr id="20" name="Прямоугольник 19"/>
+          <p:cNvSpPr/>
+          <p:nvPr/>
+        </p:nvSpPr>
+        <p:spPr>
+          <a:xfrm>
+            <a:off x="6480000" y="2879464"/>
+            <a:ext cx="1800000" cy="757130"/>
+          </a:xfrm>
+          <a:prstGeom prst="rect">
+            <a:avLst/>
+          </a:prstGeom>
+        </p:spPr>
+        <p:txBody>
+          <a:bodyPr vert="horz" lIns="91440" tIns="45720" rIns="91440" bIns="45720" rtlCol="0" anchor="ctr">
+            <a:spAutoFit/>
+          </a:bodyPr>
+          <a:lstStyle/>
+          <a:p>
+            <a:pPr algn="ctr" defTabSz="912114">
+              <a:lnSpc>
+                <a:spcPct val="90000"/>
+              </a:lnSpc>
+              <a:spcBef>
+                <a:spcPct val="0"/>
+              </a:spcBef>
+            </a:pPr>
+            <a:r>
+              <a:rPr lang="ru-RU" sz="2400" dirty="0" smtClean="0">
+                <a:solidFill>
+                  <a:srgbClr val="77F531"/>
+                </a:solidFill>
+                <a:latin typeface="RodchenkoCTT" pitchFamily="2" charset="0"/>
+                <a:ea typeface="+mj-ea"/>
+                <a:cs typeface="Courier New" panose="02070309020205020404" pitchFamily="49" charset="0"/>
+              </a:rPr>
+              <a:t>инверсный </a:t>
+            </a:r>
+            <a:r>
+              <a:rPr lang="ru-RU" sz="2400" dirty="0" err="1" smtClean="0">
+                <a:solidFill>
+                  <a:srgbClr val="77F531"/>
+                </a:solidFill>
+                <a:latin typeface="RodchenkoCTT" pitchFamily="2" charset="0"/>
+                <a:ea typeface="+mj-ea"/>
+                <a:cs typeface="Courier New" panose="02070309020205020404" pitchFamily="49" charset="0"/>
+              </a:rPr>
+              <a:t>конъюнктор</a:t>
+            </a:r>
+            <a:endParaRPr lang="ru-RU" sz="2400" dirty="0">
+              <a:solidFill>
+                <a:srgbClr val="77F531"/>
+              </a:solidFill>
+              <a:latin typeface="RodchenkoCTT" pitchFamily="2" charset="0"/>
+              <a:ea typeface="+mj-ea"/>
+              <a:cs typeface="Courier New" panose="02070309020205020404" pitchFamily="49" charset="0"/>
+            </a:endParaRPr>
+          </a:p>
+        </p:txBody>
+      </p:sp>
+      <p:sp>
+        <p:nvSpPr>
+          <p:cNvPr id="21" name="Прямоугольник 20"/>
+          <p:cNvSpPr/>
+          <p:nvPr/>
+        </p:nvSpPr>
+        <p:spPr>
+          <a:xfrm>
+            <a:off x="7739813" y="5039732"/>
+            <a:ext cx="1800000" cy="757130"/>
+          </a:xfrm>
+          <a:prstGeom prst="rect">
+            <a:avLst/>
+          </a:prstGeom>
+        </p:spPr>
+        <p:txBody>
+          <a:bodyPr vert="horz" lIns="91440" tIns="45720" rIns="91440" bIns="45720" rtlCol="0" anchor="ctr">
+            <a:spAutoFit/>
+          </a:bodyPr>
+          <a:lstStyle/>
+          <a:p>
+            <a:pPr algn="ctr" defTabSz="912114">
+              <a:lnSpc>
+                <a:spcPct val="90000"/>
+              </a:lnSpc>
+              <a:spcBef>
+                <a:spcPct val="0"/>
+              </a:spcBef>
+            </a:pPr>
+            <a:r>
+              <a:rPr lang="ru-RU" sz="2400" dirty="0" smtClean="0">
+                <a:solidFill>
+                  <a:srgbClr val="77F531"/>
+                </a:solidFill>
+                <a:latin typeface="RodchenkoCTT" pitchFamily="2" charset="0"/>
+                <a:ea typeface="+mj-ea"/>
+                <a:cs typeface="Courier New" panose="02070309020205020404" pitchFamily="49" charset="0"/>
+              </a:rPr>
+              <a:t>сумматор по модулю 2</a:t>
+            </a:r>
+            <a:endParaRPr lang="ru-RU" sz="2400" dirty="0">
+              <a:solidFill>
+                <a:srgbClr val="77F531"/>
+              </a:solidFill>
+              <a:latin typeface="RodchenkoCTT" pitchFamily="2" charset="0"/>
+              <a:ea typeface="+mj-ea"/>
+              <a:cs typeface="Courier New" panose="02070309020205020404" pitchFamily="49" charset="0"/>
+            </a:endParaRPr>
+          </a:p>
+        </p:txBody>
+      </p:sp>
+      <p:sp>
+        <p:nvSpPr>
+          <p:cNvPr id="22" name="Прямоугольник 21"/>
+          <p:cNvSpPr/>
+          <p:nvPr/>
+        </p:nvSpPr>
+        <p:spPr>
+          <a:xfrm>
+            <a:off x="8999813" y="2880000"/>
+            <a:ext cx="1800000" cy="1080000"/>
+          </a:xfrm>
+          <a:prstGeom prst="rect">
+            <a:avLst/>
+          </a:prstGeom>
+        </p:spPr>
+        <p:txBody>
+          <a:bodyPr vert="horz" lIns="91440" tIns="45720" rIns="91440" bIns="45720" rtlCol="0" anchor="ctr">
+            <a:spAutoFit/>
+          </a:bodyPr>
+          <a:lstStyle/>
+          <a:p>
+            <a:pPr algn="ctr" defTabSz="912114">
+              <a:lnSpc>
+                <a:spcPct val="90000"/>
+              </a:lnSpc>
+              <a:spcBef>
+                <a:spcPct val="0"/>
+              </a:spcBef>
+            </a:pPr>
+            <a:r>
+              <a:rPr lang="ru-RU" sz="2400" dirty="0" smtClean="0">
+                <a:solidFill>
+                  <a:srgbClr val="77F531"/>
+                </a:solidFill>
+                <a:latin typeface="RodchenkoCTT" pitchFamily="2" charset="0"/>
+                <a:ea typeface="+mj-ea"/>
+                <a:cs typeface="Courier New" panose="02070309020205020404" pitchFamily="49" charset="0"/>
+              </a:rPr>
+              <a:t>инверсный сумматор по модулю 2</a:t>
+            </a:r>
+            <a:endParaRPr lang="ru-RU" sz="2400" dirty="0">
+              <a:solidFill>
+                <a:srgbClr val="77F531"/>
+              </a:solidFill>
+              <a:latin typeface="RodchenkoCTT" pitchFamily="2" charset="0"/>
+              <a:ea typeface="+mj-ea"/>
+              <a:cs typeface="Courier New" panose="02070309020205020404" pitchFamily="49" charset="0"/>
+            </a:endParaRPr>
           </a:p>
         </p:txBody>
       </p:sp>
@@ -4468,12 +4910,33 @@
   <p:clrMapOvr>
     <a:masterClrMapping/>
   </p:clrMapOvr>
+  <p:timing>
+    <p:tnLst>
+      <p:par>
+        <p:cTn id="1" dur="indefinite" restart="never" nodeType="tmRoot"/>
+      </p:par>
+    </p:tnLst>
+  </p:timing>
 </p:sld>
 </file>
 
 <file path=ppt/slides/slide5.xml><?xml version="1.0" encoding="utf-8"?>
 <p:sld xmlns:a="http://schemas.openxmlformats.org/drawingml/2006/main" xmlns:r="http://schemas.openxmlformats.org/officeDocument/2006/relationships" xmlns:p="http://schemas.openxmlformats.org/presentationml/2006/main">
   <p:cSld>
+    <p:bg>
+      <p:bgPr>
+        <a:blipFill dpi="0" rotWithShape="1">
+          <a:blip r:embed="rId3">
+            <a:lum/>
+          </a:blip>
+          <a:srcRect/>
+          <a:stretch>
+            <a:fillRect t="-20000" b="-20000"/>
+          </a:stretch>
+        </a:blipFill>
+        <a:effectLst/>
+      </p:bgPr>
+    </p:bg>
     <p:spTree>
       <p:nvGrpSpPr>
         <p:cNvPr id="1" name=""/>
@@ -4490,7 +4953,62 @@
       </p:grpSpPr>
       <p:sp>
         <p:nvSpPr>
-          <p:cNvPr id="2" name="Заголовок 1">
+          <p:cNvPr id="4" name="Прямоугольник 3"/>
+          <p:cNvSpPr/>
+          <p:nvPr/>
+        </p:nvSpPr>
+        <p:spPr>
+          <a:xfrm>
+            <a:off x="539813" y="540269"/>
+            <a:ext cx="11160000" cy="5760000"/>
+          </a:xfrm>
+          <a:prstGeom prst="rect">
+            <a:avLst/>
+          </a:prstGeom>
+          <a:solidFill>
+            <a:schemeClr val="tx1"/>
+          </a:solidFill>
+          <a:ln w="63500">
+            <a:solidFill>
+              <a:schemeClr val="accent6">
+                <a:lumMod val="75000"/>
+              </a:schemeClr>
+            </a:solidFill>
+          </a:ln>
+        </p:spPr>
+        <p:style>
+          <a:lnRef idx="2">
+            <a:schemeClr val="accent1">
+              <a:shade val="50000"/>
+            </a:schemeClr>
+          </a:lnRef>
+          <a:fillRef idx="1">
+            <a:schemeClr val="accent1"/>
+          </a:fillRef>
+          <a:effectRef idx="0">
+            <a:schemeClr val="accent1"/>
+          </a:effectRef>
+          <a:fontRef idx="minor">
+            <a:schemeClr val="lt1"/>
+          </a:fontRef>
+        </p:style>
+        <p:txBody>
+          <a:bodyPr rot="0" spcFirstLastPara="0" vertOverflow="overflow" horzOverflow="overflow" vert="horz" wrap="square" lIns="91797" tIns="45899" rIns="91797" bIns="45899" numCol="1" spcCol="0" rtlCol="0" fromWordArt="0" anchor="ctr" anchorCtr="0" forceAA="0" compatLnSpc="1">
+            <a:prstTxWarp prst="textNoShape">
+              <a:avLst/>
+            </a:prstTxWarp>
+            <a:noAutofit/>
+          </a:bodyPr>
+          <a:lstStyle/>
+          <a:p>
+            <a:pPr algn="ctr"/>
+            <a:endParaRPr lang="ru-RU" sz="1807"/>
+          </a:p>
+        </p:txBody>
+      </p:sp>
+      <p:sp>
+        <p:nvSpPr>
+          <p:cNvPr id="5" name="Заголовок 1">
             <a:extLst>
               <a:ext uri="{FF2B5EF4-FFF2-40B4-BE49-F238E27FC236}">
                 <a16:creationId xmlns:a16="http://schemas.microsoft.com/office/drawing/2014/main" id="{6D8728E5-634E-46B1-9637-28E8C9DBD738}"/>
@@ -4506,8 +5024,8 @@
         </p:nvSpPr>
         <p:spPr>
           <a:xfrm>
-            <a:off x="2767262" y="0"/>
-            <a:ext cx="6657475" cy="1325563"/>
+            <a:off x="2519813" y="540268"/>
+            <a:ext cx="7200000" cy="1080000"/>
           </a:xfrm>
         </p:spPr>
         <p:txBody>
@@ -4517,28 +5035,62 @@
           <a:lstStyle/>
           <a:p>
             <a:r>
-              <a:rPr lang="ru-RU" dirty="0"/>
-              <a:t>Дополнительные действия</a:t>
-            </a:r>
+              <a:rPr lang="ru-RU" sz="4400" dirty="0" smtClean="0">
+                <a:solidFill>
+                  <a:srgbClr val="77F531"/>
+                </a:solidFill>
+                <a:latin typeface="RodchenkoCTT" pitchFamily="2" charset="0"/>
+                <a:cs typeface="Courier New" panose="02070309020205020404" pitchFamily="49" charset="0"/>
+              </a:rPr>
+              <a:t>ДОПОЛНИТЕЛЬНЫЕ ДЕЙСТВИЯ</a:t>
+            </a:r>
+            <a:endParaRPr lang="ru-RU" sz="4400" dirty="0">
+              <a:solidFill>
+                <a:srgbClr val="77F531"/>
+              </a:solidFill>
+              <a:latin typeface="RodchenkoCTT" pitchFamily="2" charset="0"/>
+              <a:cs typeface="Courier New" panose="02070309020205020404" pitchFamily="49" charset="0"/>
+            </a:endParaRPr>
           </a:p>
         </p:txBody>
       </p:sp>
     </p:spTree>
     <p:extLst>
       <p:ext uri="{BB962C8B-B14F-4D97-AF65-F5344CB8AC3E}">
-        <p14:creationId xmlns:p14="http://schemas.microsoft.com/office/powerpoint/2010/main" val="2512793425"/>
+        <p14:creationId xmlns:p14="http://schemas.microsoft.com/office/powerpoint/2010/main" val="2679122907"/>
       </p:ext>
     </p:extLst>
   </p:cSld>
   <p:clrMapOvr>
-    <a:masterClrMapping/>
+    <a:overrideClrMapping bg1="lt1" tx1="dk1" bg2="lt2" tx2="dk2" accent1="accent1" accent2="accent2" accent3="accent3" accent4="accent4" accent5="accent5" accent6="accent6" hlink="hlink" folHlink="folHlink"/>
   </p:clrMapOvr>
+  <p:timing>
+    <p:tnLst>
+      <p:par>
+        <p:cTn id="1" dur="indefinite" restart="never" nodeType="tmRoot"/>
+      </p:par>
+    </p:tnLst>
+  </p:timing>
 </p:sld>
 </file>
 
 <file path=ppt/slides/slide6.xml><?xml version="1.0" encoding="utf-8"?>
 <p:sld xmlns:a="http://schemas.openxmlformats.org/drawingml/2006/main" xmlns:r="http://schemas.openxmlformats.org/officeDocument/2006/relationships" xmlns:p="http://schemas.openxmlformats.org/presentationml/2006/main">
   <p:cSld>
+    <p:bg>
+      <p:bgPr>
+        <a:blipFill dpi="0" rotWithShape="1">
+          <a:blip r:embed="rId3">
+            <a:lum/>
+          </a:blip>
+          <a:srcRect/>
+          <a:stretch>
+            <a:fillRect t="-20000" b="-20000"/>
+          </a:stretch>
+        </a:blipFill>
+        <a:effectLst/>
+      </p:bgPr>
+    </p:bg>
     <p:spTree>
       <p:nvGrpSpPr>
         <p:cNvPr id="1" name=""/>
@@ -4555,7 +5107,62 @@
       </p:grpSpPr>
       <p:sp>
         <p:nvSpPr>
-          <p:cNvPr id="2" name="Заголовок 1">
+          <p:cNvPr id="4" name="Прямоугольник 3"/>
+          <p:cNvSpPr/>
+          <p:nvPr/>
+        </p:nvSpPr>
+        <p:spPr>
+          <a:xfrm>
+            <a:off x="539813" y="540269"/>
+            <a:ext cx="11160000" cy="5760000"/>
+          </a:xfrm>
+          <a:prstGeom prst="rect">
+            <a:avLst/>
+          </a:prstGeom>
+          <a:solidFill>
+            <a:schemeClr val="tx1"/>
+          </a:solidFill>
+          <a:ln w="63500">
+            <a:solidFill>
+              <a:schemeClr val="accent6">
+                <a:lumMod val="75000"/>
+              </a:schemeClr>
+            </a:solidFill>
+          </a:ln>
+        </p:spPr>
+        <p:style>
+          <a:lnRef idx="2">
+            <a:schemeClr val="accent1">
+              <a:shade val="50000"/>
+            </a:schemeClr>
+          </a:lnRef>
+          <a:fillRef idx="1">
+            <a:schemeClr val="accent1"/>
+          </a:fillRef>
+          <a:effectRef idx="0">
+            <a:schemeClr val="accent1"/>
+          </a:effectRef>
+          <a:fontRef idx="minor">
+            <a:schemeClr val="lt1"/>
+          </a:fontRef>
+        </p:style>
+        <p:txBody>
+          <a:bodyPr rot="0" spcFirstLastPara="0" vertOverflow="overflow" horzOverflow="overflow" vert="horz" wrap="square" lIns="91797" tIns="45899" rIns="91797" bIns="45899" numCol="1" spcCol="0" rtlCol="0" fromWordArt="0" anchor="ctr" anchorCtr="0" forceAA="0" compatLnSpc="1">
+            <a:prstTxWarp prst="textNoShape">
+              <a:avLst/>
+            </a:prstTxWarp>
+            <a:noAutofit/>
+          </a:bodyPr>
+          <a:lstStyle/>
+          <a:p>
+            <a:pPr algn="ctr"/>
+            <a:endParaRPr lang="ru-RU" sz="1807"/>
+          </a:p>
+        </p:txBody>
+      </p:sp>
+      <p:sp>
+        <p:nvSpPr>
+          <p:cNvPr id="5" name="Заголовок 1">
             <a:extLst>
               <a:ext uri="{FF2B5EF4-FFF2-40B4-BE49-F238E27FC236}">
                 <a16:creationId xmlns:a16="http://schemas.microsoft.com/office/drawing/2014/main" id="{6D8728E5-634E-46B1-9637-28E8C9DBD738}"/>
@@ -4571,8 +5178,8 @@
         </p:nvSpPr>
         <p:spPr>
           <a:xfrm>
-            <a:off x="4102768" y="0"/>
-            <a:ext cx="3986463" cy="1325563"/>
+            <a:off x="3959813" y="540268"/>
+            <a:ext cx="4320000" cy="1080000"/>
           </a:xfrm>
         </p:spPr>
         <p:txBody>
@@ -4581,29 +5188,64 @@
           </a:bodyPr>
           <a:lstStyle/>
           <a:p>
-            <a:r>
-              <a:rPr lang="ru-RU" dirty="0"/>
-              <a:t>Подсчёт очков</a:t>
-            </a:r>
+            <a:pPr algn="ctr"/>
+            <a:r>
+              <a:rPr lang="ru-RU" sz="4400" dirty="0" smtClean="0">
+                <a:solidFill>
+                  <a:srgbClr val="77F531"/>
+                </a:solidFill>
+                <a:latin typeface="RodchenkoCTT" pitchFamily="2" charset="0"/>
+                <a:cs typeface="Courier New" panose="02070309020205020404" pitchFamily="49" charset="0"/>
+              </a:rPr>
+              <a:t>ПОДСЧЁТ ОЧКОВ</a:t>
+            </a:r>
+            <a:endParaRPr lang="ru-RU" sz="4400" dirty="0">
+              <a:solidFill>
+                <a:srgbClr val="77F531"/>
+              </a:solidFill>
+              <a:latin typeface="RodchenkoCTT" pitchFamily="2" charset="0"/>
+              <a:cs typeface="Courier New" panose="02070309020205020404" pitchFamily="49" charset="0"/>
+            </a:endParaRPr>
           </a:p>
         </p:txBody>
       </p:sp>
     </p:spTree>
     <p:extLst>
       <p:ext uri="{BB962C8B-B14F-4D97-AF65-F5344CB8AC3E}">
-        <p14:creationId xmlns:p14="http://schemas.microsoft.com/office/powerpoint/2010/main" val="3552061907"/>
+        <p14:creationId xmlns:p14="http://schemas.microsoft.com/office/powerpoint/2010/main" val="1416624286"/>
       </p:ext>
     </p:extLst>
   </p:cSld>
   <p:clrMapOvr>
-    <a:masterClrMapping/>
+    <a:overrideClrMapping bg1="lt1" tx1="dk1" bg2="lt2" tx2="dk2" accent1="accent1" accent2="accent2" accent3="accent3" accent4="accent4" accent5="accent5" accent6="accent6" hlink="hlink" folHlink="folHlink"/>
   </p:clrMapOvr>
+  <p:timing>
+    <p:tnLst>
+      <p:par>
+        <p:cTn id="1" dur="indefinite" restart="never" nodeType="tmRoot"/>
+      </p:par>
+    </p:tnLst>
+  </p:timing>
 </p:sld>
 </file>
 
 <file path=ppt/slides/slide7.xml><?xml version="1.0" encoding="utf-8"?>
 <p:sld xmlns:a="http://schemas.openxmlformats.org/drawingml/2006/main" xmlns:r="http://schemas.openxmlformats.org/officeDocument/2006/relationships" xmlns:p="http://schemas.openxmlformats.org/presentationml/2006/main">
   <p:cSld>
+    <p:bg>
+      <p:bgPr>
+        <a:blipFill dpi="0" rotWithShape="1">
+          <a:blip r:embed="rId3">
+            <a:lum/>
+          </a:blip>
+          <a:srcRect/>
+          <a:stretch>
+            <a:fillRect t="-20000" b="-20000"/>
+          </a:stretch>
+        </a:blipFill>
+        <a:effectLst/>
+      </p:bgPr>
+    </p:bg>
     <p:spTree>
       <p:nvGrpSpPr>
         <p:cNvPr id="1" name=""/>
@@ -4620,7 +5262,62 @@
       </p:grpSpPr>
       <p:sp>
         <p:nvSpPr>
-          <p:cNvPr id="2" name="Заголовок 1">
+          <p:cNvPr id="4" name="Прямоугольник 3"/>
+          <p:cNvSpPr/>
+          <p:nvPr/>
+        </p:nvSpPr>
+        <p:spPr>
+          <a:xfrm>
+            <a:off x="539813" y="540269"/>
+            <a:ext cx="11160000" cy="5760000"/>
+          </a:xfrm>
+          <a:prstGeom prst="rect">
+            <a:avLst/>
+          </a:prstGeom>
+          <a:solidFill>
+            <a:schemeClr val="tx1"/>
+          </a:solidFill>
+          <a:ln w="63500">
+            <a:solidFill>
+              <a:schemeClr val="accent6">
+                <a:lumMod val="75000"/>
+              </a:schemeClr>
+            </a:solidFill>
+          </a:ln>
+        </p:spPr>
+        <p:style>
+          <a:lnRef idx="2">
+            <a:schemeClr val="accent1">
+              <a:shade val="50000"/>
+            </a:schemeClr>
+          </a:lnRef>
+          <a:fillRef idx="1">
+            <a:schemeClr val="accent1"/>
+          </a:fillRef>
+          <a:effectRef idx="0">
+            <a:schemeClr val="accent1"/>
+          </a:effectRef>
+          <a:fontRef idx="minor">
+            <a:schemeClr val="lt1"/>
+          </a:fontRef>
+        </p:style>
+        <p:txBody>
+          <a:bodyPr rot="0" spcFirstLastPara="0" vertOverflow="overflow" horzOverflow="overflow" vert="horz" wrap="square" lIns="91797" tIns="45899" rIns="91797" bIns="45899" numCol="1" spcCol="0" rtlCol="0" fromWordArt="0" anchor="ctr" anchorCtr="0" forceAA="0" compatLnSpc="1">
+            <a:prstTxWarp prst="textNoShape">
+              <a:avLst/>
+            </a:prstTxWarp>
+            <a:noAutofit/>
+          </a:bodyPr>
+          <a:lstStyle/>
+          <a:p>
+            <a:pPr algn="ctr"/>
+            <a:endParaRPr lang="ru-RU" sz="1807"/>
+          </a:p>
+        </p:txBody>
+      </p:sp>
+      <p:sp>
+        <p:nvSpPr>
+          <p:cNvPr id="5" name="Заголовок 1">
             <a:extLst>
               <a:ext uri="{FF2B5EF4-FFF2-40B4-BE49-F238E27FC236}">
                 <a16:creationId xmlns:a16="http://schemas.microsoft.com/office/drawing/2014/main" id="{6D8728E5-634E-46B1-9637-28E8C9DBD738}"/>
@@ -4636,8 +5333,8 @@
         </p:nvSpPr>
         <p:spPr>
           <a:xfrm>
-            <a:off x="4676273" y="0"/>
-            <a:ext cx="2839453" cy="1325563"/>
+            <a:off x="3959813" y="540268"/>
+            <a:ext cx="4320000" cy="1080000"/>
           </a:xfrm>
         </p:spPr>
         <p:txBody>
@@ -4646,23 +5343,44 @@
           </a:bodyPr>
           <a:lstStyle/>
           <a:p>
-            <a:r>
-              <a:rPr lang="ru-RU" dirty="0"/>
-              <a:t>Песочница</a:t>
-            </a:r>
+            <a:pPr algn="ctr"/>
+            <a:r>
+              <a:rPr lang="ru-RU" sz="4400" dirty="0" smtClean="0">
+                <a:solidFill>
+                  <a:srgbClr val="77F531"/>
+                </a:solidFill>
+                <a:latin typeface="RodchenkoCTT" pitchFamily="2" charset="0"/>
+                <a:cs typeface="Courier New" panose="02070309020205020404" pitchFamily="49" charset="0"/>
+              </a:rPr>
+              <a:t>ПЕСОЧНИЦА</a:t>
+            </a:r>
+            <a:endParaRPr lang="ru-RU" sz="4400" dirty="0">
+              <a:solidFill>
+                <a:srgbClr val="77F531"/>
+              </a:solidFill>
+              <a:latin typeface="RodchenkoCTT" pitchFamily="2" charset="0"/>
+              <a:cs typeface="Courier New" panose="02070309020205020404" pitchFamily="49" charset="0"/>
+            </a:endParaRPr>
           </a:p>
         </p:txBody>
       </p:sp>
     </p:spTree>
     <p:extLst>
       <p:ext uri="{BB962C8B-B14F-4D97-AF65-F5344CB8AC3E}">
-        <p14:creationId xmlns:p14="http://schemas.microsoft.com/office/powerpoint/2010/main" val="966595111"/>
+        <p14:creationId xmlns:p14="http://schemas.microsoft.com/office/powerpoint/2010/main" val="2329914447"/>
       </p:ext>
     </p:extLst>
   </p:cSld>
   <p:clrMapOvr>
-    <a:masterClrMapping/>
+    <a:overrideClrMapping bg1="lt1" tx1="dk1" bg2="lt2" tx2="dk2" accent1="accent1" accent2="accent2" accent3="accent3" accent4="accent4" accent5="accent5" accent6="accent6" hlink="hlink" folHlink="folHlink"/>
   </p:clrMapOvr>
+  <p:timing>
+    <p:tnLst>
+      <p:par>
+        <p:cTn id="1" dur="indefinite" restart="never" nodeType="tmRoot"/>
+      </p:par>
+    </p:tnLst>
+  </p:timing>
 </p:sld>
 </file>
 
@@ -4701,8 +5419,8 @@
         </p:nvSpPr>
         <p:spPr>
           <a:xfrm>
-            <a:off x="4676273" y="0"/>
-            <a:ext cx="2839453" cy="1325563"/>
+            <a:off x="4694541" y="-22125"/>
+            <a:ext cx="2850545" cy="1330741"/>
           </a:xfrm>
         </p:spPr>
         <p:txBody>
@@ -4728,6 +5446,13 @@
   <p:clrMapOvr>
     <a:masterClrMapping/>
   </p:clrMapOvr>
+  <p:timing>
+    <p:tnLst>
+      <p:par>
+        <p:cTn id="1" dur="indefinite" restart="never" nodeType="tmRoot"/>
+      </p:par>
+    </p:tnLst>
+  </p:timing>
 </p:sld>
 </file>
 
@@ -4766,8 +5491,8 @@
         </p:nvSpPr>
         <p:spPr>
           <a:xfrm>
-            <a:off x="3695699" y="0"/>
-            <a:ext cx="4800601" cy="1325563"/>
+            <a:off x="3710137" y="-22125"/>
+            <a:ext cx="4819353" cy="1330741"/>
           </a:xfrm>
         </p:spPr>
         <p:txBody>
@@ -4799,7 +5524,7 @@
 <file path=ppt/theme/theme1.xml><?xml version="1.0" encoding="utf-8"?>
 <a:theme xmlns:a="http://schemas.openxmlformats.org/drawingml/2006/main" name="Тема Office">
   <a:themeElements>
-    <a:clrScheme name="Стандартная">
+    <a:clrScheme name="Тема Office">
       <a:dk1>
         <a:sysClr val="windowText" lastClr="000000"/>
       </a:dk1>
@@ -4813,7 +5538,7 @@
         <a:srgbClr val="E7E6E6"/>
       </a:lt2>
       <a:accent1>
-        <a:srgbClr val="4472C4"/>
+        <a:srgbClr val="5B9BD5"/>
       </a:accent1>
       <a:accent2>
         <a:srgbClr val="ED7D31"/>
@@ -4825,7 +5550,7 @@
         <a:srgbClr val="FFC000"/>
       </a:accent4>
       <a:accent5>
-        <a:srgbClr val="5B9BD5"/>
+        <a:srgbClr val="4472C4"/>
       </a:accent5>
       <a:accent6>
         <a:srgbClr val="70AD47"/>
@@ -4837,7 +5562,7 @@
         <a:srgbClr val="954F72"/>
       </a:folHlink>
     </a:clrScheme>
-    <a:fontScheme name="Стандартная">
+    <a:fontScheme name="Тема Office">
       <a:majorFont>
         <a:latin typeface="Calibri Light" panose="020F0302020204030204"/>
         <a:ea typeface=""/>
@@ -4872,23 +5597,6 @@
         <a:font script="Viet" typeface="Times New Roman"/>
         <a:font script="Uigh" typeface="Microsoft Uighur"/>
         <a:font script="Geor" typeface="Sylfaen"/>
-        <a:font script="Armn" typeface="Arial"/>
-        <a:font script="Bugi" typeface="Leelawadee UI"/>
-        <a:font script="Bopo" typeface="Microsoft JhengHei"/>
-        <a:font script="Java" typeface="Javanese Text"/>
-        <a:font script="Lisu" typeface="Segoe UI"/>
-        <a:font script="Mymr" typeface="Myanmar Text"/>
-        <a:font script="Nkoo" typeface="Ebrima"/>
-        <a:font script="Olck" typeface="Nirmala UI"/>
-        <a:font script="Osma" typeface="Ebrima"/>
-        <a:font script="Phag" typeface="Phagspa"/>
-        <a:font script="Syrn" typeface="Estrangelo Edessa"/>
-        <a:font script="Syrj" typeface="Estrangelo Edessa"/>
-        <a:font script="Syre" typeface="Estrangelo Edessa"/>
-        <a:font script="Sora" typeface="Nirmala UI"/>
-        <a:font script="Tale" typeface="Microsoft Tai Le"/>
-        <a:font script="Talu" typeface="Microsoft New Tai Lue"/>
-        <a:font script="Tfng" typeface="Ebrima"/>
       </a:majorFont>
       <a:minorFont>
         <a:latin typeface="Calibri" panose="020F0502020204030204"/>
@@ -4924,26 +5632,9 @@
         <a:font script="Viet" typeface="Arial"/>
         <a:font script="Uigh" typeface="Microsoft Uighur"/>
         <a:font script="Geor" typeface="Sylfaen"/>
-        <a:font script="Armn" typeface="Arial"/>
-        <a:font script="Bugi" typeface="Leelawadee UI"/>
-        <a:font script="Bopo" typeface="Microsoft JhengHei"/>
-        <a:font script="Java" typeface="Javanese Text"/>
-        <a:font script="Lisu" typeface="Segoe UI"/>
-        <a:font script="Mymr" typeface="Myanmar Text"/>
-        <a:font script="Nkoo" typeface="Ebrima"/>
-        <a:font script="Olck" typeface="Nirmala UI"/>
-        <a:font script="Osma" typeface="Ebrima"/>
-        <a:font script="Phag" typeface="Phagspa"/>
-        <a:font script="Syrn" typeface="Estrangelo Edessa"/>
-        <a:font script="Syrj" typeface="Estrangelo Edessa"/>
-        <a:font script="Syre" typeface="Estrangelo Edessa"/>
-        <a:font script="Sora" typeface="Nirmala UI"/>
-        <a:font script="Tale" typeface="Microsoft Tai Le"/>
-        <a:font script="Talu" typeface="Microsoft New Tai Lue"/>
-        <a:font script="Tfng" typeface="Ebrima"/>
       </a:minorFont>
     </a:fontScheme>
-    <a:fmtScheme name="Стандартная">
+    <a:fmtScheme name="Тема Office">
       <a:fillStyleLst>
         <a:solidFill>
           <a:schemeClr val="phClr"/>
@@ -5089,4 +5780,133 @@
     </a:ext>
   </a:extLst>
 </a:theme>
+</file>
+
+<file path=ppt/theme/themeOverride1.xml><?xml version="1.0" encoding="utf-8"?>
+<a:themeOverride xmlns:a="http://schemas.openxmlformats.org/drawingml/2006/main">
+  <a:clrScheme name="Тема Office">
+    <a:dk1>
+      <a:sysClr val="windowText" lastClr="000000"/>
+    </a:dk1>
+    <a:lt1>
+      <a:sysClr val="window" lastClr="FFFFFF"/>
+    </a:lt1>
+    <a:dk2>
+      <a:srgbClr val="44546A"/>
+    </a:dk2>
+    <a:lt2>
+      <a:srgbClr val="E7E6E6"/>
+    </a:lt2>
+    <a:accent1>
+      <a:srgbClr val="5B9BD5"/>
+    </a:accent1>
+    <a:accent2>
+      <a:srgbClr val="ED7D31"/>
+    </a:accent2>
+    <a:accent3>
+      <a:srgbClr val="A5A5A5"/>
+    </a:accent3>
+    <a:accent4>
+      <a:srgbClr val="FFC000"/>
+    </a:accent4>
+    <a:accent5>
+      <a:srgbClr val="4472C4"/>
+    </a:accent5>
+    <a:accent6>
+      <a:srgbClr val="70AD47"/>
+    </a:accent6>
+    <a:hlink>
+      <a:srgbClr val="0563C1"/>
+    </a:hlink>
+    <a:folHlink>
+      <a:srgbClr val="954F72"/>
+    </a:folHlink>
+  </a:clrScheme>
+</a:themeOverride>
+</file>
+
+<file path=ppt/theme/themeOverride2.xml><?xml version="1.0" encoding="utf-8"?>
+<a:themeOverride xmlns:a="http://schemas.openxmlformats.org/drawingml/2006/main">
+  <a:clrScheme name="Тема Office">
+    <a:dk1>
+      <a:sysClr val="windowText" lastClr="000000"/>
+    </a:dk1>
+    <a:lt1>
+      <a:sysClr val="window" lastClr="FFFFFF"/>
+    </a:lt1>
+    <a:dk2>
+      <a:srgbClr val="44546A"/>
+    </a:dk2>
+    <a:lt2>
+      <a:srgbClr val="E7E6E6"/>
+    </a:lt2>
+    <a:accent1>
+      <a:srgbClr val="5B9BD5"/>
+    </a:accent1>
+    <a:accent2>
+      <a:srgbClr val="ED7D31"/>
+    </a:accent2>
+    <a:accent3>
+      <a:srgbClr val="A5A5A5"/>
+    </a:accent3>
+    <a:accent4>
+      <a:srgbClr val="FFC000"/>
+    </a:accent4>
+    <a:accent5>
+      <a:srgbClr val="4472C4"/>
+    </a:accent5>
+    <a:accent6>
+      <a:srgbClr val="70AD47"/>
+    </a:accent6>
+    <a:hlink>
+      <a:srgbClr val="0563C1"/>
+    </a:hlink>
+    <a:folHlink>
+      <a:srgbClr val="954F72"/>
+    </a:folHlink>
+  </a:clrScheme>
+</a:themeOverride>
+</file>
+
+<file path=ppt/theme/themeOverride3.xml><?xml version="1.0" encoding="utf-8"?>
+<a:themeOverride xmlns:a="http://schemas.openxmlformats.org/drawingml/2006/main">
+  <a:clrScheme name="Тема Office">
+    <a:dk1>
+      <a:sysClr val="windowText" lastClr="000000"/>
+    </a:dk1>
+    <a:lt1>
+      <a:sysClr val="window" lastClr="FFFFFF"/>
+    </a:lt1>
+    <a:dk2>
+      <a:srgbClr val="44546A"/>
+    </a:dk2>
+    <a:lt2>
+      <a:srgbClr val="E7E6E6"/>
+    </a:lt2>
+    <a:accent1>
+      <a:srgbClr val="5B9BD5"/>
+    </a:accent1>
+    <a:accent2>
+      <a:srgbClr val="ED7D31"/>
+    </a:accent2>
+    <a:accent3>
+      <a:srgbClr val="A5A5A5"/>
+    </a:accent3>
+    <a:accent4>
+      <a:srgbClr val="FFC000"/>
+    </a:accent4>
+    <a:accent5>
+      <a:srgbClr val="4472C4"/>
+    </a:accent5>
+    <a:accent6>
+      <a:srgbClr val="70AD47"/>
+    </a:accent6>
+    <a:hlink>
+      <a:srgbClr val="0563C1"/>
+    </a:hlink>
+    <a:folHlink>
+      <a:srgbClr val="954F72"/>
+    </a:folHlink>
+  </a:clrScheme>
+</a:themeOverride>
 </file>
</xml_diff>

<commit_message>
Presentation update - 3
</commit_message>
<xml_diff>
--- a/presentation.pptx
+++ b/presentation.pptx
@@ -7,8 +7,8 @@
   <p:sldIdLst>
     <p:sldId id="256" r:id="rId2"/>
     <p:sldId id="257" r:id="rId3"/>
-    <p:sldId id="260" r:id="rId4"/>
-    <p:sldId id="274" r:id="rId5"/>
+    <p:sldId id="274" r:id="rId4"/>
+    <p:sldId id="260" r:id="rId5"/>
     <p:sldId id="269" r:id="rId6"/>
     <p:sldId id="270" r:id="rId7"/>
     <p:sldId id="271" r:id="rId8"/>
@@ -19,7 +19,7 @@
     <p:sldId id="268" r:id="rId13"/>
     <p:sldId id="272" r:id="rId14"/>
     <p:sldId id="267" r:id="rId15"/>
-    <p:sldId id="258" r:id="rId16"/>
+    <p:sldId id="275" r:id="rId16"/>
   </p:sldIdLst>
   <p:sldSz cx="12239625" cy="6840538"/>
   <p:notesSz cx="6858000" cy="9144000"/>
@@ -129,8 +129,8 @@
         </p14:section>
         <p14:section name="Механики" id="{A393419E-EA50-4CCA-8D41-F0CCF1C77C8E}">
           <p14:sldIdLst>
+            <p14:sldId id="274"/>
             <p14:sldId id="260"/>
-            <p14:sldId id="274"/>
             <p14:sldId id="269"/>
             <p14:sldId id="270"/>
             <p14:sldId id="271"/>
@@ -157,7 +157,7 @@
         </p14:section>
         <p14:section name="Благодарение" id="{B797DD09-EBBF-4DFD-8055-741D0C2E6705}">
           <p14:sldIdLst>
-            <p14:sldId id="258"/>
+            <p14:sldId id="275"/>
           </p14:sldIdLst>
         </p14:section>
       </p14:sectionLst>
@@ -3063,30 +3063,30 @@
         </p:nvSpPr>
         <p:spPr>
           <a:xfrm>
-            <a:off x="2277315" y="2635161"/>
-            <a:ext cx="7684997" cy="1570216"/>
+            <a:off x="359813" y="2340269"/>
+            <a:ext cx="11520000" cy="2160000"/>
           </a:xfrm>
         </p:spPr>
         <p:txBody>
-          <a:bodyPr>
+          <a:bodyPr anchor="ctr">
             <a:noAutofit/>
           </a:bodyPr>
           <a:lstStyle/>
           <a:p>
             <a:r>
-              <a:rPr lang="ru-RU" dirty="0"/>
-              <a:t>Проект </a:t>
+              <a:rPr lang="ru-RU" dirty="0" smtClean="0"/>
+              <a:t>Компьютерная игра</a:t>
+            </a:r>
+            <a:br>
+              <a:rPr lang="ru-RU" dirty="0" smtClean="0"/>
+            </a:br>
+            <a:r>
+              <a:rPr lang="ru-RU" dirty="0" smtClean="0"/>
+              <a:t>«Логические </a:t>
             </a:r>
             <a:r>
-              <a:rPr lang="en-US" dirty="0" err="1"/>
-              <a:t>pygame</a:t>
-            </a:r>
-            <a:br>
-              <a:rPr lang="en-US" dirty="0"/>
-            </a:br>
-            <a:r>
               <a:rPr lang="ru-RU" dirty="0"/>
-              <a:t>«Логические функции»</a:t>
+              <a:t>функции»</a:t>
             </a:r>
           </a:p>
         </p:txBody>
@@ -3124,6 +3124,69 @@
           </a:p>
         </p:txBody>
       </p:sp>
+      <p:sp>
+        <p:nvSpPr>
+          <p:cNvPr id="4" name="Заголовок 1">
+            <a:extLst>
+              <a:ext uri="{FF2B5EF4-FFF2-40B4-BE49-F238E27FC236}">
+                <a16:creationId xmlns:a16="http://schemas.microsoft.com/office/drawing/2014/main" id="{7D5AD255-2E5B-49E0-AC97-94A3C31A92E7}"/>
+              </a:ext>
+            </a:extLst>
+          </p:cNvPr>
+          <p:cNvSpPr txBox="1">
+            <a:spLocks/>
+          </p:cNvSpPr>
+          <p:nvPr/>
+        </p:nvSpPr>
+        <p:spPr>
+          <a:xfrm>
+            <a:off x="1799813" y="1620269"/>
+            <a:ext cx="8640000" cy="720000"/>
+          </a:xfrm>
+          <a:prstGeom prst="rect">
+            <a:avLst/>
+          </a:prstGeom>
+        </p:spPr>
+        <p:txBody>
+          <a:bodyPr vert="horz" lIns="91440" tIns="45720" rIns="91440" bIns="45720" rtlCol="0" anchor="ctr">
+            <a:noAutofit/>
+          </a:bodyPr>
+          <a:lstStyle>
+            <a:lvl1pPr algn="ctr" defTabSz="912114" rtl="0" eaLnBrk="1" latinLnBrk="0" hangingPunct="1">
+              <a:lnSpc>
+                <a:spcPct val="90000"/>
+              </a:lnSpc>
+              <a:spcBef>
+                <a:spcPct val="0"/>
+              </a:spcBef>
+              <a:buNone/>
+              <a:defRPr sz="5985" kern="1200">
+                <a:solidFill>
+                  <a:schemeClr val="tx1"/>
+                </a:solidFill>
+                <a:latin typeface="+mj-lt"/>
+                <a:ea typeface="+mj-ea"/>
+                <a:cs typeface="+mj-cs"/>
+              </a:defRPr>
+            </a:lvl1pPr>
+          </a:lstStyle>
+          <a:p>
+            <a:r>
+              <a:rPr lang="ru-RU" sz="4000" dirty="0" smtClean="0"/>
+              <a:t>Проектная работа по модулю "</a:t>
+            </a:r>
+            <a:r>
+              <a:rPr lang="en-US" sz="4000" dirty="0" err="1" smtClean="0"/>
+              <a:t>pygame</a:t>
+            </a:r>
+            <a:r>
+              <a:rPr lang="ru-RU" sz="4000" dirty="0" smtClean="0"/>
+              <a:t>"</a:t>
+            </a:r>
+            <a:endParaRPr lang="ru-RU" sz="4000" dirty="0"/>
+          </a:p>
+        </p:txBody>
+      </p:sp>
     </p:spTree>
     <p:extLst>
       <p:ext uri="{BB962C8B-B14F-4D97-AF65-F5344CB8AC3E}">
@@ -3134,6 +3197,13 @@
   <p:clrMapOvr>
     <a:masterClrMapping/>
   </p:clrMapOvr>
+  <p:timing>
+    <p:tnLst>
+      <p:par>
+        <p:cTn id="1" dur="indefinite" restart="never" nodeType="tmRoot"/>
+      </p:par>
+    </p:tnLst>
+  </p:timing>
 </p:sld>
 </file>
 
@@ -10379,7 +10449,7 @@
             <p:nvPr/>
           </p:nvPicPr>
           <p:blipFill>
-            <a:blip r:embed="rId7">
+            <a:blip r:embed="rId7" cstate="hqprint">
               <a:extLst>
                 <a:ext uri="{28A0092B-C50C-407E-A947-70E740481C1C}">
                   <a14:useLocalDpi xmlns:a14="http://schemas.microsoft.com/office/drawing/2010/main" val="0"/>
@@ -10988,9 +11058,15 @@
   <p:cSld>
     <p:bg>
       <p:bgPr>
-        <a:solidFill>
-          <a:schemeClr val="bg1"/>
-        </a:solidFill>
+        <a:blipFill dpi="0" rotWithShape="1">
+          <a:blip r:embed="rId3">
+            <a:lum/>
+          </a:blip>
+          <a:srcRect/>
+          <a:stretch>
+            <a:fillRect t="-20000" b="-20000"/>
+          </a:stretch>
+        </a:blipFill>
         <a:effectLst/>
       </p:bgPr>
     </p:bg>
@@ -11010,13 +11086,62 @@
       </p:grpSpPr>
       <p:sp>
         <p:nvSpPr>
-          <p:cNvPr id="2" name="Заголовок 1">
-            <a:extLst>
-              <a:ext uri="{FF2B5EF4-FFF2-40B4-BE49-F238E27FC236}">
-                <a16:creationId xmlns:a16="http://schemas.microsoft.com/office/drawing/2014/main" id="{BFF231EF-1BF6-4E60-BC11-A19C422D0C9A}"/>
-              </a:ext>
-            </a:extLst>
-          </p:cNvPr>
+          <p:cNvPr id="4" name="Прямоугольник 3"/>
+          <p:cNvSpPr/>
+          <p:nvPr/>
+        </p:nvSpPr>
+        <p:spPr>
+          <a:xfrm>
+            <a:off x="539812" y="540268"/>
+            <a:ext cx="11160000" cy="5760000"/>
+          </a:xfrm>
+          <a:prstGeom prst="rect">
+            <a:avLst/>
+          </a:prstGeom>
+          <a:solidFill>
+            <a:schemeClr val="tx1"/>
+          </a:solidFill>
+          <a:ln w="63500">
+            <a:solidFill>
+              <a:schemeClr val="accent6">
+                <a:lumMod val="75000"/>
+              </a:schemeClr>
+            </a:solidFill>
+          </a:ln>
+        </p:spPr>
+        <p:style>
+          <a:lnRef idx="2">
+            <a:schemeClr val="accent1">
+              <a:shade val="50000"/>
+            </a:schemeClr>
+          </a:lnRef>
+          <a:fillRef idx="1">
+            <a:schemeClr val="accent1"/>
+          </a:fillRef>
+          <a:effectRef idx="0">
+            <a:schemeClr val="accent1"/>
+          </a:effectRef>
+          <a:fontRef idx="minor">
+            <a:schemeClr val="lt1"/>
+          </a:fontRef>
+        </p:style>
+        <p:txBody>
+          <a:bodyPr rot="0" spcFirstLastPara="0" vertOverflow="overflow" horzOverflow="overflow" vert="horz" wrap="square" lIns="91797" tIns="45899" rIns="91797" bIns="45899" numCol="1" spcCol="0" rtlCol="0" fromWordArt="0" anchor="ctr" anchorCtr="0" forceAA="0" compatLnSpc="1">
+            <a:prstTxWarp prst="textNoShape">
+              <a:avLst/>
+            </a:prstTxWarp>
+            <a:noAutofit/>
+          </a:bodyPr>
+          <a:lstStyle/>
+          <a:p>
+            <a:pPr algn="ctr"/>
+            <a:endParaRPr lang="ru-RU" sz="1807" dirty="0"/>
+          </a:p>
+        </p:txBody>
+      </p:sp>
+      <p:sp>
+        <p:nvSpPr>
+          <p:cNvPr id="2" name="Заголовок 1"/>
           <p:cNvSpPr>
             <a:spLocks noGrp="1"/>
           </p:cNvSpPr>
@@ -11026,33 +11151,54 @@
         </p:nvSpPr>
         <p:spPr>
           <a:xfrm>
-            <a:off x="3263459" y="2775999"/>
-            <a:ext cx="5929274" cy="1081040"/>
+            <a:off x="841474" y="2759174"/>
+            <a:ext cx="10556677" cy="1322188"/>
           </a:xfrm>
         </p:spPr>
         <p:txBody>
-          <a:bodyPr/>
+          <a:bodyPr vert="horz" lIns="91440" tIns="45720" rIns="91440" bIns="45720" rtlCol="0" anchor="ctr">
+            <a:normAutofit/>
+          </a:bodyPr>
           <a:lstStyle/>
           <a:p>
+            <a:pPr algn="ctr"/>
             <a:r>
-              <a:rPr lang="ru-RU" dirty="0">
+              <a:rPr lang="ru-RU" sz="7200" dirty="0" smtClean="0">
+                <a:solidFill>
+                  <a:srgbClr val="77F531"/>
+                </a:solidFill>
                 <a:latin typeface="RodchenkoCTT" pitchFamily="2" charset="0"/>
+                <a:cs typeface="Courier New" panose="02070309020205020404" pitchFamily="49" charset="0"/>
               </a:rPr>
-              <a:t>СПАСИБО ЗА ВНИМАНИЕ!</a:t>
+              <a:t>СПАСИБО ЗА ВНИМАНИЕ</a:t>
             </a:r>
+            <a:endParaRPr lang="ru-RU" sz="7200" dirty="0">
+              <a:solidFill>
+                <a:srgbClr val="77F531"/>
+              </a:solidFill>
+              <a:latin typeface="RodchenkoCTT" pitchFamily="2" charset="0"/>
+              <a:cs typeface="Courier New" panose="02070309020205020404" pitchFamily="49" charset="0"/>
+            </a:endParaRPr>
           </a:p>
         </p:txBody>
       </p:sp>
     </p:spTree>
     <p:extLst>
       <p:ext uri="{BB962C8B-B14F-4D97-AF65-F5344CB8AC3E}">
-        <p14:creationId xmlns:p14="http://schemas.microsoft.com/office/powerpoint/2010/main" val="2798486509"/>
+        <p14:creationId xmlns:p14="http://schemas.microsoft.com/office/powerpoint/2010/main" val="3328635156"/>
       </p:ext>
     </p:extLst>
   </p:cSld>
   <p:clrMapOvr>
-    <a:masterClrMapping/>
+    <a:overrideClrMapping bg1="lt1" tx1="dk1" bg2="lt2" tx2="dk2" accent1="accent1" accent2="accent2" accent3="accent3" accent4="accent4" accent5="accent5" accent6="accent6" hlink="hlink" folHlink="folHlink"/>
   </p:clrMapOvr>
+  <p:timing>
+    <p:tnLst>
+      <p:par>
+        <p:cTn id="1" dur="indefinite" restart="never" nodeType="tmRoot"/>
+      </p:par>
+    </p:tnLst>
+  </p:timing>
 </p:sld>
 </file>
 
@@ -11303,10 +11449,1131 @@
   <p:clrMapOvr>
     <a:masterClrMapping/>
   </p:clrMapOvr>
+  <p:timing>
+    <p:tnLst>
+      <p:par>
+        <p:cTn id="1" dur="indefinite" restart="never" nodeType="tmRoot"/>
+      </p:par>
+    </p:tnLst>
+  </p:timing>
 </p:sld>
 </file>
 
 <file path=ppt/slides/slide3.xml><?xml version="1.0" encoding="utf-8"?>
+<p:sld xmlns:a="http://schemas.openxmlformats.org/drawingml/2006/main" xmlns:r="http://schemas.openxmlformats.org/officeDocument/2006/relationships" xmlns:p="http://schemas.openxmlformats.org/presentationml/2006/main">
+  <p:cSld>
+    <p:bg>
+      <p:bgPr>
+        <a:blipFill dpi="0" rotWithShape="1">
+          <a:blip r:embed="rId3">
+            <a:lum/>
+          </a:blip>
+          <a:srcRect/>
+          <a:stretch>
+            <a:fillRect t="-20000" b="-20000"/>
+          </a:stretch>
+        </a:blipFill>
+        <a:effectLst/>
+      </p:bgPr>
+    </p:bg>
+    <p:spTree>
+      <p:nvGrpSpPr>
+        <p:cNvPr id="1" name=""/>
+        <p:cNvGrpSpPr/>
+        <p:nvPr/>
+      </p:nvGrpSpPr>
+      <p:grpSpPr>
+        <a:xfrm>
+          <a:off x="0" y="0"/>
+          <a:ext cx="0" cy="0"/>
+          <a:chOff x="0" y="0"/>
+          <a:chExt cx="0" cy="0"/>
+        </a:xfrm>
+      </p:grpSpPr>
+      <p:sp>
+        <p:nvSpPr>
+          <p:cNvPr id="4" name="Прямоугольник 3"/>
+          <p:cNvSpPr/>
+          <p:nvPr/>
+        </p:nvSpPr>
+        <p:spPr>
+          <a:xfrm>
+            <a:off x="539813" y="540269"/>
+            <a:ext cx="11160000" cy="5760000"/>
+          </a:xfrm>
+          <a:prstGeom prst="rect">
+            <a:avLst/>
+          </a:prstGeom>
+          <a:solidFill>
+            <a:schemeClr val="tx1"/>
+          </a:solidFill>
+          <a:ln w="63500">
+            <a:solidFill>
+              <a:schemeClr val="accent6">
+                <a:lumMod val="75000"/>
+              </a:schemeClr>
+            </a:solidFill>
+          </a:ln>
+        </p:spPr>
+        <p:style>
+          <a:lnRef idx="2">
+            <a:schemeClr val="accent1">
+              <a:shade val="50000"/>
+            </a:schemeClr>
+          </a:lnRef>
+          <a:fillRef idx="1">
+            <a:schemeClr val="accent1"/>
+          </a:fillRef>
+          <a:effectRef idx="0">
+            <a:schemeClr val="accent1"/>
+          </a:effectRef>
+          <a:fontRef idx="minor">
+            <a:schemeClr val="lt1"/>
+          </a:fontRef>
+        </p:style>
+        <p:txBody>
+          <a:bodyPr rot="0" spcFirstLastPara="0" vertOverflow="overflow" horzOverflow="overflow" vert="horz" wrap="square" lIns="91797" tIns="45899" rIns="91797" bIns="45899" numCol="1" spcCol="0" rtlCol="0" fromWordArt="0" anchor="ctr" anchorCtr="0" forceAA="0" compatLnSpc="1">
+            <a:prstTxWarp prst="textNoShape">
+              <a:avLst/>
+            </a:prstTxWarp>
+            <a:noAutofit/>
+          </a:bodyPr>
+          <a:lstStyle/>
+          <a:p>
+            <a:pPr algn="ctr"/>
+            <a:endParaRPr lang="ru-RU" sz="1807"/>
+          </a:p>
+        </p:txBody>
+      </p:sp>
+      <p:pic>
+        <p:nvPicPr>
+          <p:cNvPr id="18" name="Рисунок 17"/>
+          <p:cNvPicPr>
+            <a:picLocks noChangeAspect="1"/>
+          </p:cNvPicPr>
+          <p:nvPr/>
+        </p:nvPicPr>
+        <p:blipFill rotWithShape="1">
+          <a:blip r:embed="rId4"/>
+          <a:srcRect l="39969" t="14548" r="24907" b="11230"/>
+          <a:stretch/>
+        </p:blipFill>
+        <p:spPr>
+          <a:xfrm>
+            <a:off x="5548861" y="2256182"/>
+            <a:ext cx="3209925" cy="3815356"/>
+          </a:xfrm>
+          <a:prstGeom prst="rect">
+            <a:avLst/>
+          </a:prstGeom>
+        </p:spPr>
+      </p:pic>
+      <p:sp>
+        <p:nvSpPr>
+          <p:cNvPr id="5" name="Заголовок 1">
+            <a:extLst>
+              <a:ext uri="{FF2B5EF4-FFF2-40B4-BE49-F238E27FC236}">
+                <a16:creationId xmlns:a16="http://schemas.microsoft.com/office/drawing/2014/main" id="{6D8728E5-634E-46B1-9637-28E8C9DBD738}"/>
+              </a:ext>
+            </a:extLst>
+          </p:cNvPr>
+          <p:cNvSpPr>
+            <a:spLocks noGrp="1"/>
+          </p:cNvSpPr>
+          <p:nvPr>
+            <p:ph type="title"/>
+          </p:nvPr>
+        </p:nvSpPr>
+        <p:spPr>
+          <a:xfrm>
+            <a:off x="1988243" y="540269"/>
+            <a:ext cx="8263137" cy="1080000"/>
+          </a:xfrm>
+        </p:spPr>
+        <p:txBody>
+          <a:bodyPr>
+            <a:noAutofit/>
+          </a:bodyPr>
+          <a:lstStyle/>
+          <a:p>
+            <a:pPr algn="ctr"/>
+            <a:r>
+              <a:rPr lang="ru-RU" sz="4400" dirty="0">
+                <a:solidFill>
+                  <a:srgbClr val="77F531"/>
+                </a:solidFill>
+                <a:latin typeface="RodchenkoCTT" pitchFamily="2" charset="0"/>
+                <a:cs typeface="Courier New" panose="02070309020205020404" pitchFamily="49" charset="0"/>
+              </a:rPr>
+              <a:t>ВХОДНЫЕ И ВЫХОДНЫЕ СИГНАЛЫ</a:t>
+            </a:r>
+          </a:p>
+        </p:txBody>
+      </p:sp>
+      <p:sp>
+        <p:nvSpPr>
+          <p:cNvPr id="7" name="Заголовок 1">
+            <a:extLst>
+              <a:ext uri="{FF2B5EF4-FFF2-40B4-BE49-F238E27FC236}">
+                <a16:creationId xmlns:a16="http://schemas.microsoft.com/office/drawing/2014/main" id="{AFAC081E-CB10-4A47-AD74-44CF49ABABAE}"/>
+              </a:ext>
+            </a:extLst>
+          </p:cNvPr>
+          <p:cNvSpPr txBox="1">
+            <a:spLocks/>
+          </p:cNvSpPr>
+          <p:nvPr/>
+        </p:nvSpPr>
+        <p:spPr>
+          <a:xfrm>
+            <a:off x="1021037" y="1441904"/>
+            <a:ext cx="10197547" cy="814279"/>
+          </a:xfrm>
+          <a:prstGeom prst="rect">
+            <a:avLst/>
+          </a:prstGeom>
+        </p:spPr>
+        <p:txBody>
+          <a:bodyPr vert="horz" lIns="91440" tIns="45720" rIns="91440" bIns="45720" rtlCol="0" anchor="t">
+            <a:noAutofit/>
+          </a:bodyPr>
+          <a:lstStyle>
+            <a:lvl1pPr algn="l" defTabSz="912114" rtl="0" eaLnBrk="1" latinLnBrk="0" hangingPunct="1">
+              <a:lnSpc>
+                <a:spcPct val="90000"/>
+              </a:lnSpc>
+              <a:spcBef>
+                <a:spcPct val="0"/>
+              </a:spcBef>
+              <a:buNone/>
+              <a:defRPr sz="4389" kern="1200">
+                <a:solidFill>
+                  <a:schemeClr val="tx1"/>
+                </a:solidFill>
+                <a:latin typeface="+mj-lt"/>
+                <a:ea typeface="+mj-ea"/>
+                <a:cs typeface="+mj-cs"/>
+              </a:defRPr>
+            </a:lvl1pPr>
+          </a:lstStyle>
+          <a:p>
+            <a:pPr algn="just"/>
+            <a:r>
+              <a:rPr lang="ru-RU" sz="2400" dirty="0" smtClean="0">
+                <a:solidFill>
+                  <a:srgbClr val="77F531"/>
+                </a:solidFill>
+                <a:latin typeface="RodchenkoCTT" pitchFamily="2" charset="0"/>
+                <a:cs typeface="Courier New" panose="02070309020205020404" pitchFamily="49" charset="0"/>
+              </a:rPr>
+              <a:t>Входные </a:t>
+            </a:r>
+            <a:r>
+              <a:rPr lang="ru-RU" sz="2400" dirty="0">
+                <a:solidFill>
+                  <a:srgbClr val="77F531"/>
+                </a:solidFill>
+                <a:latin typeface="RodchenkoCTT" pitchFamily="2" charset="0"/>
+                <a:cs typeface="Courier New" panose="02070309020205020404" pitchFamily="49" charset="0"/>
+              </a:rPr>
+              <a:t>и выходные сигналы (иначе - коннекторы) – </a:t>
+            </a:r>
+            <a:r>
+              <a:rPr lang="ru-RU" sz="2400" dirty="0" smtClean="0">
+                <a:solidFill>
+                  <a:srgbClr val="77F531"/>
+                </a:solidFill>
+                <a:latin typeface="RodchenkoCTT" pitchFamily="2" charset="0"/>
+                <a:cs typeface="Courier New" panose="02070309020205020404" pitchFamily="49" charset="0"/>
+              </a:rPr>
+              <a:t>связывают блоки, моделируют входы и выходы с подсоединенными проводами. Ограничения:</a:t>
+            </a:r>
+            <a:endParaRPr lang="ru-RU" sz="2400" dirty="0">
+              <a:solidFill>
+                <a:srgbClr val="77F531"/>
+              </a:solidFill>
+              <a:latin typeface="RodchenkoCTT" pitchFamily="2" charset="0"/>
+              <a:cs typeface="Courier New" panose="02070309020205020404" pitchFamily="49" charset="0"/>
+            </a:endParaRPr>
+          </a:p>
+        </p:txBody>
+      </p:sp>
+      <p:sp>
+        <p:nvSpPr>
+          <p:cNvPr id="8" name="Заголовок 1">
+            <a:extLst>
+              <a:ext uri="{FF2B5EF4-FFF2-40B4-BE49-F238E27FC236}">
+                <a16:creationId xmlns:a16="http://schemas.microsoft.com/office/drawing/2014/main" id="{084CA6BD-A3D1-44F2-8945-BBC64699F4DD}"/>
+              </a:ext>
+            </a:extLst>
+          </p:cNvPr>
+          <p:cNvSpPr txBox="1">
+            <a:spLocks/>
+          </p:cNvSpPr>
+          <p:nvPr/>
+        </p:nvSpPr>
+        <p:spPr>
+          <a:xfrm>
+            <a:off x="1021036" y="2256182"/>
+            <a:ext cx="4398689" cy="2896843"/>
+          </a:xfrm>
+          <a:prstGeom prst="rect">
+            <a:avLst/>
+          </a:prstGeom>
+        </p:spPr>
+        <p:txBody>
+          <a:bodyPr vert="horz" lIns="91440" tIns="45720" rIns="91440" bIns="45720" rtlCol="0" anchor="t">
+            <a:noAutofit/>
+          </a:bodyPr>
+          <a:lstStyle>
+            <a:lvl1pPr algn="l" defTabSz="912114" rtl="0" eaLnBrk="1" latinLnBrk="0" hangingPunct="1">
+              <a:lnSpc>
+                <a:spcPct val="90000"/>
+              </a:lnSpc>
+              <a:spcBef>
+                <a:spcPct val="0"/>
+              </a:spcBef>
+              <a:buNone/>
+              <a:defRPr sz="4389" kern="1200">
+                <a:solidFill>
+                  <a:schemeClr val="tx1"/>
+                </a:solidFill>
+                <a:latin typeface="+mj-lt"/>
+                <a:ea typeface="+mj-ea"/>
+                <a:cs typeface="+mj-cs"/>
+              </a:defRPr>
+            </a:lvl1pPr>
+          </a:lstStyle>
+          <a:p>
+            <a:pPr marL="447675" indent="-447675">
+              <a:buAutoNum type="arabicParenR"/>
+            </a:pPr>
+            <a:r>
+              <a:rPr lang="ru-RU" sz="2400" dirty="0" smtClean="0">
+                <a:solidFill>
+                  <a:srgbClr val="77F531"/>
+                </a:solidFill>
+                <a:latin typeface="RodchenkoCTT" pitchFamily="2" charset="0"/>
+                <a:cs typeface="Courier New" panose="02070309020205020404" pitchFamily="49" charset="0"/>
+              </a:rPr>
+              <a:t>Входной коннектор можно </a:t>
+            </a:r>
+            <a:r>
+              <a:rPr lang="ru-RU" sz="2400" dirty="0">
+                <a:solidFill>
+                  <a:srgbClr val="77F531"/>
+                </a:solidFill>
+                <a:latin typeface="RodchenkoCTT" pitchFamily="2" charset="0"/>
+                <a:cs typeface="Courier New" panose="02070309020205020404" pitchFamily="49" charset="0"/>
+              </a:rPr>
+              <a:t>соединять только с одним выходным.</a:t>
+            </a:r>
+          </a:p>
+          <a:p>
+            <a:pPr marL="447675" indent="-447675">
+              <a:buAutoNum type="arabicParenR"/>
+            </a:pPr>
+            <a:r>
+              <a:rPr lang="ru-RU" sz="2400" dirty="0">
+                <a:solidFill>
+                  <a:srgbClr val="77F531"/>
+                </a:solidFill>
+                <a:latin typeface="RodchenkoCTT" pitchFamily="2" charset="0"/>
+                <a:cs typeface="Courier New" panose="02070309020205020404" pitchFamily="49" charset="0"/>
+              </a:rPr>
+              <a:t>Выходной </a:t>
+            </a:r>
+            <a:r>
+              <a:rPr lang="ru-RU" sz="2400" dirty="0" smtClean="0">
+                <a:solidFill>
+                  <a:srgbClr val="77F531"/>
+                </a:solidFill>
+                <a:latin typeface="RodchenkoCTT" pitchFamily="2" charset="0"/>
+                <a:cs typeface="Courier New" panose="02070309020205020404" pitchFamily="49" charset="0"/>
+              </a:rPr>
+              <a:t>коннектор </a:t>
+            </a:r>
+            <a:r>
+              <a:rPr lang="ru-RU" sz="2400" dirty="0">
+                <a:solidFill>
+                  <a:srgbClr val="77F531"/>
+                </a:solidFill>
+                <a:latin typeface="RodchenkoCTT" pitchFamily="2" charset="0"/>
+                <a:cs typeface="Courier New" panose="02070309020205020404" pitchFamily="49" charset="0"/>
+              </a:rPr>
+              <a:t>можно соединять с неограниченным количеством </a:t>
+            </a:r>
+            <a:r>
+              <a:rPr lang="ru-RU" sz="2400" dirty="0" smtClean="0">
+                <a:solidFill>
+                  <a:srgbClr val="77F531"/>
+                </a:solidFill>
+                <a:latin typeface="RodchenkoCTT" pitchFamily="2" charset="0"/>
+                <a:cs typeface="Courier New" panose="02070309020205020404" pitchFamily="49" charset="0"/>
+              </a:rPr>
+              <a:t>входных</a:t>
+            </a:r>
+            <a:r>
+              <a:rPr lang="en-US" sz="2400" dirty="0">
+                <a:solidFill>
+                  <a:srgbClr val="77F531"/>
+                </a:solidFill>
+                <a:latin typeface="RodchenkoCTT" pitchFamily="2" charset="0"/>
+                <a:cs typeface="Courier New" panose="02070309020205020404" pitchFamily="49" charset="0"/>
+              </a:rPr>
+              <a:t>.</a:t>
+            </a:r>
+            <a:endParaRPr lang="ru-RU" sz="2400" dirty="0" smtClean="0">
+              <a:solidFill>
+                <a:srgbClr val="77F531"/>
+              </a:solidFill>
+              <a:latin typeface="RodchenkoCTT" pitchFamily="2" charset="0"/>
+              <a:cs typeface="Courier New" panose="02070309020205020404" pitchFamily="49" charset="0"/>
+            </a:endParaRPr>
+          </a:p>
+          <a:p>
+            <a:pPr marL="447675" indent="-447675">
+              <a:buAutoNum type="arabicParenR"/>
+            </a:pPr>
+            <a:r>
+              <a:rPr lang="ru-RU" sz="2400" dirty="0" smtClean="0">
+                <a:solidFill>
+                  <a:srgbClr val="77F531"/>
+                </a:solidFill>
+                <a:latin typeface="RodchenkoCTT" pitchFamily="2" charset="0"/>
+                <a:cs typeface="Courier New" panose="02070309020205020404" pitchFamily="49" charset="0"/>
+              </a:rPr>
+              <a:t>Нельзя создавать зацикленные соединения.</a:t>
+            </a:r>
+            <a:endParaRPr lang="ru-RU" sz="2400" dirty="0" smtClean="0">
+              <a:solidFill>
+                <a:srgbClr val="77F531"/>
+              </a:solidFill>
+              <a:latin typeface="RodchenkoCTT" pitchFamily="2" charset="0"/>
+              <a:cs typeface="Courier New" panose="02070309020205020404" pitchFamily="49" charset="0"/>
+            </a:endParaRPr>
+          </a:p>
+        </p:txBody>
+      </p:sp>
+      <p:cxnSp>
+        <p:nvCxnSpPr>
+          <p:cNvPr id="11" name="Прямая со стрелкой 10">
+            <a:extLst>
+              <a:ext uri="{FF2B5EF4-FFF2-40B4-BE49-F238E27FC236}">
+                <a16:creationId xmlns:a16="http://schemas.microsoft.com/office/drawing/2014/main" id="{D7AAF4D6-A861-455E-8794-09A34A320E83}"/>
+              </a:ext>
+            </a:extLst>
+          </p:cNvPr>
+          <p:cNvCxnSpPr/>
+          <p:nvPr/>
+        </p:nvCxnSpPr>
+        <p:spPr>
+          <a:xfrm flipV="1">
+            <a:off x="6725999" y="4919798"/>
+            <a:ext cx="329346" cy="906629"/>
+          </a:xfrm>
+          <a:prstGeom prst="straightConnector1">
+            <a:avLst/>
+          </a:prstGeom>
+          <a:ln w="38100">
+            <a:solidFill>
+              <a:srgbClr val="77F531"/>
+            </a:solidFill>
+            <a:tailEnd type="triangle"/>
+          </a:ln>
+        </p:spPr>
+        <p:style>
+          <a:lnRef idx="1">
+            <a:schemeClr val="accent1"/>
+          </a:lnRef>
+          <a:fillRef idx="0">
+            <a:schemeClr val="accent1"/>
+          </a:fillRef>
+          <a:effectRef idx="0">
+            <a:schemeClr val="accent1"/>
+          </a:effectRef>
+          <a:fontRef idx="minor">
+            <a:schemeClr val="tx1"/>
+          </a:fontRef>
+        </p:style>
+      </p:cxnSp>
+      <p:pic>
+        <p:nvPicPr>
+          <p:cNvPr id="28" name="Рисунок 27"/>
+          <p:cNvPicPr>
+            <a:picLocks noChangeAspect="1"/>
+          </p:cNvPicPr>
+          <p:nvPr/>
+        </p:nvPicPr>
+        <p:blipFill rotWithShape="1">
+          <a:blip r:embed="rId5"/>
+          <a:srcRect l="44844" t="55583" r="46323" b="29157"/>
+          <a:stretch/>
+        </p:blipFill>
+        <p:spPr>
+          <a:xfrm>
+            <a:off x="8758786" y="3490078"/>
+            <a:ext cx="2502418" cy="2431597"/>
+          </a:xfrm>
+          <a:prstGeom prst="rect">
+            <a:avLst/>
+          </a:prstGeom>
+        </p:spPr>
+      </p:pic>
+      <p:cxnSp>
+        <p:nvCxnSpPr>
+          <p:cNvPr id="19" name="Прямая со стрелкой 18">
+            <a:extLst>
+              <a:ext uri="{FF2B5EF4-FFF2-40B4-BE49-F238E27FC236}">
+                <a16:creationId xmlns:a16="http://schemas.microsoft.com/office/drawing/2014/main" id="{D7AAF4D6-A861-455E-8794-09A34A320E83}"/>
+              </a:ext>
+            </a:extLst>
+          </p:cNvPr>
+          <p:cNvCxnSpPr/>
+          <p:nvPr/>
+        </p:nvCxnSpPr>
+        <p:spPr>
+          <a:xfrm>
+            <a:off x="6252156" y="3124345"/>
+            <a:ext cx="770862" cy="247921"/>
+          </a:xfrm>
+          <a:prstGeom prst="straightConnector1">
+            <a:avLst/>
+          </a:prstGeom>
+          <a:ln w="38100">
+            <a:solidFill>
+              <a:srgbClr val="77F531"/>
+            </a:solidFill>
+            <a:tailEnd type="triangle"/>
+          </a:ln>
+        </p:spPr>
+        <p:style>
+          <a:lnRef idx="1">
+            <a:schemeClr val="accent1"/>
+          </a:lnRef>
+          <a:fillRef idx="0">
+            <a:schemeClr val="accent1"/>
+          </a:fillRef>
+          <a:effectRef idx="0">
+            <a:schemeClr val="accent1"/>
+          </a:effectRef>
+          <a:fontRef idx="minor">
+            <a:schemeClr val="tx1"/>
+          </a:fontRef>
+        </p:style>
+      </p:cxnSp>
+      <p:cxnSp>
+        <p:nvCxnSpPr>
+          <p:cNvPr id="22" name="Прямая со стрелкой 21">
+            <a:extLst>
+              <a:ext uri="{FF2B5EF4-FFF2-40B4-BE49-F238E27FC236}">
+                <a16:creationId xmlns:a16="http://schemas.microsoft.com/office/drawing/2014/main" id="{D7AAF4D6-A861-455E-8794-09A34A320E83}"/>
+              </a:ext>
+            </a:extLst>
+          </p:cNvPr>
+          <p:cNvCxnSpPr/>
+          <p:nvPr/>
+        </p:nvCxnSpPr>
+        <p:spPr>
+          <a:xfrm>
+            <a:off x="5419725" y="4514850"/>
+            <a:ext cx="832431" cy="270537"/>
+          </a:xfrm>
+          <a:prstGeom prst="straightConnector1">
+            <a:avLst/>
+          </a:prstGeom>
+          <a:ln w="38100">
+            <a:solidFill>
+              <a:srgbClr val="77F531"/>
+            </a:solidFill>
+            <a:tailEnd type="triangle"/>
+          </a:ln>
+        </p:spPr>
+        <p:style>
+          <a:lnRef idx="1">
+            <a:schemeClr val="accent1"/>
+          </a:lnRef>
+          <a:fillRef idx="0">
+            <a:schemeClr val="accent1"/>
+          </a:fillRef>
+          <a:effectRef idx="0">
+            <a:schemeClr val="accent1"/>
+          </a:effectRef>
+          <a:fontRef idx="minor">
+            <a:schemeClr val="tx1"/>
+          </a:fontRef>
+        </p:style>
+      </p:cxnSp>
+      <p:cxnSp>
+        <p:nvCxnSpPr>
+          <p:cNvPr id="15" name="Прямая со стрелкой 14">
+            <a:extLst>
+              <a:ext uri="{FF2B5EF4-FFF2-40B4-BE49-F238E27FC236}">
+                <a16:creationId xmlns:a16="http://schemas.microsoft.com/office/drawing/2014/main" id="{D7AAF4D6-A861-455E-8794-09A34A320E83}"/>
+              </a:ext>
+            </a:extLst>
+          </p:cNvPr>
+          <p:cNvCxnSpPr/>
+          <p:nvPr/>
+        </p:nvCxnSpPr>
+        <p:spPr>
+          <a:xfrm flipH="1">
+            <a:off x="8026213" y="3124345"/>
+            <a:ext cx="832037" cy="252819"/>
+          </a:xfrm>
+          <a:prstGeom prst="straightConnector1">
+            <a:avLst/>
+          </a:prstGeom>
+          <a:ln w="38100">
+            <a:solidFill>
+              <a:srgbClr val="77F531"/>
+            </a:solidFill>
+            <a:tailEnd type="triangle"/>
+          </a:ln>
+        </p:spPr>
+        <p:style>
+          <a:lnRef idx="1">
+            <a:schemeClr val="accent1"/>
+          </a:lnRef>
+          <a:fillRef idx="0">
+            <a:schemeClr val="accent1"/>
+          </a:fillRef>
+          <a:effectRef idx="0">
+            <a:schemeClr val="accent1"/>
+          </a:effectRef>
+          <a:fontRef idx="minor">
+            <a:schemeClr val="tx1"/>
+          </a:fontRef>
+        </p:style>
+      </p:cxnSp>
+      <p:cxnSp>
+        <p:nvCxnSpPr>
+          <p:cNvPr id="20" name="Прямая со стрелкой 19">
+            <a:extLst>
+              <a:ext uri="{FF2B5EF4-FFF2-40B4-BE49-F238E27FC236}">
+                <a16:creationId xmlns:a16="http://schemas.microsoft.com/office/drawing/2014/main" id="{D7AAF4D6-A861-455E-8794-09A34A320E83}"/>
+              </a:ext>
+            </a:extLst>
+          </p:cNvPr>
+          <p:cNvCxnSpPr/>
+          <p:nvPr/>
+        </p:nvCxnSpPr>
+        <p:spPr>
+          <a:xfrm flipH="1" flipV="1">
+            <a:off x="7959538" y="4919798"/>
+            <a:ext cx="799248" cy="233227"/>
+          </a:xfrm>
+          <a:prstGeom prst="straightConnector1">
+            <a:avLst/>
+          </a:prstGeom>
+          <a:ln w="38100">
+            <a:solidFill>
+              <a:srgbClr val="77F531"/>
+            </a:solidFill>
+            <a:tailEnd type="triangle"/>
+          </a:ln>
+        </p:spPr>
+        <p:style>
+          <a:lnRef idx="1">
+            <a:schemeClr val="accent1"/>
+          </a:lnRef>
+          <a:fillRef idx="0">
+            <a:schemeClr val="accent1"/>
+          </a:fillRef>
+          <a:effectRef idx="0">
+            <a:schemeClr val="accent1"/>
+          </a:effectRef>
+          <a:fontRef idx="minor">
+            <a:schemeClr val="tx1"/>
+          </a:fontRef>
+        </p:style>
+      </p:cxnSp>
+      <p:sp>
+        <p:nvSpPr>
+          <p:cNvPr id="31" name="Овал 30"/>
+          <p:cNvSpPr/>
+          <p:nvPr/>
+        </p:nvSpPr>
+        <p:spPr>
+          <a:xfrm>
+            <a:off x="9846857" y="3426660"/>
+            <a:ext cx="348703" cy="348703"/>
+          </a:xfrm>
+          <a:prstGeom prst="ellipse">
+            <a:avLst/>
+          </a:prstGeom>
+          <a:noFill/>
+          <a:ln w="63500">
+            <a:solidFill>
+              <a:srgbClr val="77F531"/>
+            </a:solidFill>
+          </a:ln>
+        </p:spPr>
+        <p:style>
+          <a:lnRef idx="2">
+            <a:schemeClr val="accent1">
+              <a:shade val="50000"/>
+            </a:schemeClr>
+          </a:lnRef>
+          <a:fillRef idx="1">
+            <a:schemeClr val="accent1"/>
+          </a:fillRef>
+          <a:effectRef idx="0">
+            <a:schemeClr val="accent1"/>
+          </a:effectRef>
+          <a:fontRef idx="minor">
+            <a:schemeClr val="lt1"/>
+          </a:fontRef>
+        </p:style>
+        <p:txBody>
+          <a:bodyPr rtlCol="0" anchor="ctr"/>
+          <a:lstStyle/>
+          <a:p>
+            <a:pPr algn="ctr"/>
+            <a:endParaRPr lang="ru-RU"/>
+          </a:p>
+        </p:txBody>
+      </p:sp>
+      <p:sp>
+        <p:nvSpPr>
+          <p:cNvPr id="32" name="Овал 31"/>
+          <p:cNvSpPr/>
+          <p:nvPr/>
+        </p:nvSpPr>
+        <p:spPr>
+          <a:xfrm>
+            <a:off x="9846857" y="5582668"/>
+            <a:ext cx="348703" cy="348704"/>
+          </a:xfrm>
+          <a:prstGeom prst="ellipse">
+            <a:avLst/>
+          </a:prstGeom>
+          <a:noFill/>
+          <a:ln w="63500">
+            <a:solidFill>
+              <a:srgbClr val="77F531"/>
+            </a:solidFill>
+          </a:ln>
+        </p:spPr>
+        <p:style>
+          <a:lnRef idx="2">
+            <a:schemeClr val="accent1">
+              <a:shade val="50000"/>
+            </a:schemeClr>
+          </a:lnRef>
+          <a:fillRef idx="1">
+            <a:schemeClr val="accent1"/>
+          </a:fillRef>
+          <a:effectRef idx="0">
+            <a:schemeClr val="accent1"/>
+          </a:effectRef>
+          <a:fontRef idx="minor">
+            <a:schemeClr val="lt1"/>
+          </a:fontRef>
+        </p:style>
+        <p:txBody>
+          <a:bodyPr rtlCol="0" anchor="ctr"/>
+          <a:lstStyle/>
+          <a:p>
+            <a:pPr algn="ctr"/>
+            <a:endParaRPr lang="ru-RU"/>
+          </a:p>
+        </p:txBody>
+      </p:sp>
+      <p:cxnSp>
+        <p:nvCxnSpPr>
+          <p:cNvPr id="33" name="Прямая со стрелкой 32">
+            <a:extLst>
+              <a:ext uri="{FF2B5EF4-FFF2-40B4-BE49-F238E27FC236}">
+                <a16:creationId xmlns:a16="http://schemas.microsoft.com/office/drawing/2014/main" id="{D7AAF4D6-A861-455E-8794-09A34A320E83}"/>
+              </a:ext>
+            </a:extLst>
+          </p:cNvPr>
+          <p:cNvCxnSpPr/>
+          <p:nvPr/>
+        </p:nvCxnSpPr>
+        <p:spPr>
+          <a:xfrm flipH="1">
+            <a:off x="10195560" y="2749923"/>
+            <a:ext cx="437727" cy="596285"/>
+          </a:xfrm>
+          <a:prstGeom prst="straightConnector1">
+            <a:avLst/>
+          </a:prstGeom>
+          <a:ln w="38100">
+            <a:solidFill>
+              <a:srgbClr val="77F531"/>
+            </a:solidFill>
+            <a:tailEnd type="triangle"/>
+          </a:ln>
+        </p:spPr>
+        <p:style>
+          <a:lnRef idx="1">
+            <a:schemeClr val="accent1"/>
+          </a:lnRef>
+          <a:fillRef idx="0">
+            <a:schemeClr val="accent1"/>
+          </a:fillRef>
+          <a:effectRef idx="0">
+            <a:schemeClr val="accent1"/>
+          </a:effectRef>
+          <a:fontRef idx="minor">
+            <a:schemeClr val="tx1"/>
+          </a:fontRef>
+        </p:style>
+      </p:cxnSp>
+      <p:cxnSp>
+        <p:nvCxnSpPr>
+          <p:cNvPr id="35" name="Прямая со стрелкой 34">
+            <a:extLst>
+              <a:ext uri="{FF2B5EF4-FFF2-40B4-BE49-F238E27FC236}">
+                <a16:creationId xmlns:a16="http://schemas.microsoft.com/office/drawing/2014/main" id="{D7AAF4D6-A861-455E-8794-09A34A320E83}"/>
+              </a:ext>
+            </a:extLst>
+          </p:cNvPr>
+          <p:cNvCxnSpPr/>
+          <p:nvPr/>
+        </p:nvCxnSpPr>
+        <p:spPr>
+          <a:xfrm flipV="1">
+            <a:off x="8945217" y="5917017"/>
+            <a:ext cx="857410" cy="235305"/>
+          </a:xfrm>
+          <a:prstGeom prst="straightConnector1">
+            <a:avLst/>
+          </a:prstGeom>
+          <a:ln w="38100">
+            <a:solidFill>
+              <a:srgbClr val="77F531"/>
+            </a:solidFill>
+            <a:tailEnd type="triangle"/>
+          </a:ln>
+        </p:spPr>
+        <p:style>
+          <a:lnRef idx="1">
+            <a:schemeClr val="accent1"/>
+          </a:lnRef>
+          <a:fillRef idx="0">
+            <a:schemeClr val="accent1"/>
+          </a:fillRef>
+          <a:effectRef idx="0">
+            <a:schemeClr val="accent1"/>
+          </a:effectRef>
+          <a:fontRef idx="minor">
+            <a:schemeClr val="tx1"/>
+          </a:fontRef>
+        </p:style>
+      </p:cxnSp>
+    </p:spTree>
+    <p:extLst>
+      <p:ext uri="{BB962C8B-B14F-4D97-AF65-F5344CB8AC3E}">
+        <p14:creationId xmlns:p14="http://schemas.microsoft.com/office/powerpoint/2010/main" val="1181086272"/>
+      </p:ext>
+    </p:extLst>
+  </p:cSld>
+  <p:clrMapOvr>
+    <a:overrideClrMapping bg1="lt1" tx1="dk1" bg2="lt2" tx2="dk2" accent1="accent1" accent2="accent2" accent3="accent3" accent4="accent4" accent5="accent5" accent6="accent6" hlink="hlink" folHlink="folHlink"/>
+  </p:clrMapOvr>
+  <p:timing>
+    <p:tnLst>
+      <p:par>
+        <p:cTn id="1" dur="indefinite" restart="never" nodeType="tmRoot">
+          <p:childTnLst>
+            <p:seq concurrent="1" nextAc="seek">
+              <p:cTn id="2" dur="indefinite" nodeType="mainSeq">
+                <p:childTnLst>
+                  <p:par>
+                    <p:cTn id="3" fill="hold">
+                      <p:stCondLst>
+                        <p:cond delay="indefinite"/>
+                        <p:cond evt="onBegin" delay="0">
+                          <p:tn val="2"/>
+                        </p:cond>
+                      </p:stCondLst>
+                      <p:childTnLst>
+                        <p:par>
+                          <p:cTn id="4" fill="hold">
+                            <p:stCondLst>
+                              <p:cond delay="0"/>
+                            </p:stCondLst>
+                            <p:childTnLst>
+                              <p:par>
+                                <p:cTn id="5" presetID="10" presetClass="entr" presetSubtype="0" fill="hold" nodeType="withEffect">
+                                  <p:stCondLst>
+                                    <p:cond delay="0"/>
+                                  </p:stCondLst>
+                                  <p:childTnLst>
+                                    <p:set>
+                                      <p:cBhvr>
+                                        <p:cTn id="6" dur="1" fill="hold">
+                                          <p:stCondLst>
+                                            <p:cond delay="0"/>
+                                          </p:stCondLst>
+                                        </p:cTn>
+                                        <p:tgtEl>
+                                          <p:spTgt spid="11"/>
+                                        </p:tgtEl>
+                                        <p:attrNameLst>
+                                          <p:attrName>style.visibility</p:attrName>
+                                        </p:attrNameLst>
+                                      </p:cBhvr>
+                                      <p:to>
+                                        <p:strVal val="visible"/>
+                                      </p:to>
+                                    </p:set>
+                                    <p:animEffect transition="in" filter="fade">
+                                      <p:cBhvr>
+                                        <p:cTn id="7" dur="500"/>
+                                        <p:tgtEl>
+                                          <p:spTgt spid="11"/>
+                                        </p:tgtEl>
+                                      </p:cBhvr>
+                                    </p:animEffect>
+                                  </p:childTnLst>
+                                </p:cTn>
+                              </p:par>
+                              <p:par>
+                                <p:cTn id="8" presetID="10" presetClass="entr" presetSubtype="0" fill="hold" nodeType="withEffect">
+                                  <p:stCondLst>
+                                    <p:cond delay="0"/>
+                                  </p:stCondLst>
+                                  <p:childTnLst>
+                                    <p:set>
+                                      <p:cBhvr>
+                                        <p:cTn id="9" dur="1" fill="hold">
+                                          <p:stCondLst>
+                                            <p:cond delay="0"/>
+                                          </p:stCondLst>
+                                        </p:cTn>
+                                        <p:tgtEl>
+                                          <p:spTgt spid="15"/>
+                                        </p:tgtEl>
+                                        <p:attrNameLst>
+                                          <p:attrName>style.visibility</p:attrName>
+                                        </p:attrNameLst>
+                                      </p:cBhvr>
+                                      <p:to>
+                                        <p:strVal val="visible"/>
+                                      </p:to>
+                                    </p:set>
+                                    <p:animEffect transition="in" filter="fade">
+                                      <p:cBhvr>
+                                        <p:cTn id="10" dur="500"/>
+                                        <p:tgtEl>
+                                          <p:spTgt spid="15"/>
+                                        </p:tgtEl>
+                                      </p:cBhvr>
+                                    </p:animEffect>
+                                  </p:childTnLst>
+                                </p:cTn>
+                              </p:par>
+                              <p:par>
+                                <p:cTn id="11" presetID="10" presetClass="entr" presetSubtype="0" fill="hold" nodeType="withEffect">
+                                  <p:stCondLst>
+                                    <p:cond delay="0"/>
+                                  </p:stCondLst>
+                                  <p:childTnLst>
+                                    <p:set>
+                                      <p:cBhvr>
+                                        <p:cTn id="12" dur="1" fill="hold">
+                                          <p:stCondLst>
+                                            <p:cond delay="0"/>
+                                          </p:stCondLst>
+                                        </p:cTn>
+                                        <p:tgtEl>
+                                          <p:spTgt spid="19"/>
+                                        </p:tgtEl>
+                                        <p:attrNameLst>
+                                          <p:attrName>style.visibility</p:attrName>
+                                        </p:attrNameLst>
+                                      </p:cBhvr>
+                                      <p:to>
+                                        <p:strVal val="visible"/>
+                                      </p:to>
+                                    </p:set>
+                                    <p:animEffect transition="in" filter="fade">
+                                      <p:cBhvr>
+                                        <p:cTn id="13" dur="500"/>
+                                        <p:tgtEl>
+                                          <p:spTgt spid="19"/>
+                                        </p:tgtEl>
+                                      </p:cBhvr>
+                                    </p:animEffect>
+                                  </p:childTnLst>
+                                </p:cTn>
+                              </p:par>
+                              <p:par>
+                                <p:cTn id="14" presetID="10" presetClass="entr" presetSubtype="0" fill="hold" nodeType="withEffect">
+                                  <p:stCondLst>
+                                    <p:cond delay="0"/>
+                                  </p:stCondLst>
+                                  <p:childTnLst>
+                                    <p:set>
+                                      <p:cBhvr>
+                                        <p:cTn id="15" dur="1" fill="hold">
+                                          <p:stCondLst>
+                                            <p:cond delay="0"/>
+                                          </p:stCondLst>
+                                        </p:cTn>
+                                        <p:tgtEl>
+                                          <p:spTgt spid="20"/>
+                                        </p:tgtEl>
+                                        <p:attrNameLst>
+                                          <p:attrName>style.visibility</p:attrName>
+                                        </p:attrNameLst>
+                                      </p:cBhvr>
+                                      <p:to>
+                                        <p:strVal val="visible"/>
+                                      </p:to>
+                                    </p:set>
+                                    <p:animEffect transition="in" filter="fade">
+                                      <p:cBhvr>
+                                        <p:cTn id="16" dur="500"/>
+                                        <p:tgtEl>
+                                          <p:spTgt spid="20"/>
+                                        </p:tgtEl>
+                                      </p:cBhvr>
+                                    </p:animEffect>
+                                  </p:childTnLst>
+                                </p:cTn>
+                              </p:par>
+                              <p:par>
+                                <p:cTn id="17" presetID="10" presetClass="entr" presetSubtype="0" fill="hold" nodeType="withEffect">
+                                  <p:stCondLst>
+                                    <p:cond delay="0"/>
+                                  </p:stCondLst>
+                                  <p:childTnLst>
+                                    <p:set>
+                                      <p:cBhvr>
+                                        <p:cTn id="18" dur="1" fill="hold">
+                                          <p:stCondLst>
+                                            <p:cond delay="0"/>
+                                          </p:stCondLst>
+                                        </p:cTn>
+                                        <p:tgtEl>
+                                          <p:spTgt spid="22"/>
+                                        </p:tgtEl>
+                                        <p:attrNameLst>
+                                          <p:attrName>style.visibility</p:attrName>
+                                        </p:attrNameLst>
+                                      </p:cBhvr>
+                                      <p:to>
+                                        <p:strVal val="visible"/>
+                                      </p:to>
+                                    </p:set>
+                                    <p:animEffect transition="in" filter="fade">
+                                      <p:cBhvr>
+                                        <p:cTn id="19" dur="500"/>
+                                        <p:tgtEl>
+                                          <p:spTgt spid="22"/>
+                                        </p:tgtEl>
+                                      </p:cBhvr>
+                                    </p:animEffect>
+                                  </p:childTnLst>
+                                </p:cTn>
+                              </p:par>
+                              <p:par>
+                                <p:cTn id="20" presetID="10" presetClass="entr" presetSubtype="0" fill="hold" nodeType="withEffect">
+                                  <p:stCondLst>
+                                    <p:cond delay="0"/>
+                                  </p:stCondLst>
+                                  <p:childTnLst>
+                                    <p:set>
+                                      <p:cBhvr>
+                                        <p:cTn id="21" dur="1" fill="hold">
+                                          <p:stCondLst>
+                                            <p:cond delay="0"/>
+                                          </p:stCondLst>
+                                        </p:cTn>
+                                        <p:tgtEl>
+                                          <p:spTgt spid="33"/>
+                                        </p:tgtEl>
+                                        <p:attrNameLst>
+                                          <p:attrName>style.visibility</p:attrName>
+                                        </p:attrNameLst>
+                                      </p:cBhvr>
+                                      <p:to>
+                                        <p:strVal val="visible"/>
+                                      </p:to>
+                                    </p:set>
+                                    <p:animEffect transition="in" filter="fade">
+                                      <p:cBhvr>
+                                        <p:cTn id="22" dur="500"/>
+                                        <p:tgtEl>
+                                          <p:spTgt spid="33"/>
+                                        </p:tgtEl>
+                                      </p:cBhvr>
+                                    </p:animEffect>
+                                  </p:childTnLst>
+                                </p:cTn>
+                              </p:par>
+                              <p:par>
+                                <p:cTn id="23" presetID="10" presetClass="entr" presetSubtype="0" fill="hold" nodeType="withEffect">
+                                  <p:stCondLst>
+                                    <p:cond delay="0"/>
+                                  </p:stCondLst>
+                                  <p:childTnLst>
+                                    <p:set>
+                                      <p:cBhvr>
+                                        <p:cTn id="24" dur="1" fill="hold">
+                                          <p:stCondLst>
+                                            <p:cond delay="0"/>
+                                          </p:stCondLst>
+                                        </p:cTn>
+                                        <p:tgtEl>
+                                          <p:spTgt spid="35"/>
+                                        </p:tgtEl>
+                                        <p:attrNameLst>
+                                          <p:attrName>style.visibility</p:attrName>
+                                        </p:attrNameLst>
+                                      </p:cBhvr>
+                                      <p:to>
+                                        <p:strVal val="visible"/>
+                                      </p:to>
+                                    </p:set>
+                                    <p:animEffect transition="in" filter="fade">
+                                      <p:cBhvr>
+                                        <p:cTn id="25" dur="500"/>
+                                        <p:tgtEl>
+                                          <p:spTgt spid="35"/>
+                                        </p:tgtEl>
+                                      </p:cBhvr>
+                                    </p:animEffect>
+                                  </p:childTnLst>
+                                </p:cTn>
+                              </p:par>
+                            </p:childTnLst>
+                          </p:cTn>
+                        </p:par>
+                      </p:childTnLst>
+                    </p:cTn>
+                  </p:par>
+                </p:childTnLst>
+              </p:cTn>
+              <p:prevCondLst>
+                <p:cond evt="onPrev" delay="0">
+                  <p:tgtEl>
+                    <p:sldTgt/>
+                  </p:tgtEl>
+                </p:cond>
+              </p:prevCondLst>
+              <p:nextCondLst>
+                <p:cond evt="onNext" delay="0">
+                  <p:tgtEl>
+                    <p:sldTgt/>
+                  </p:tgtEl>
+                </p:cond>
+              </p:nextCondLst>
+            </p:seq>
+          </p:childTnLst>
+        </p:cTn>
+      </p:par>
+    </p:tnLst>
+  </p:timing>
+</p:sld>
+</file>
+
+<file path=ppt/slides/slide4.xml><?xml version="1.0" encoding="utf-8"?>
 <p:sld xmlns:a="http://schemas.openxmlformats.org/drawingml/2006/main" xmlns:r="http://schemas.openxmlformats.org/officeDocument/2006/relationships" xmlns:p="http://schemas.openxmlformats.org/presentationml/2006/main">
   <p:cSld>
     <p:bg>
@@ -12066,314 +13333,13 @@
   <p:clrMapOvr>
     <a:masterClrMapping/>
   </p:clrMapOvr>
-</p:sld>
-</file>
-
-<file path=ppt/slides/slide4.xml><?xml version="1.0" encoding="utf-8"?>
-<p:sld xmlns:a="http://schemas.openxmlformats.org/drawingml/2006/main" xmlns:r="http://schemas.openxmlformats.org/officeDocument/2006/relationships" xmlns:p="http://schemas.openxmlformats.org/presentationml/2006/main">
-  <p:cSld>
-    <p:bg>
-      <p:bgPr>
-        <a:blipFill dpi="0" rotWithShape="1">
-          <a:blip r:embed="rId3">
-            <a:lum/>
-          </a:blip>
-          <a:srcRect/>
-          <a:stretch>
-            <a:fillRect t="-20000" b="-20000"/>
-          </a:stretch>
-        </a:blipFill>
-        <a:effectLst/>
-      </p:bgPr>
-    </p:bg>
-    <p:spTree>
-      <p:nvGrpSpPr>
-        <p:cNvPr id="1" name=""/>
-        <p:cNvGrpSpPr/>
-        <p:nvPr/>
-      </p:nvGrpSpPr>
-      <p:grpSpPr>
-        <a:xfrm>
-          <a:off x="0" y="0"/>
-          <a:ext cx="0" cy="0"/>
-          <a:chOff x="0" y="0"/>
-          <a:chExt cx="0" cy="0"/>
-        </a:xfrm>
-      </p:grpSpPr>
-      <p:sp>
-        <p:nvSpPr>
-          <p:cNvPr id="4" name="Прямоугольник 3"/>
-          <p:cNvSpPr/>
-          <p:nvPr/>
-        </p:nvSpPr>
-        <p:spPr>
-          <a:xfrm>
-            <a:off x="539813" y="540269"/>
-            <a:ext cx="11160000" cy="5760000"/>
-          </a:xfrm>
-          <a:prstGeom prst="rect">
-            <a:avLst/>
-          </a:prstGeom>
-          <a:solidFill>
-            <a:schemeClr val="tx1"/>
-          </a:solidFill>
-          <a:ln w="63500">
-            <a:solidFill>
-              <a:schemeClr val="accent6">
-                <a:lumMod val="75000"/>
-              </a:schemeClr>
-            </a:solidFill>
-          </a:ln>
-        </p:spPr>
-        <p:style>
-          <a:lnRef idx="2">
-            <a:schemeClr val="accent1">
-              <a:shade val="50000"/>
-            </a:schemeClr>
-          </a:lnRef>
-          <a:fillRef idx="1">
-            <a:schemeClr val="accent1"/>
-          </a:fillRef>
-          <a:effectRef idx="0">
-            <a:schemeClr val="accent1"/>
-          </a:effectRef>
-          <a:fontRef idx="minor">
-            <a:schemeClr val="lt1"/>
-          </a:fontRef>
-        </p:style>
-        <p:txBody>
-          <a:bodyPr rot="0" spcFirstLastPara="0" vertOverflow="overflow" horzOverflow="overflow" vert="horz" wrap="square" lIns="91797" tIns="45899" rIns="91797" bIns="45899" numCol="1" spcCol="0" rtlCol="0" fromWordArt="0" anchor="ctr" anchorCtr="0" forceAA="0" compatLnSpc="1">
-            <a:prstTxWarp prst="textNoShape">
-              <a:avLst/>
-            </a:prstTxWarp>
-            <a:noAutofit/>
-          </a:bodyPr>
-          <a:lstStyle/>
-          <a:p>
-            <a:pPr algn="ctr"/>
-            <a:endParaRPr lang="ru-RU" sz="1807"/>
-          </a:p>
-        </p:txBody>
-      </p:sp>
-      <p:sp>
-        <p:nvSpPr>
-          <p:cNvPr id="5" name="Заголовок 1">
-            <a:extLst>
-              <a:ext uri="{FF2B5EF4-FFF2-40B4-BE49-F238E27FC236}">
-                <a16:creationId xmlns:a16="http://schemas.microsoft.com/office/drawing/2014/main" id="{6D8728E5-634E-46B1-9637-28E8C9DBD738}"/>
-              </a:ext>
-            </a:extLst>
-          </p:cNvPr>
-          <p:cNvSpPr>
-            <a:spLocks noGrp="1"/>
-          </p:cNvSpPr>
-          <p:nvPr>
-            <p:ph type="title"/>
-          </p:nvPr>
-        </p:nvSpPr>
-        <p:spPr>
-          <a:xfrm>
-            <a:off x="1988243" y="540269"/>
-            <a:ext cx="8263137" cy="1080000"/>
-          </a:xfrm>
-        </p:spPr>
-        <p:txBody>
-          <a:bodyPr>
-            <a:noAutofit/>
-          </a:bodyPr>
-          <a:lstStyle/>
-          <a:p>
-            <a:pPr algn="ctr"/>
-            <a:r>
-              <a:rPr lang="ru-RU" sz="4400" dirty="0">
-                <a:solidFill>
-                  <a:srgbClr val="77F531"/>
-                </a:solidFill>
-                <a:latin typeface="RodchenkoCTT" pitchFamily="2" charset="0"/>
-                <a:cs typeface="Courier New" panose="02070309020205020404" pitchFamily="49" charset="0"/>
-              </a:rPr>
-              <a:t>ВХОДНЫЕ И ВЫХОДНЫЕ СИГНАЛЫ</a:t>
-            </a:r>
-          </a:p>
-        </p:txBody>
-      </p:sp>
-      <p:sp>
-        <p:nvSpPr>
-          <p:cNvPr id="7" name="Заголовок 1">
-            <a:extLst>
-              <a:ext uri="{FF2B5EF4-FFF2-40B4-BE49-F238E27FC236}">
-                <a16:creationId xmlns:a16="http://schemas.microsoft.com/office/drawing/2014/main" id="{AFAC081E-CB10-4A47-AD74-44CF49ABABAE}"/>
-              </a:ext>
-            </a:extLst>
-          </p:cNvPr>
-          <p:cNvSpPr txBox="1">
-            <a:spLocks/>
-          </p:cNvSpPr>
-          <p:nvPr/>
-        </p:nvSpPr>
-        <p:spPr>
-          <a:xfrm>
-            <a:off x="1021037" y="1441904"/>
-            <a:ext cx="10197547" cy="1405077"/>
-          </a:xfrm>
-          <a:prstGeom prst="rect">
-            <a:avLst/>
-          </a:prstGeom>
-        </p:spPr>
-        <p:txBody>
-          <a:bodyPr vert="horz" lIns="91440" tIns="45720" rIns="91440" bIns="45720" rtlCol="0" anchor="t">
-            <a:noAutofit/>
-          </a:bodyPr>
-          <a:lstStyle>
-            <a:lvl1pPr algn="l" defTabSz="912114" rtl="0" eaLnBrk="1" latinLnBrk="0" hangingPunct="1">
-              <a:lnSpc>
-                <a:spcPct val="90000"/>
-              </a:lnSpc>
-              <a:spcBef>
-                <a:spcPct val="0"/>
-              </a:spcBef>
-              <a:buNone/>
-              <a:defRPr sz="4389" kern="1200">
-                <a:solidFill>
-                  <a:schemeClr val="tx1"/>
-                </a:solidFill>
-                <a:latin typeface="+mj-lt"/>
-                <a:ea typeface="+mj-ea"/>
-                <a:cs typeface="+mj-cs"/>
-              </a:defRPr>
-            </a:lvl1pPr>
-          </a:lstStyle>
-          <a:p>
-            <a:pPr algn="just"/>
-            <a:r>
-              <a:rPr lang="ru-RU" sz="3000" dirty="0">
-                <a:solidFill>
-                  <a:srgbClr val="77F531"/>
-                </a:solidFill>
-                <a:latin typeface="RodchenkoCTT" pitchFamily="2" charset="0"/>
-                <a:cs typeface="Courier New" panose="02070309020205020404" pitchFamily="49" charset="0"/>
-              </a:rPr>
-              <a:t>Входные и выходные сигналы (иначе - коннекторы) – нужны для того, чтобы пользователь мог соединять блоки между собой</a:t>
-            </a:r>
-          </a:p>
-        </p:txBody>
-      </p:sp>
-      <p:sp>
-        <p:nvSpPr>
-          <p:cNvPr id="8" name="Заголовок 1">
-            <a:extLst>
-              <a:ext uri="{FF2B5EF4-FFF2-40B4-BE49-F238E27FC236}">
-                <a16:creationId xmlns:a16="http://schemas.microsoft.com/office/drawing/2014/main" id="{084CA6BD-A3D1-44F2-8945-BBC64699F4DD}"/>
-              </a:ext>
-            </a:extLst>
-          </p:cNvPr>
-          <p:cNvSpPr txBox="1">
-            <a:spLocks/>
-          </p:cNvSpPr>
-          <p:nvPr/>
-        </p:nvSpPr>
-        <p:spPr>
-          <a:xfrm>
-            <a:off x="1021036" y="2726665"/>
-            <a:ext cx="10197547" cy="3453288"/>
-          </a:xfrm>
-          <a:prstGeom prst="rect">
-            <a:avLst/>
-          </a:prstGeom>
-        </p:spPr>
-        <p:txBody>
-          <a:bodyPr vert="horz" lIns="91440" tIns="45720" rIns="91440" bIns="45720" rtlCol="0" anchor="t">
-            <a:noAutofit/>
-          </a:bodyPr>
-          <a:lstStyle>
-            <a:lvl1pPr algn="l" defTabSz="912114" rtl="0" eaLnBrk="1" latinLnBrk="0" hangingPunct="1">
-              <a:lnSpc>
-                <a:spcPct val="90000"/>
-              </a:lnSpc>
-              <a:spcBef>
-                <a:spcPct val="0"/>
-              </a:spcBef>
-              <a:buNone/>
-              <a:defRPr sz="4389" kern="1200">
-                <a:solidFill>
-                  <a:schemeClr val="tx1"/>
-                </a:solidFill>
-                <a:latin typeface="+mj-lt"/>
-                <a:ea typeface="+mj-ea"/>
-                <a:cs typeface="+mj-cs"/>
-              </a:defRPr>
-            </a:lvl1pPr>
-          </a:lstStyle>
-          <a:p>
-            <a:pPr algn="just"/>
-            <a:r>
-              <a:rPr lang="ru-RU" sz="3000" dirty="0">
-                <a:solidFill>
-                  <a:srgbClr val="77F531"/>
-                </a:solidFill>
-                <a:latin typeface="RodchenkoCTT" pitchFamily="2" charset="0"/>
-                <a:cs typeface="Courier New" panose="02070309020205020404" pitchFamily="49" charset="0"/>
-              </a:rPr>
-              <a:t>Возможности и ограничения соединений:</a:t>
-            </a:r>
-          </a:p>
-          <a:p>
-            <a:pPr marL="742950" indent="-742950" algn="just">
-              <a:buAutoNum type="arabicParenR"/>
-            </a:pPr>
-            <a:r>
-              <a:rPr lang="ru-RU" sz="3000" dirty="0">
-                <a:solidFill>
-                  <a:srgbClr val="77F531"/>
-                </a:solidFill>
-                <a:latin typeface="RodchenkoCTT" pitchFamily="2" charset="0"/>
-                <a:cs typeface="Courier New" panose="02070309020205020404" pitchFamily="49" charset="0"/>
-              </a:rPr>
-              <a:t>Входной сигнал можно соединять только с одним выходным.</a:t>
-            </a:r>
-          </a:p>
-          <a:p>
-            <a:pPr marL="742950" indent="-742950" algn="just">
-              <a:buAutoNum type="arabicParenR"/>
-            </a:pPr>
-            <a:r>
-              <a:rPr lang="ru-RU" sz="3000" dirty="0">
-                <a:solidFill>
-                  <a:srgbClr val="77F531"/>
-                </a:solidFill>
-                <a:latin typeface="RodchenkoCTT" pitchFamily="2" charset="0"/>
-                <a:cs typeface="Courier New" panose="02070309020205020404" pitchFamily="49" charset="0"/>
-              </a:rPr>
-              <a:t>Выходной сигнал можно соединять с неограниченным количеством входных</a:t>
-            </a:r>
-          </a:p>
-          <a:p>
-            <a:pPr marL="742950" indent="-742950" algn="just">
-              <a:buAutoNum type="arabicParenR"/>
-            </a:pPr>
-            <a:r>
-              <a:rPr lang="ru-RU" sz="3000" dirty="0">
-                <a:solidFill>
-                  <a:srgbClr val="77F531"/>
-                </a:solidFill>
-                <a:latin typeface="RodchenkoCTT" pitchFamily="2" charset="0"/>
-                <a:cs typeface="Courier New" panose="02070309020205020404" pitchFamily="49" charset="0"/>
-              </a:rPr>
-              <a:t>Нельзя соединять коннектор с каким-либо другим коннектором, если в итоге путь сигнала станет зацикленным.</a:t>
-            </a:r>
-          </a:p>
-        </p:txBody>
-      </p:sp>
-    </p:spTree>
-    <p:extLst>
-      <p:ext uri="{BB962C8B-B14F-4D97-AF65-F5344CB8AC3E}">
-        <p14:creationId xmlns:p14="http://schemas.microsoft.com/office/powerpoint/2010/main" val="1181086272"/>
-      </p:ext>
-    </p:extLst>
-  </p:cSld>
-  <p:clrMapOvr>
-    <a:overrideClrMapping bg1="lt1" tx1="dk1" bg2="lt2" tx2="dk2" accent1="accent1" accent2="accent2" accent3="accent3" accent4="accent4" accent5="accent5" accent6="accent6" hlink="hlink" folHlink="folHlink"/>
-  </p:clrMapOvr>
+  <p:timing>
+    <p:tnLst>
+      <p:par>
+        <p:cTn id="1" dur="indefinite" restart="never" nodeType="tmRoot"/>
+      </p:par>
+    </p:tnLst>
+  </p:timing>
 </p:sld>
 </file>
 
@@ -12779,6 +13745,13 @@
   <p:clrMapOvr>
     <a:overrideClrMapping bg1="lt1" tx1="dk1" bg2="lt2" tx2="dk2" accent1="accent1" accent2="accent2" accent3="accent3" accent4="accent4" accent5="accent5" accent6="accent6" hlink="hlink" folHlink="folHlink"/>
   </p:clrMapOvr>
+  <p:timing>
+    <p:tnLst>
+      <p:par>
+        <p:cTn id="1" dur="indefinite" restart="never" nodeType="tmRoot"/>
+      </p:par>
+    </p:tnLst>
+  </p:timing>
 </p:sld>
 </file>
 
@@ -13011,6 +13984,13 @@
   <p:clrMapOvr>
     <a:overrideClrMapping bg1="lt1" tx1="dk1" bg2="lt2" tx2="dk2" accent1="accent1" accent2="accent2" accent3="accent3" accent4="accent4" accent5="accent5" accent6="accent6" hlink="hlink" folHlink="folHlink"/>
   </p:clrMapOvr>
+  <p:timing>
+    <p:tnLst>
+      <p:par>
+        <p:cTn id="1" dur="indefinite" restart="never" nodeType="tmRoot"/>
+      </p:par>
+    </p:tnLst>
+  </p:timing>
 </p:sld>
 </file>
 
@@ -13233,6 +14213,13 @@
   <p:clrMapOvr>
     <a:overrideClrMapping bg1="lt1" tx1="dk1" bg2="lt2" tx2="dk2" accent1="accent1" accent2="accent2" accent3="accent3" accent4="accent4" accent5="accent5" accent6="accent6" hlink="hlink" folHlink="folHlink"/>
   </p:clrMapOvr>
+  <p:timing>
+    <p:tnLst>
+      <p:par>
+        <p:cTn id="1" dur="indefinite" restart="never" nodeType="tmRoot"/>
+      </p:par>
+    </p:tnLst>
+  </p:timing>
 </p:sld>
 </file>
 
@@ -13526,6 +14513,13 @@
   <p:clrMapOvr>
     <a:masterClrMapping/>
   </p:clrMapOvr>
+  <p:timing>
+    <p:tnLst>
+      <p:par>
+        <p:cTn id="1" dur="indefinite" restart="never" nodeType="tmRoot"/>
+      </p:par>
+    </p:tnLst>
+  </p:timing>
 </p:sld>
 </file>
 
@@ -14314,4 +15308,47 @@
     </a:folHlink>
   </a:clrScheme>
 </a:themeOverride>
+</file>
+
+<file path=ppt/theme/themeOverride5.xml><?xml version="1.0" encoding="utf-8"?>
+<a:themeOverride xmlns:a="http://schemas.openxmlformats.org/drawingml/2006/main">
+  <a:clrScheme name="Тема Office">
+    <a:dk1>
+      <a:sysClr val="windowText" lastClr="000000"/>
+    </a:dk1>
+    <a:lt1>
+      <a:sysClr val="window" lastClr="FFFFFF"/>
+    </a:lt1>
+    <a:dk2>
+      <a:srgbClr val="44546A"/>
+    </a:dk2>
+    <a:lt2>
+      <a:srgbClr val="E7E6E6"/>
+    </a:lt2>
+    <a:accent1>
+      <a:srgbClr val="5B9BD5"/>
+    </a:accent1>
+    <a:accent2>
+      <a:srgbClr val="ED7D31"/>
+    </a:accent2>
+    <a:accent3>
+      <a:srgbClr val="A5A5A5"/>
+    </a:accent3>
+    <a:accent4>
+      <a:srgbClr val="FFC000"/>
+    </a:accent4>
+    <a:accent5>
+      <a:srgbClr val="4472C4"/>
+    </a:accent5>
+    <a:accent6>
+      <a:srgbClr val="70AD47"/>
+    </a:accent6>
+    <a:hlink>
+      <a:srgbClr val="0563C1"/>
+    </a:hlink>
+    <a:folHlink>
+      <a:srgbClr val="954F72"/>
+    </a:folHlink>
+  </a:clrScheme>
+</a:themeOverride>
 </file>
</xml_diff>

<commit_message>
Presentation update - 4. Maybe final.
</commit_message>
<xml_diff>
--- a/presentation.pptx
+++ b/presentation.pptx
@@ -300,7 +300,7 @@
           <a:p>
             <a:fld id="{07504AD1-F626-4EEE-A1F0-4F98A55EE3A4}" type="datetimeFigureOut">
               <a:rPr lang="ru-RU" smtClean="0"/>
-              <a:t>21.01.2022</a:t>
+              <a:t>22.01.2022</a:t>
             </a:fld>
             <a:endParaRPr lang="ru-RU"/>
           </a:p>
@@ -470,7 +470,7 @@
           <a:p>
             <a:fld id="{07504AD1-F626-4EEE-A1F0-4F98A55EE3A4}" type="datetimeFigureOut">
               <a:rPr lang="ru-RU" smtClean="0"/>
-              <a:t>21.01.2022</a:t>
+              <a:t>22.01.2022</a:t>
             </a:fld>
             <a:endParaRPr lang="ru-RU"/>
           </a:p>
@@ -650,7 +650,7 @@
           <a:p>
             <a:fld id="{07504AD1-F626-4EEE-A1F0-4F98A55EE3A4}" type="datetimeFigureOut">
               <a:rPr lang="ru-RU" smtClean="0"/>
-              <a:t>21.01.2022</a:t>
+              <a:t>22.01.2022</a:t>
             </a:fld>
             <a:endParaRPr lang="ru-RU"/>
           </a:p>
@@ -820,7 +820,7 @@
           <a:p>
             <a:fld id="{07504AD1-F626-4EEE-A1F0-4F98A55EE3A4}" type="datetimeFigureOut">
               <a:rPr lang="ru-RU" smtClean="0"/>
-              <a:t>21.01.2022</a:t>
+              <a:t>22.01.2022</a:t>
             </a:fld>
             <a:endParaRPr lang="ru-RU"/>
           </a:p>
@@ -1066,7 +1066,7 @@
           <a:p>
             <a:fld id="{07504AD1-F626-4EEE-A1F0-4F98A55EE3A4}" type="datetimeFigureOut">
               <a:rPr lang="ru-RU" smtClean="0"/>
-              <a:t>21.01.2022</a:t>
+              <a:t>22.01.2022</a:t>
             </a:fld>
             <a:endParaRPr lang="ru-RU"/>
           </a:p>
@@ -1298,7 +1298,7 @@
           <a:p>
             <a:fld id="{07504AD1-F626-4EEE-A1F0-4F98A55EE3A4}" type="datetimeFigureOut">
               <a:rPr lang="ru-RU" smtClean="0"/>
-              <a:t>21.01.2022</a:t>
+              <a:t>22.01.2022</a:t>
             </a:fld>
             <a:endParaRPr lang="ru-RU"/>
           </a:p>
@@ -1665,7 +1665,7 @@
           <a:p>
             <a:fld id="{07504AD1-F626-4EEE-A1F0-4F98A55EE3A4}" type="datetimeFigureOut">
               <a:rPr lang="ru-RU" smtClean="0"/>
-              <a:t>21.01.2022</a:t>
+              <a:t>22.01.2022</a:t>
             </a:fld>
             <a:endParaRPr lang="ru-RU"/>
           </a:p>
@@ -1783,7 +1783,7 @@
           <a:p>
             <a:fld id="{07504AD1-F626-4EEE-A1F0-4F98A55EE3A4}" type="datetimeFigureOut">
               <a:rPr lang="ru-RU" smtClean="0"/>
-              <a:t>21.01.2022</a:t>
+              <a:t>22.01.2022</a:t>
             </a:fld>
             <a:endParaRPr lang="ru-RU"/>
           </a:p>
@@ -1878,7 +1878,7 @@
           <a:p>
             <a:fld id="{07504AD1-F626-4EEE-A1F0-4F98A55EE3A4}" type="datetimeFigureOut">
               <a:rPr lang="ru-RU" smtClean="0"/>
-              <a:t>21.01.2022</a:t>
+              <a:t>22.01.2022</a:t>
             </a:fld>
             <a:endParaRPr lang="ru-RU"/>
           </a:p>
@@ -2155,7 +2155,7 @@
           <a:p>
             <a:fld id="{07504AD1-F626-4EEE-A1F0-4F98A55EE3A4}" type="datetimeFigureOut">
               <a:rPr lang="ru-RU" smtClean="0"/>
-              <a:t>21.01.2022</a:t>
+              <a:t>22.01.2022</a:t>
             </a:fld>
             <a:endParaRPr lang="ru-RU"/>
           </a:p>
@@ -2412,7 +2412,7 @@
           <a:p>
             <a:fld id="{07504AD1-F626-4EEE-A1F0-4F98A55EE3A4}" type="datetimeFigureOut">
               <a:rPr lang="ru-RU" smtClean="0"/>
-              <a:t>21.01.2022</a:t>
+              <a:t>22.01.2022</a:t>
             </a:fld>
             <a:endParaRPr lang="ru-RU"/>
           </a:p>
@@ -2625,7 +2625,7 @@
           <a:p>
             <a:fld id="{07504AD1-F626-4EEE-A1F0-4F98A55EE3A4}" type="datetimeFigureOut">
               <a:rPr lang="ru-RU" smtClean="0"/>
-              <a:t>21.01.2022</a:t>
+              <a:t>22.01.2022</a:t>
             </a:fld>
             <a:endParaRPr lang="ru-RU"/>
           </a:p>
@@ -3140,8 +3140,8 @@
         </p:nvSpPr>
         <p:spPr>
           <a:xfrm>
-            <a:off x="1799813" y="1620269"/>
-            <a:ext cx="8640000" cy="720000"/>
+            <a:off x="1439813" y="1620269"/>
+            <a:ext cx="9360000" cy="720000"/>
           </a:xfrm>
           <a:prstGeom prst="rect">
             <a:avLst/>
@@ -3173,7 +3173,7 @@
           <a:p>
             <a:r>
               <a:rPr lang="ru-RU" sz="4000" dirty="0" smtClean="0"/>
-              <a:t>Проектная работа по модулю "</a:t>
+              <a:t>Проектная работа по модулю «</a:t>
             </a:r>
             <a:r>
               <a:rPr lang="en-US" sz="4000" dirty="0" err="1" smtClean="0"/>
@@ -3181,7 +3181,7 @@
             </a:r>
             <a:r>
               <a:rPr lang="ru-RU" sz="4000" dirty="0" smtClean="0"/>
-              <a:t>"</a:t>
+              <a:t>»</a:t>
             </a:r>
             <a:endParaRPr lang="ru-RU" sz="4000" dirty="0"/>
           </a:p>
@@ -11287,42 +11287,64 @@
         </p:nvSpPr>
         <p:spPr>
           <a:xfrm>
-            <a:off x="2599315" y="3770108"/>
-            <a:ext cx="7040997" cy="2477665"/>
+            <a:off x="450014" y="3770108"/>
+            <a:ext cx="11339598" cy="2775835"/>
           </a:xfrm>
         </p:spPr>
         <p:txBody>
-          <a:bodyPr/>
+          <a:bodyPr>
+            <a:normAutofit/>
+          </a:bodyPr>
           <a:lstStyle/>
           <a:p>
-            <a:r>
-              <a:rPr lang="ru-RU" dirty="0"/>
+            <a:pPr marL="1074738" indent="-1074738">
+              <a:buBlip>
+                <a:blip r:embed="rId3"/>
+              </a:buBlip>
+            </a:pPr>
+            <a:r>
+              <a:rPr lang="ru-RU" sz="3200" dirty="0"/>
               <a:t>Реализовать базовые механики и базовые блоки</a:t>
             </a:r>
           </a:p>
           <a:p>
-            <a:r>
-              <a:rPr lang="ru-RU" dirty="0"/>
+            <a:pPr marL="1074738" indent="-1074738">
+              <a:buBlip>
+                <a:blip r:embed="rId3"/>
+              </a:buBlip>
+            </a:pPr>
+            <a:r>
+              <a:rPr lang="ru-RU" sz="3200" dirty="0"/>
               <a:t>Придумать уровни</a:t>
             </a:r>
           </a:p>
           <a:p>
-            <a:r>
-              <a:rPr lang="ru-RU" dirty="0"/>
-              <a:t>Создать редактор </a:t>
-            </a:r>
-            <a:r>
-              <a:rPr lang="ru-RU" dirty="0" err="1"/>
+            <a:pPr marL="1074738" indent="-1074738">
+              <a:buBlip>
+                <a:blip r:embed="rId3"/>
+              </a:buBlip>
+            </a:pPr>
+            <a:r>
+              <a:rPr lang="ru-RU" sz="3200" dirty="0"/>
+              <a:t>Создать редактор пользовательских (</a:t>
+            </a:r>
+            <a:r>
+              <a:rPr lang="ru-RU" sz="3200" dirty="0" err="1"/>
               <a:t>кастомных</a:t>
             </a:r>
             <a:r>
-              <a:rPr lang="ru-RU" dirty="0"/>
-              <a:t> блоков</a:t>
-            </a:r>
-          </a:p>
-          <a:p>
-            <a:r>
-              <a:rPr lang="ru-RU" dirty="0"/>
+              <a:rPr lang="ru-RU" sz="3200" dirty="0"/>
+              <a:t>) блоков</a:t>
+            </a:r>
+          </a:p>
+          <a:p>
+            <a:pPr marL="1074738" indent="-1074738">
+              <a:buBlip>
+                <a:blip r:embed="rId3"/>
+              </a:buBlip>
+            </a:pPr>
+            <a:r>
+              <a:rPr lang="ru-RU" sz="3200" dirty="0"/>
               <a:t>Добавить обучение</a:t>
             </a:r>
           </a:p>
@@ -11377,8 +11399,8 @@
         </p:nvSpPr>
         <p:spPr>
           <a:xfrm>
-            <a:off x="2061795" y="1779584"/>
-            <a:ext cx="8116037" cy="957834"/>
+            <a:off x="178469" y="1779584"/>
+            <a:ext cx="11611144" cy="957442"/>
           </a:xfrm>
           <a:prstGeom prst="rect">
             <a:avLst/>
@@ -11386,21 +11408,44 @@
           <a:noFill/>
         </p:spPr>
         <p:txBody>
-          <a:bodyPr wrap="none" rtlCol="0">
+          <a:bodyPr wrap="square" rtlCol="0">
             <a:spAutoFit/>
           </a:bodyPr>
           <a:lstStyle/>
           <a:p>
+            <a:pPr algn="ctr"/>
             <a:r>
               <a:rPr lang="ru-RU" sz="2811" dirty="0"/>
               <a:t>Реализовать игру, основанную на двоичной логике </a:t>
             </a:r>
-          </a:p>
-          <a:p>
+            <a:r>
+              <a:rPr lang="ru-RU" sz="2811" dirty="0" smtClean="0"/>
+              <a:t>и </a:t>
+            </a:r>
             <a:r>
               <a:rPr lang="ru-RU" sz="2811" dirty="0"/>
-              <a:t>и построении блок-схем на простейших операция</a:t>
-            </a:r>
+              <a:t>построении </a:t>
+            </a:r>
+            <a:r>
+              <a:rPr lang="ru-RU" sz="2811" dirty="0" smtClean="0"/>
+              <a:t/>
+            </a:r>
+            <a:br>
+              <a:rPr lang="ru-RU" sz="2811" dirty="0" smtClean="0"/>
+            </a:br>
+            <a:r>
+              <a:rPr lang="ru-RU" sz="2811" dirty="0" smtClean="0"/>
+              <a:t>блок-схем </a:t>
+            </a:r>
+            <a:r>
+              <a:rPr lang="ru-RU" sz="2811" dirty="0"/>
+              <a:t>на простейших </a:t>
+            </a:r>
+            <a:r>
+              <a:rPr lang="ru-RU" sz="2811" dirty="0" smtClean="0"/>
+              <a:t>операциях</a:t>
+            </a:r>
+            <a:endParaRPr lang="ru-RU" sz="2811" dirty="0"/>
           </a:p>
         </p:txBody>
       </p:sp>
@@ -11845,13 +11890,6 @@
               </a:rPr>
               <a:t>Нельзя создавать зацикленные соединения.</a:t>
             </a:r>
-            <a:endParaRPr lang="ru-RU" sz="2400" dirty="0" smtClean="0">
-              <a:solidFill>
-                <a:srgbClr val="77F531"/>
-              </a:solidFill>
-              <a:latin typeface="RodchenkoCTT" pitchFamily="2" charset="0"/>
-              <a:cs typeface="Courier New" panose="02070309020205020404" pitchFamily="49" charset="0"/>
-            </a:endParaRPr>
           </a:p>
         </p:txBody>
       </p:sp>
@@ -13841,6 +13879,29 @@
           </a:p>
         </p:txBody>
       </p:sp>
+      <p:pic>
+        <p:nvPicPr>
+          <p:cNvPr id="18" name="Рисунок 17"/>
+          <p:cNvPicPr>
+            <a:picLocks noChangeAspect="1"/>
+          </p:cNvPicPr>
+          <p:nvPr/>
+        </p:nvPicPr>
+        <p:blipFill rotWithShape="1">
+          <a:blip r:embed="rId4"/>
+          <a:srcRect t="67767" r="69786" b="1741"/>
+          <a:stretch/>
+        </p:blipFill>
+        <p:spPr>
+          <a:xfrm>
+            <a:off x="7467441" y="1614484"/>
+            <a:ext cx="4035490" cy="2290958"/>
+          </a:xfrm>
+          <a:prstGeom prst="rect">
+            <a:avLst/>
+          </a:prstGeom>
+        </p:spPr>
+      </p:pic>
       <p:sp>
         <p:nvSpPr>
           <p:cNvPr id="5" name="Заголовок 1">
@@ -13899,8 +13960,8 @@
         </p:nvSpPr>
         <p:spPr>
           <a:xfrm>
-            <a:off x="1033670" y="1530627"/>
-            <a:ext cx="10197547" cy="3021495"/>
+            <a:off x="786390" y="1530628"/>
+            <a:ext cx="6605009" cy="3584298"/>
           </a:xfrm>
           <a:prstGeom prst="rect">
             <a:avLst/>
@@ -13908,7 +13969,7 @@
         </p:spPr>
         <p:txBody>
           <a:bodyPr vert="horz" lIns="91440" tIns="45720" rIns="91440" bIns="45720" rtlCol="0" anchor="t">
-            <a:normAutofit fontScale="62500" lnSpcReduction="20000"/>
+            <a:noAutofit/>
           </a:bodyPr>
           <a:lstStyle>
             <a:lvl1pPr algn="l" defTabSz="912114" rtl="0" eaLnBrk="1" latinLnBrk="0" hangingPunct="1">
@@ -13932,7 +13993,7 @@
           <a:p>
             <a:pPr algn="just"/>
             <a:r>
-              <a:rPr lang="ru-RU" sz="4400" dirty="0">
+              <a:rPr lang="ru-RU" sz="2300" dirty="0">
                 <a:solidFill>
                   <a:srgbClr val="77F531"/>
                 </a:solidFill>
@@ -13943,11 +14004,11 @@
             </a:r>
           </a:p>
           <a:p>
-            <a:pPr marL="742950" indent="-742950" algn="just">
+            <a:pPr marL="361950" indent="-361950" algn="just">
               <a:buAutoNum type="arabicParenR"/>
             </a:pPr>
             <a:r>
-              <a:rPr lang="ru-RU" sz="4400" dirty="0">
+              <a:rPr lang="ru-RU" sz="2300" dirty="0">
                 <a:solidFill>
                   <a:srgbClr val="77F531"/>
                 </a:solidFill>
@@ -13958,19 +14019,209 @@
             </a:r>
           </a:p>
           <a:p>
-            <a:pPr marL="742950" indent="-742950" algn="just">
+            <a:pPr marL="361950" indent="-361950" algn="just">
               <a:buAutoNum type="arabicParenR"/>
             </a:pPr>
             <a:r>
-              <a:rPr lang="ru-RU" sz="4400" dirty="0">
+              <a:rPr lang="ru-RU" sz="2300" dirty="0">
                 <a:solidFill>
                   <a:srgbClr val="77F531"/>
                 </a:solidFill>
                 <a:latin typeface="RodchenkoCTT" pitchFamily="2" charset="0"/>
                 <a:cs typeface="Courier New" panose="02070309020205020404" pitchFamily="49" charset="0"/>
               </a:rPr>
-              <a:t>Максимальное количество пройденных тестов. Вычисляется процент пройденных тестов от общего количества, а потом применяется к максимальному количеству очков. Результат этих вычислений (с округлением в пользу игрока) – это текущие очки за уровень.</a:t>
-            </a:r>
+              <a:t>Максимальное количество пройденных тестов. </a:t>
+            </a:r>
+            <a:r>
+              <a:rPr lang="ru-RU" sz="2300" dirty="0" smtClean="0">
+                <a:solidFill>
+                  <a:srgbClr val="77F531"/>
+                </a:solidFill>
+                <a:latin typeface="RodchenkoCTT" pitchFamily="2" charset="0"/>
+                <a:cs typeface="Courier New" panose="02070309020205020404" pitchFamily="49" charset="0"/>
+              </a:rPr>
+              <a:t>Количество очков пропорционально количеству пройденных тестов.</a:t>
+            </a:r>
+          </a:p>
+          <a:p>
+            <a:pPr algn="just"/>
+            <a:r>
+              <a:rPr lang="ru-RU" sz="2300" dirty="0">
+                <a:solidFill>
+                  <a:srgbClr val="77F531"/>
+                </a:solidFill>
+                <a:latin typeface="RodchenkoCTT" pitchFamily="2" charset="0"/>
+                <a:cs typeface="Courier New" panose="02070309020205020404" pitchFamily="49" charset="0"/>
+              </a:rPr>
+              <a:t>Пользователь может увидеть свои очки находясь на уровне и в меню уровней, суммарное количество очков показывается и в главном меню</a:t>
+            </a:r>
+            <a:r>
+              <a:rPr lang="ru-RU" sz="2300" dirty="0" smtClean="0">
+                <a:solidFill>
+                  <a:srgbClr val="77F531"/>
+                </a:solidFill>
+                <a:latin typeface="RodchenkoCTT" pitchFamily="2" charset="0"/>
+                <a:cs typeface="Courier New" panose="02070309020205020404" pitchFamily="49" charset="0"/>
+              </a:rPr>
+              <a:t>.</a:t>
+            </a:r>
+            <a:endParaRPr lang="ru-RU" sz="2300" dirty="0">
+              <a:solidFill>
+                <a:srgbClr val="77F531"/>
+              </a:solidFill>
+              <a:latin typeface="RodchenkoCTT" pitchFamily="2" charset="0"/>
+              <a:cs typeface="Courier New" panose="02070309020205020404" pitchFamily="49" charset="0"/>
+            </a:endParaRPr>
+          </a:p>
+        </p:txBody>
+      </p:sp>
+      <p:pic>
+        <p:nvPicPr>
+          <p:cNvPr id="2" name="Рисунок 1"/>
+          <p:cNvPicPr>
+            <a:picLocks noChangeAspect="1"/>
+          </p:cNvPicPr>
+          <p:nvPr/>
+        </p:nvPicPr>
+        <p:blipFill rotWithShape="1">
+          <a:blip r:embed="rId5"/>
+          <a:srcRect t="17551" r="11561" b="70935"/>
+          <a:stretch/>
+        </p:blipFill>
+        <p:spPr>
+          <a:xfrm>
+            <a:off x="609601" y="5372100"/>
+            <a:ext cx="11042587" cy="808622"/>
+          </a:xfrm>
+          <a:prstGeom prst="rect">
+            <a:avLst/>
+          </a:prstGeom>
+        </p:spPr>
+      </p:pic>
+      <p:sp>
+        <p:nvSpPr>
+          <p:cNvPr id="6" name="Овал 5"/>
+          <p:cNvSpPr/>
+          <p:nvPr/>
+        </p:nvSpPr>
+        <p:spPr>
+          <a:xfrm>
+            <a:off x="10998508" y="5525180"/>
+            <a:ext cx="502462" cy="502462"/>
+          </a:xfrm>
+          <a:prstGeom prst="ellipse">
+            <a:avLst/>
+          </a:prstGeom>
+          <a:noFill/>
+          <a:ln w="63500">
+            <a:solidFill>
+              <a:srgbClr val="77F531"/>
+            </a:solidFill>
+          </a:ln>
+        </p:spPr>
+        <p:style>
+          <a:lnRef idx="2">
+            <a:schemeClr val="accent1">
+              <a:shade val="50000"/>
+            </a:schemeClr>
+          </a:lnRef>
+          <a:fillRef idx="1">
+            <a:schemeClr val="accent1"/>
+          </a:fillRef>
+          <a:effectRef idx="0">
+            <a:schemeClr val="accent1"/>
+          </a:effectRef>
+          <a:fontRef idx="minor">
+            <a:schemeClr val="lt1"/>
+          </a:fontRef>
+        </p:style>
+        <p:txBody>
+          <a:bodyPr rtlCol="0" anchor="ctr"/>
+          <a:lstStyle/>
+          <a:p>
+            <a:pPr algn="ctr"/>
+            <a:endParaRPr lang="ru-RU"/>
+          </a:p>
+        </p:txBody>
+      </p:sp>
+      <p:pic>
+        <p:nvPicPr>
+          <p:cNvPr id="14" name="Рисунок 13"/>
+          <p:cNvPicPr>
+            <a:picLocks noChangeAspect="1"/>
+          </p:cNvPicPr>
+          <p:nvPr/>
+        </p:nvPicPr>
+        <p:blipFill rotWithShape="1">
+          <a:blip r:embed="rId6">
+            <a:extLst>
+              <a:ext uri="{28A0092B-C50C-407E-A947-70E740481C1C}">
+                <a14:useLocalDpi xmlns:a14="http://schemas.microsoft.com/office/drawing/2010/main" val="0"/>
+              </a:ext>
+            </a:extLst>
+          </a:blip>
+          <a:srcRect r="87983" b="93136"/>
+          <a:stretch/>
+        </p:blipFill>
+        <p:spPr>
+          <a:xfrm>
+            <a:off x="7796870" y="4143375"/>
+            <a:ext cx="2693463" cy="865370"/>
+          </a:xfrm>
+          <a:prstGeom prst="rect">
+            <a:avLst/>
+          </a:prstGeom>
+          <a:ln w="63500">
+            <a:solidFill>
+              <a:srgbClr val="77F531"/>
+            </a:solidFill>
+          </a:ln>
+        </p:spPr>
+      </p:pic>
+      <p:sp>
+        <p:nvSpPr>
+          <p:cNvPr id="17" name="Прямоугольник 16"/>
+          <p:cNvSpPr/>
+          <p:nvPr/>
+        </p:nvSpPr>
+        <p:spPr>
+          <a:xfrm>
+            <a:off x="7467440" y="3091066"/>
+            <a:ext cx="1457897" cy="688953"/>
+          </a:xfrm>
+          <a:prstGeom prst="rect">
+            <a:avLst/>
+          </a:prstGeom>
+          <a:noFill/>
+          <a:ln w="63500" cap="rnd">
+            <a:solidFill>
+              <a:srgbClr val="77F531"/>
+            </a:solidFill>
+            <a:round/>
+          </a:ln>
+        </p:spPr>
+        <p:style>
+          <a:lnRef idx="2">
+            <a:schemeClr val="accent1">
+              <a:shade val="50000"/>
+            </a:schemeClr>
+          </a:lnRef>
+          <a:fillRef idx="1">
+            <a:schemeClr val="accent1"/>
+          </a:fillRef>
+          <a:effectRef idx="0">
+            <a:schemeClr val="accent1"/>
+          </a:effectRef>
+          <a:fontRef idx="minor">
+            <a:schemeClr val="lt1"/>
+          </a:fontRef>
+        </p:style>
+        <p:txBody>
+          <a:bodyPr rtlCol="0" anchor="ctr"/>
+          <a:lstStyle/>
+          <a:p>
+            <a:pPr algn="ctr"/>
+            <a:endParaRPr lang="ru-RU"/>
           </a:p>
         </p:txBody>
       </p:sp>
@@ -14200,6 +14451,136 @@
               </a:rPr>
               <a:t>иначе - конструктор) – создана для того, чтобы пользователь мог создавать свои собственные блоки из базовых.</a:t>
             </a:r>
+          </a:p>
+        </p:txBody>
+      </p:sp>
+      <p:pic>
+        <p:nvPicPr>
+          <p:cNvPr id="2" name="Рисунок 1"/>
+          <p:cNvPicPr>
+            <a:picLocks noChangeAspect="1"/>
+          </p:cNvPicPr>
+          <p:nvPr/>
+        </p:nvPicPr>
+        <p:blipFill rotWithShape="1">
+          <a:blip r:embed="rId4"/>
+          <a:srcRect l="38224" t="27541" r="42061" b="32332"/>
+          <a:stretch/>
+        </p:blipFill>
+        <p:spPr>
+          <a:xfrm>
+            <a:off x="7558056" y="2610627"/>
+            <a:ext cx="2630974" cy="3012275"/>
+          </a:xfrm>
+          <a:prstGeom prst="rect">
+            <a:avLst/>
+          </a:prstGeom>
+          <a:ln w="63500">
+            <a:solidFill>
+              <a:srgbClr val="77F531"/>
+            </a:solidFill>
+          </a:ln>
+        </p:spPr>
+      </p:pic>
+      <p:pic>
+        <p:nvPicPr>
+          <p:cNvPr id="3" name="Рисунок 2"/>
+          <p:cNvPicPr>
+            <a:picLocks noChangeAspect="1"/>
+          </p:cNvPicPr>
+          <p:nvPr/>
+        </p:nvPicPr>
+        <p:blipFill rotWithShape="1">
+          <a:blip r:embed="rId5">
+            <a:extLst>
+              <a:ext uri="{28A0092B-C50C-407E-A947-70E740481C1C}">
+                <a14:useLocalDpi xmlns:a14="http://schemas.microsoft.com/office/drawing/2010/main" val="0"/>
+              </a:ext>
+            </a:extLst>
+          </a:blip>
+          <a:srcRect l="24383" t="32039" r="64637" b="50350"/>
+          <a:stretch/>
+        </p:blipFill>
+        <p:spPr>
+          <a:xfrm>
+            <a:off x="2046514" y="2815771"/>
+            <a:ext cx="2520180" cy="2273643"/>
+          </a:xfrm>
+          <a:prstGeom prst="rect">
+            <a:avLst/>
+          </a:prstGeom>
+          <a:ln w="63500">
+            <a:solidFill>
+              <a:srgbClr val="77F531"/>
+            </a:solidFill>
+          </a:ln>
+        </p:spPr>
+      </p:pic>
+      <p:sp>
+        <p:nvSpPr>
+          <p:cNvPr id="7" name="Заголовок 1">
+            <a:extLst>
+              <a:ext uri="{FF2B5EF4-FFF2-40B4-BE49-F238E27FC236}">
+                <a16:creationId xmlns:a16="http://schemas.microsoft.com/office/drawing/2014/main" id="{6D8728E5-634E-46B1-9637-28E8C9DBD738}"/>
+              </a:ext>
+            </a:extLst>
+          </p:cNvPr>
+          <p:cNvSpPr txBox="1">
+            <a:spLocks/>
+          </p:cNvSpPr>
+          <p:nvPr/>
+        </p:nvSpPr>
+        <p:spPr>
+          <a:xfrm>
+            <a:off x="5625199" y="3213928"/>
+            <a:ext cx="743721" cy="1477328"/>
+          </a:xfrm>
+          <a:prstGeom prst="rect">
+            <a:avLst/>
+          </a:prstGeom>
+        </p:spPr>
+        <p:txBody>
+          <a:bodyPr vert="horz" wrap="square" lIns="91440" tIns="45720" rIns="91440" bIns="45720" rtlCol="0" anchor="t">
+            <a:spAutoFit/>
+          </a:bodyPr>
+          <a:lstStyle>
+            <a:lvl1pPr algn="l" defTabSz="912114" rtl="0" eaLnBrk="1" latinLnBrk="0" hangingPunct="1">
+              <a:lnSpc>
+                <a:spcPct val="90000"/>
+              </a:lnSpc>
+              <a:spcBef>
+                <a:spcPct val="0"/>
+              </a:spcBef>
+              <a:buNone/>
+              <a:defRPr sz="4389" kern="1200">
+                <a:solidFill>
+                  <a:schemeClr val="tx1"/>
+                </a:solidFill>
+                <a:latin typeface="+mj-lt"/>
+                <a:ea typeface="+mj-ea"/>
+                <a:cs typeface="+mj-cs"/>
+              </a:defRPr>
+            </a:lvl1pPr>
+          </a:lstStyle>
+          <a:p>
+            <a:pPr algn="just"/>
+            <a:r>
+              <a:rPr lang="en-US" sz="10000" dirty="0" smtClean="0">
+                <a:solidFill>
+                  <a:srgbClr val="77F531"/>
+                </a:solidFill>
+                <a:latin typeface="RodchenkoCTT" pitchFamily="2" charset="0"/>
+                <a:cs typeface="Courier New" panose="02070309020205020404" pitchFamily="49" charset="0"/>
+              </a:rPr>
+              <a:t>=</a:t>
+            </a:r>
+            <a:endParaRPr lang="ru-RU" sz="10000" dirty="0">
+              <a:solidFill>
+                <a:srgbClr val="77F531"/>
+              </a:solidFill>
+              <a:latin typeface="RodchenkoCTT" pitchFamily="2" charset="0"/>
+              <a:cs typeface="Courier New" panose="02070309020205020404" pitchFamily="49" charset="0"/>
+            </a:endParaRPr>
           </a:p>
         </p:txBody>
       </p:sp>

</xml_diff>

<commit_message>
Presentation - one image fix, unused fonts removed, requirements changed, exe added, base font changed
</commit_message>
<xml_diff>
--- a/presentation.pptx
+++ b/presentation.pptx
@@ -300,7 +300,7 @@
           <a:p>
             <a:fld id="{07504AD1-F626-4EEE-A1F0-4F98A55EE3A4}" type="datetimeFigureOut">
               <a:rPr lang="ru-RU" smtClean="0"/>
-              <a:t>22.01.2022</a:t>
+              <a:t>26.01.2022</a:t>
             </a:fld>
             <a:endParaRPr lang="ru-RU"/>
           </a:p>
@@ -470,7 +470,7 @@
           <a:p>
             <a:fld id="{07504AD1-F626-4EEE-A1F0-4F98A55EE3A4}" type="datetimeFigureOut">
               <a:rPr lang="ru-RU" smtClean="0"/>
-              <a:t>22.01.2022</a:t>
+              <a:t>26.01.2022</a:t>
             </a:fld>
             <a:endParaRPr lang="ru-RU"/>
           </a:p>
@@ -650,7 +650,7 @@
           <a:p>
             <a:fld id="{07504AD1-F626-4EEE-A1F0-4F98A55EE3A4}" type="datetimeFigureOut">
               <a:rPr lang="ru-RU" smtClean="0"/>
-              <a:t>22.01.2022</a:t>
+              <a:t>26.01.2022</a:t>
             </a:fld>
             <a:endParaRPr lang="ru-RU"/>
           </a:p>
@@ -820,7 +820,7 @@
           <a:p>
             <a:fld id="{07504AD1-F626-4EEE-A1F0-4F98A55EE3A4}" type="datetimeFigureOut">
               <a:rPr lang="ru-RU" smtClean="0"/>
-              <a:t>22.01.2022</a:t>
+              <a:t>26.01.2022</a:t>
             </a:fld>
             <a:endParaRPr lang="ru-RU"/>
           </a:p>
@@ -1066,7 +1066,7 @@
           <a:p>
             <a:fld id="{07504AD1-F626-4EEE-A1F0-4F98A55EE3A4}" type="datetimeFigureOut">
               <a:rPr lang="ru-RU" smtClean="0"/>
-              <a:t>22.01.2022</a:t>
+              <a:t>26.01.2022</a:t>
             </a:fld>
             <a:endParaRPr lang="ru-RU"/>
           </a:p>
@@ -1298,7 +1298,7 @@
           <a:p>
             <a:fld id="{07504AD1-F626-4EEE-A1F0-4F98A55EE3A4}" type="datetimeFigureOut">
               <a:rPr lang="ru-RU" smtClean="0"/>
-              <a:t>22.01.2022</a:t>
+              <a:t>26.01.2022</a:t>
             </a:fld>
             <a:endParaRPr lang="ru-RU"/>
           </a:p>
@@ -1665,7 +1665,7 @@
           <a:p>
             <a:fld id="{07504AD1-F626-4EEE-A1F0-4F98A55EE3A4}" type="datetimeFigureOut">
               <a:rPr lang="ru-RU" smtClean="0"/>
-              <a:t>22.01.2022</a:t>
+              <a:t>26.01.2022</a:t>
             </a:fld>
             <a:endParaRPr lang="ru-RU"/>
           </a:p>
@@ -1783,7 +1783,7 @@
           <a:p>
             <a:fld id="{07504AD1-F626-4EEE-A1F0-4F98A55EE3A4}" type="datetimeFigureOut">
               <a:rPr lang="ru-RU" smtClean="0"/>
-              <a:t>22.01.2022</a:t>
+              <a:t>26.01.2022</a:t>
             </a:fld>
             <a:endParaRPr lang="ru-RU"/>
           </a:p>
@@ -1878,7 +1878,7 @@
           <a:p>
             <a:fld id="{07504AD1-F626-4EEE-A1F0-4F98A55EE3A4}" type="datetimeFigureOut">
               <a:rPr lang="ru-RU" smtClean="0"/>
-              <a:t>22.01.2022</a:t>
+              <a:t>26.01.2022</a:t>
             </a:fld>
             <a:endParaRPr lang="ru-RU"/>
           </a:p>
@@ -2155,7 +2155,7 @@
           <a:p>
             <a:fld id="{07504AD1-F626-4EEE-A1F0-4F98A55EE3A4}" type="datetimeFigureOut">
               <a:rPr lang="ru-RU" smtClean="0"/>
-              <a:t>22.01.2022</a:t>
+              <a:t>26.01.2022</a:t>
             </a:fld>
             <a:endParaRPr lang="ru-RU"/>
           </a:p>
@@ -2412,7 +2412,7 @@
           <a:p>
             <a:fld id="{07504AD1-F626-4EEE-A1F0-4F98A55EE3A4}" type="datetimeFigureOut">
               <a:rPr lang="ru-RU" smtClean="0"/>
-              <a:t>22.01.2022</a:t>
+              <a:t>26.01.2022</a:t>
             </a:fld>
             <a:endParaRPr lang="ru-RU"/>
           </a:p>
@@ -2625,7 +2625,7 @@
           <a:p>
             <a:fld id="{07504AD1-F626-4EEE-A1F0-4F98A55EE3A4}" type="datetimeFigureOut">
               <a:rPr lang="ru-RU" smtClean="0"/>
-              <a:t>22.01.2022</a:t>
+              <a:t>26.01.2022</a:t>
             </a:fld>
             <a:endParaRPr lang="ru-RU"/>
           </a:p>
@@ -3074,19 +3074,15 @@
           <a:lstStyle/>
           <a:p>
             <a:r>
-              <a:rPr lang="ru-RU" dirty="0" smtClean="0"/>
+              <a:rPr lang="ru-RU" dirty="0"/>
               <a:t>Компьютерная игра</a:t>
             </a:r>
             <a:br>
-              <a:rPr lang="ru-RU" dirty="0" smtClean="0"/>
+              <a:rPr lang="ru-RU" dirty="0"/>
             </a:br>
             <a:r>
-              <a:rPr lang="ru-RU" dirty="0" smtClean="0"/>
-              <a:t>«Логические </a:t>
-            </a:r>
-            <a:r>
               <a:rPr lang="ru-RU" dirty="0"/>
-              <a:t>функции»</a:t>
+              <a:t>«Логические функции»</a:t>
             </a:r>
           </a:p>
         </p:txBody>
@@ -3172,18 +3168,17 @@
           </a:lstStyle>
           <a:p>
             <a:r>
-              <a:rPr lang="ru-RU" sz="4000" dirty="0" smtClean="0"/>
+              <a:rPr lang="ru-RU" sz="4000" dirty="0"/>
               <a:t>Проектная работа по модулю «</a:t>
             </a:r>
             <a:r>
-              <a:rPr lang="en-US" sz="4000" dirty="0" err="1" smtClean="0"/>
+              <a:rPr lang="en-US" sz="4000" dirty="0" err="1"/>
               <a:t>pygame</a:t>
             </a:r>
             <a:r>
-              <a:rPr lang="ru-RU" sz="4000" dirty="0" smtClean="0"/>
+              <a:rPr lang="ru-RU" sz="4000" dirty="0"/>
               <a:t>»</a:t>
             </a:r>
-            <a:endParaRPr lang="ru-RU" sz="4000" dirty="0"/>
           </a:p>
         </p:txBody>
       </p:sp>
@@ -3197,13 +3192,6 @@
   <p:clrMapOvr>
     <a:masterClrMapping/>
   </p:clrMapOvr>
-  <p:timing>
-    <p:tnLst>
-      <p:par>
-        <p:cTn id="1" dur="indefinite" restart="never" nodeType="tmRoot"/>
-      </p:par>
-    </p:tnLst>
-  </p:timing>
 </p:sld>
 </file>
 
@@ -11163,7 +11151,7 @@
           <a:p>
             <a:pPr algn="ctr"/>
             <a:r>
-              <a:rPr lang="ru-RU" sz="7200" dirty="0" smtClean="0">
+              <a:rPr lang="ru-RU" sz="7200" dirty="0">
                 <a:solidFill>
                   <a:srgbClr val="77F531"/>
                 </a:solidFill>
@@ -11172,13 +11160,6 @@
               </a:rPr>
               <a:t>СПАСИБО ЗА ВНИМАНИЕ</a:t>
             </a:r>
-            <a:endParaRPr lang="ru-RU" sz="7200" dirty="0">
-              <a:solidFill>
-                <a:srgbClr val="77F531"/>
-              </a:solidFill>
-              <a:latin typeface="RodchenkoCTT" pitchFamily="2" charset="0"/>
-              <a:cs typeface="Courier New" panose="02070309020205020404" pitchFamily="49" charset="0"/>
-            </a:endParaRPr>
           </a:p>
         </p:txBody>
       </p:sp>
@@ -11192,13 +11173,6 @@
   <p:clrMapOvr>
     <a:overrideClrMapping bg1="lt1" tx1="dk1" bg2="lt2" tx2="dk2" accent1="accent1" accent2="accent2" accent3="accent3" accent4="accent4" accent5="accent5" accent6="accent6" hlink="hlink" folHlink="folHlink"/>
   </p:clrMapOvr>
-  <p:timing>
-    <p:tnLst>
-      <p:par>
-        <p:cTn id="1" dur="indefinite" restart="never" nodeType="tmRoot"/>
-      </p:par>
-    </p:tnLst>
-  </p:timing>
 </p:sld>
 </file>
 
@@ -11416,36 +11390,15 @@
             <a:pPr algn="ctr"/>
             <a:r>
               <a:rPr lang="ru-RU" sz="2811" dirty="0"/>
-              <a:t>Реализовать игру, основанную на двоичной логике </a:t>
+              <a:t>Реализовать игру, основанную на двоичной логике и построении </a:t>
             </a:r>
-            <a:r>
-              <a:rPr lang="ru-RU" sz="2811" dirty="0" smtClean="0"/>
-              <a:t>и </a:t>
-            </a:r>
+            <a:br>
+              <a:rPr lang="ru-RU" sz="2811" dirty="0"/>
+            </a:br>
             <a:r>
               <a:rPr lang="ru-RU" sz="2811" dirty="0"/>
-              <a:t>построении </a:t>
+              <a:t>блок-схем на простейших операциях</a:t>
             </a:r>
-            <a:r>
-              <a:rPr lang="ru-RU" sz="2811" dirty="0" smtClean="0"/>
-              <a:t/>
-            </a:r>
-            <a:br>
-              <a:rPr lang="ru-RU" sz="2811" dirty="0" smtClean="0"/>
-            </a:br>
-            <a:r>
-              <a:rPr lang="ru-RU" sz="2811" dirty="0" smtClean="0"/>
-              <a:t>блок-схем </a:t>
-            </a:r>
-            <a:r>
-              <a:rPr lang="ru-RU" sz="2811" dirty="0"/>
-              <a:t>на простейших </a:t>
-            </a:r>
-            <a:r>
-              <a:rPr lang="ru-RU" sz="2811" dirty="0" smtClean="0"/>
-              <a:t>операциях</a:t>
-            </a:r>
-            <a:endParaRPr lang="ru-RU" sz="2811" dirty="0"/>
           </a:p>
         </p:txBody>
       </p:sp>
@@ -11494,13 +11447,6 @@
   <p:clrMapOvr>
     <a:masterClrMapping/>
   </p:clrMapOvr>
-  <p:timing>
-    <p:tnLst>
-      <p:par>
-        <p:cTn id="1" dur="indefinite" restart="never" nodeType="tmRoot"/>
-      </p:par>
-    </p:tnLst>
-  </p:timing>
 </p:sld>
 </file>
 
@@ -11704,16 +11650,6 @@
           <a:p>
             <a:pPr algn="just"/>
             <a:r>
-              <a:rPr lang="ru-RU" sz="2400" dirty="0" smtClean="0">
-                <a:solidFill>
-                  <a:srgbClr val="77F531"/>
-                </a:solidFill>
-                <a:latin typeface="RodchenkoCTT" pitchFamily="2" charset="0"/>
-                <a:cs typeface="Courier New" panose="02070309020205020404" pitchFamily="49" charset="0"/>
-              </a:rPr>
-              <a:t>Входные </a:t>
-            </a:r>
-            <a:r>
               <a:rPr lang="ru-RU" sz="2400" dirty="0">
                 <a:solidFill>
                   <a:srgbClr val="77F531"/>
@@ -11721,25 +11657,8 @@
                 <a:latin typeface="RodchenkoCTT" pitchFamily="2" charset="0"/>
                 <a:cs typeface="Courier New" panose="02070309020205020404" pitchFamily="49" charset="0"/>
               </a:rPr>
-              <a:t>и выходные сигналы (иначе - коннекторы) – </a:t>
+              <a:t>Входные и выходные сигналы (иначе - коннекторы) – связывают блоки, моделируют входы и выходы с подсоединенными проводами. Ограничения:</a:t>
             </a:r>
-            <a:r>
-              <a:rPr lang="ru-RU" sz="2400" dirty="0" smtClean="0">
-                <a:solidFill>
-                  <a:srgbClr val="77F531"/>
-                </a:solidFill>
-                <a:latin typeface="RodchenkoCTT" pitchFamily="2" charset="0"/>
-                <a:cs typeface="Courier New" panose="02070309020205020404" pitchFamily="49" charset="0"/>
-              </a:rPr>
-              <a:t>связывают блоки, моделируют входы и выходы с подсоединенными проводами. Ограничения:</a:t>
-            </a:r>
-            <a:endParaRPr lang="ru-RU" sz="2400" dirty="0">
-              <a:solidFill>
-                <a:srgbClr val="77F531"/>
-              </a:solidFill>
-              <a:latin typeface="RodchenkoCTT" pitchFamily="2" charset="0"/>
-              <a:cs typeface="Courier New" panose="02070309020205020404" pitchFamily="49" charset="0"/>
-            </a:endParaRPr>
           </a:p>
         </p:txBody>
       </p:sp>
@@ -11794,16 +11713,6 @@
               <a:buAutoNum type="arabicParenR"/>
             </a:pPr>
             <a:r>
-              <a:rPr lang="ru-RU" sz="2400" dirty="0" smtClean="0">
-                <a:solidFill>
-                  <a:srgbClr val="77F531"/>
-                </a:solidFill>
-                <a:latin typeface="RodchenkoCTT" pitchFamily="2" charset="0"/>
-                <a:cs typeface="Courier New" panose="02070309020205020404" pitchFamily="49" charset="0"/>
-              </a:rPr>
-              <a:t>Входной коннектор можно </a:t>
-            </a:r>
-            <a:r>
               <a:rPr lang="ru-RU" sz="2400" dirty="0">
                 <a:solidFill>
                   <a:srgbClr val="77F531"/>
@@ -11811,7 +11720,7 @@
                 <a:latin typeface="RodchenkoCTT" pitchFamily="2" charset="0"/>
                 <a:cs typeface="Courier New" panose="02070309020205020404" pitchFamily="49" charset="0"/>
               </a:rPr>
-              <a:t>соединять только с одним выходным.</a:t>
+              <a:t>Входной коннектор можно соединять только с одним выходным.</a:t>
             </a:r>
           </a:p>
           <a:p>
@@ -11826,37 +11735,7 @@
                 <a:latin typeface="RodchenkoCTT" pitchFamily="2" charset="0"/>
                 <a:cs typeface="Courier New" panose="02070309020205020404" pitchFamily="49" charset="0"/>
               </a:rPr>
-              <a:t>Выходной </a:t>
-            </a:r>
-            <a:r>
-              <a:rPr lang="ru-RU" sz="2400" dirty="0" smtClean="0">
-                <a:solidFill>
-                  <a:srgbClr val="77F531"/>
-                </a:solidFill>
-                <a:latin typeface="RodchenkoCTT" pitchFamily="2" charset="0"/>
-                <a:cs typeface="Courier New" panose="02070309020205020404" pitchFamily="49" charset="0"/>
-              </a:rPr>
-              <a:t>коннектор </a:t>
-            </a:r>
-            <a:r>
-              <a:rPr lang="ru-RU" sz="2400" dirty="0">
-                <a:solidFill>
-                  <a:srgbClr val="77F531"/>
-                </a:solidFill>
-                <a:latin typeface="RodchenkoCTT" pitchFamily="2" charset="0"/>
-                <a:cs typeface="Courier New" panose="02070309020205020404" pitchFamily="49" charset="0"/>
-              </a:rPr>
-              <a:t>можно соединять с неограниченным количеством </a:t>
-            </a:r>
-            <a:r>
-              <a:rPr lang="ru-RU" sz="2400" dirty="0" smtClean="0">
-                <a:solidFill>
-                  <a:srgbClr val="77F531"/>
-                </a:solidFill>
-                <a:latin typeface="RodchenkoCTT" pitchFamily="2" charset="0"/>
-                <a:cs typeface="Courier New" panose="02070309020205020404" pitchFamily="49" charset="0"/>
-              </a:rPr>
-              <a:t>входных</a:t>
+              <a:t>Выходной коннектор можно соединять с неограниченным количеством входных</a:t>
             </a:r>
             <a:r>
               <a:rPr lang="en-US" sz="2400" dirty="0">
@@ -11868,7 +11747,7 @@
               </a:rPr>
               <a:t>.</a:t>
             </a:r>
-            <a:endParaRPr lang="ru-RU" sz="2400" dirty="0" smtClean="0">
+            <a:endParaRPr lang="ru-RU" sz="2400" dirty="0">
               <a:solidFill>
                 <a:srgbClr val="77F531"/>
               </a:solidFill>
@@ -11881,7 +11760,7 @@
               <a:buAutoNum type="arabicParenR"/>
             </a:pPr>
             <a:r>
-              <a:rPr lang="ru-RU" sz="2400" dirty="0" smtClean="0">
+              <a:rPr lang="ru-RU" sz="2400" dirty="0">
                 <a:solidFill>
                   <a:srgbClr val="77F531"/>
                 </a:solidFill>
@@ -13371,13 +13250,6 @@
   <p:clrMapOvr>
     <a:masterClrMapping/>
   </p:clrMapOvr>
-  <p:timing>
-    <p:tnLst>
-      <p:par>
-        <p:cTn id="1" dur="indefinite" restart="never" nodeType="tmRoot"/>
-      </p:par>
-    </p:tnLst>
-  </p:timing>
 </p:sld>
 </file>
 
@@ -13783,13 +13655,6 @@
   <p:clrMapOvr>
     <a:overrideClrMapping bg1="lt1" tx1="dk1" bg2="lt2" tx2="dk2" accent1="accent1" accent2="accent2" accent3="accent3" accent4="accent4" accent5="accent5" accent6="accent6" hlink="hlink" folHlink="folHlink"/>
   </p:clrMapOvr>
-  <p:timing>
-    <p:tnLst>
-      <p:par>
-        <p:cTn id="1" dur="indefinite" restart="never" nodeType="tmRoot"/>
-      </p:par>
-    </p:tnLst>
-  </p:timing>
 </p:sld>
 </file>
 
@@ -14030,17 +13895,7 @@
                 <a:latin typeface="RodchenkoCTT" pitchFamily="2" charset="0"/>
                 <a:cs typeface="Courier New" panose="02070309020205020404" pitchFamily="49" charset="0"/>
               </a:rPr>
-              <a:t>Максимальное количество пройденных тестов. </a:t>
-            </a:r>
-            <a:r>
-              <a:rPr lang="ru-RU" sz="2300" dirty="0" smtClean="0">
-                <a:solidFill>
-                  <a:srgbClr val="77F531"/>
-                </a:solidFill>
-                <a:latin typeface="RodchenkoCTT" pitchFamily="2" charset="0"/>
-                <a:cs typeface="Courier New" panose="02070309020205020404" pitchFamily="49" charset="0"/>
-              </a:rPr>
-              <a:t>Количество очков пропорционально количеству пройденных тестов.</a:t>
+              <a:t>Максимальное количество пройденных тестов. Количество очков пропорционально количеству пройденных тестов.</a:t>
             </a:r>
           </a:p>
           <a:p>
@@ -14053,25 +13908,8 @@
                 <a:latin typeface="RodchenkoCTT" pitchFamily="2" charset="0"/>
                 <a:cs typeface="Courier New" panose="02070309020205020404" pitchFamily="49" charset="0"/>
               </a:rPr>
-              <a:t>Пользователь может увидеть свои очки находясь на уровне и в меню уровней, суммарное количество очков показывается и в главном меню</a:t>
+              <a:t>Пользователь может увидеть свои очки находясь на уровне и в меню уровней, суммарное количество очков показывается и в главном меню.</a:t>
             </a:r>
-            <a:r>
-              <a:rPr lang="ru-RU" sz="2300" dirty="0" smtClean="0">
-                <a:solidFill>
-                  <a:srgbClr val="77F531"/>
-                </a:solidFill>
-                <a:latin typeface="RodchenkoCTT" pitchFamily="2" charset="0"/>
-                <a:cs typeface="Courier New" panose="02070309020205020404" pitchFamily="49" charset="0"/>
-              </a:rPr>
-              <a:t>.</a:t>
-            </a:r>
-            <a:endParaRPr lang="ru-RU" sz="2300" dirty="0">
-              <a:solidFill>
-                <a:srgbClr val="77F531"/>
-              </a:solidFill>
-              <a:latin typeface="RodchenkoCTT" pitchFamily="2" charset="0"/>
-              <a:cs typeface="Courier New" panose="02070309020205020404" pitchFamily="49" charset="0"/>
-            </a:endParaRPr>
           </a:p>
         </p:txBody>
       </p:sp>
@@ -14235,13 +14073,6 @@
   <p:clrMapOvr>
     <a:overrideClrMapping bg1="lt1" tx1="dk1" bg2="lt2" tx2="dk2" accent1="accent1" accent2="accent2" accent3="accent3" accent4="accent4" accent5="accent5" accent6="accent6" hlink="hlink" folHlink="folHlink"/>
   </p:clrMapOvr>
-  <p:timing>
-    <p:tnLst>
-      <p:par>
-        <p:cTn id="1" dur="indefinite" restart="never" nodeType="tmRoot"/>
-      </p:par>
-    </p:tnLst>
-  </p:timing>
 </p:sld>
 </file>
 
@@ -14565,7 +14396,7 @@
           <a:p>
             <a:pPr algn="just"/>
             <a:r>
-              <a:rPr lang="en-US" sz="10000" dirty="0" smtClean="0">
+              <a:rPr lang="en-US" sz="10000" dirty="0">
                 <a:solidFill>
                   <a:srgbClr val="77F531"/>
                 </a:solidFill>
@@ -14594,13 +14425,6 @@
   <p:clrMapOvr>
     <a:overrideClrMapping bg1="lt1" tx1="dk1" bg2="lt2" tx2="dk2" accent1="accent1" accent2="accent2" accent3="accent3" accent4="accent4" accent5="accent5" accent6="accent6" hlink="hlink" folHlink="folHlink"/>
   </p:clrMapOvr>
-  <p:timing>
-    <p:tnLst>
-      <p:par>
-        <p:cTn id="1" dur="indefinite" restart="never" nodeType="tmRoot"/>
-      </p:par>
-    </p:tnLst>
-  </p:timing>
 </p:sld>
 </file>
 
@@ -14894,13 +14718,6 @@
   <p:clrMapOvr>
     <a:masterClrMapping/>
   </p:clrMapOvr>
-  <p:timing>
-    <p:tnLst>
-      <p:par>
-        <p:cTn id="1" dur="indefinite" restart="never" nodeType="tmRoot"/>
-      </p:par>
-    </p:tnLst>
-  </p:timing>
 </p:sld>
 </file>
 
@@ -15088,35 +14905,6 @@
       </p:pic>
       <p:pic>
         <p:nvPicPr>
-          <p:cNvPr id="17" name="Рисунок 16">
-            <a:extLst>
-              <a:ext uri="{FF2B5EF4-FFF2-40B4-BE49-F238E27FC236}">
-                <a16:creationId xmlns:a16="http://schemas.microsoft.com/office/drawing/2014/main" id="{700D4F72-6B99-4DBE-956A-0175CD64E3B8}"/>
-              </a:ext>
-            </a:extLst>
-          </p:cNvPr>
-          <p:cNvPicPr>
-            <a:picLocks noChangeAspect="1"/>
-          </p:cNvPicPr>
-          <p:nvPr/>
-        </p:nvPicPr>
-        <p:blipFill rotWithShape="1">
-          <a:blip r:embed="rId3"/>
-          <a:srcRect l="27378" r="26814" b="65702"/>
-          <a:stretch/>
-        </p:blipFill>
-        <p:spPr>
-          <a:xfrm>
-            <a:off x="6119812" y="1684420"/>
-            <a:ext cx="5570621" cy="2346158"/>
-          </a:xfrm>
-          <a:prstGeom prst="rect">
-            <a:avLst/>
-          </a:prstGeom>
-        </p:spPr>
-      </p:pic>
-      <p:pic>
-        <p:nvPicPr>
           <p:cNvPr id="18" name="Picture 2" descr="[animate output image]">
             <a:extLst>
               <a:ext uri="{FF2B5EF4-FFF2-40B4-BE49-F238E27FC236}">
@@ -15160,6 +14948,36 @@
               </a14:hiddenFill>
             </a:ext>
           </a:extLst>
+        </p:spPr>
+      </p:pic>
+      <p:pic>
+        <p:nvPicPr>
+          <p:cNvPr id="3" name="Рисунок 2">
+            <a:extLst>
+              <a:ext uri="{FF2B5EF4-FFF2-40B4-BE49-F238E27FC236}">
+                <a16:creationId xmlns:a16="http://schemas.microsoft.com/office/drawing/2014/main" id="{97DA9227-A582-4431-966F-8708E800398A}"/>
+              </a:ext>
+            </a:extLst>
+          </p:cNvPr>
+          <p:cNvPicPr>
+            <a:picLocks noChangeAspect="1"/>
+          </p:cNvPicPr>
+          <p:nvPr/>
+        </p:nvPicPr>
+        <p:blipFill>
+          <a:blip r:embed="rId5"/>
+          <a:stretch>
+            <a:fillRect/>
+          </a:stretch>
+        </p:blipFill>
+        <p:spPr>
+          <a:xfrm>
+            <a:off x="6659622" y="1833849"/>
+            <a:ext cx="4891739" cy="2414187"/>
+          </a:xfrm>
+          <a:prstGeom prst="rect">
+            <a:avLst/>
+          </a:prstGeom>
         </p:spPr>
       </p:pic>
     </p:spTree>

</xml_diff>